<commit_message>
feat: add image to slide
</commit_message>
<xml_diff>
--- a/slide-deck-officer-template.pptx
+++ b/slide-deck-officer-template.pptx
@@ -7466,6 +7466,41 @@
       </p:sp>
       <p:sp>
         <p:nvSpPr>
+          <p:cNvPr id="15" name="image">
+            <a:extLst>
+              <a:ext uri="{FF2B5EF4-FFF2-40B4-BE49-F238E27FC236}">
+                <a16:creationId xmlns:a16="http://schemas.microsoft.com/office/drawing/2014/main" id="{DE2D0FE5-2C22-F588-B2C4-566596A2B79E}"/>
+              </a:ext>
+            </a:extLst>
+          </p:cNvPr>
+          <p:cNvSpPr>
+            <a:spLocks noGrp="1"/>
+          </p:cNvSpPr>
+          <p:nvPr>
+            <p:ph type="pic" sz="quarter" idx="12"/>
+          </p:nvPr>
+        </p:nvSpPr>
+        <p:spPr>
+          <a:xfrm>
+            <a:off x="9906000" y="4572000"/>
+            <a:ext cx="2058145" cy="1760538"/>
+          </a:xfrm>
+        </p:spPr>
+        <p:txBody>
+          <a:bodyPr/>
+          <a:lstStyle>
+            <a:lvl1pPr marL="0" indent="0">
+              <a:buNone/>
+              <a:defRPr/>
+            </a:lvl1pPr>
+          </a:lstStyle>
+          <a:p>
+            <a:endParaRPr lang="en-CA" dirty="0"/>
+          </a:p>
+        </p:txBody>
+      </p:sp>
+      <p:sp>
+        <p:nvSpPr>
           <p:cNvPr id="11" name="bodybullet"/>
           <p:cNvSpPr>
             <a:spLocks noGrp="1"/>
@@ -10396,7 +10431,7 @@
           <a:p>
             <a:fld id="{9238D30A-C4D9-4706-A3BC-D7B1F66AC7AA}" type="datetimeFigureOut">
               <a:rPr lang="en-CA" smtClean="0"/>
-              <a:t>2024-03-15</a:t>
+              <a:t>2024-03-17</a:t>
             </a:fld>
             <a:endParaRPr lang="en-CA"/>
           </a:p>
@@ -10944,7 +10979,7 @@
           <a:p>
             <a:fld id="{FAE7665C-0A6A-4A28-87E2-92D571E7537D}" type="datetime3">
               <a:rPr lang="en-CA" smtClean="0"/>
-              <a:t>15 March 2024</a:t>
+              <a:t>17 March 2024</a:t>
             </a:fld>
             <a:endParaRPr lang="en-CA" dirty="0"/>
           </a:p>

</xml_diff>

<commit_message>
chore: cleanup unused code/slides
</commit_message>
<xml_diff>
--- a/slide-deck-officer-template.pptx
+++ b/slide-deck-officer-template.pptx
@@ -1576,6 +1576,39 @@
     </pc:docChg>
   </pc:docChgLst>
   <pc:docChgLst>
+    <pc:chgData name="Rieck, Jennifer (HC/SC)" userId="f15338df-41bc-4de2-9c55-7e5b1761acd3" providerId="ADAL" clId="{15F4335D-6335-43BA-A6A6-0196B4DBD3AC}"/>
+    <pc:docChg chg="modMainMaster">
+      <pc:chgData name="Rieck, Jennifer (HC/SC)" userId="f15338df-41bc-4de2-9c55-7e5b1761acd3" providerId="ADAL" clId="{15F4335D-6335-43BA-A6A6-0196B4DBD3AC}" dt="2023-04-11T14:25:15.548" v="1" actId="404"/>
+      <pc:docMkLst>
+        <pc:docMk/>
+      </pc:docMkLst>
+      <pc:sldMasterChg chg="modSldLayout">
+        <pc:chgData name="Rieck, Jennifer (HC/SC)" userId="f15338df-41bc-4de2-9c55-7e5b1761acd3" providerId="ADAL" clId="{15F4335D-6335-43BA-A6A6-0196B4DBD3AC}" dt="2023-04-11T14:25:15.548" v="1" actId="404"/>
+        <pc:sldMasterMkLst>
+          <pc:docMk/>
+          <pc:sldMasterMk cId="0" sldId="2147483913"/>
+        </pc:sldMasterMkLst>
+        <pc:sldLayoutChg chg="modSp mod">
+          <pc:chgData name="Rieck, Jennifer (HC/SC)" userId="f15338df-41bc-4de2-9c55-7e5b1761acd3" providerId="ADAL" clId="{15F4335D-6335-43BA-A6A6-0196B4DBD3AC}" dt="2023-04-11T14:25:15.548" v="1" actId="404"/>
+          <pc:sldLayoutMkLst>
+            <pc:docMk/>
+            <pc:sldMasterMk cId="0" sldId="2147483913"/>
+            <pc:sldLayoutMk cId="325640250" sldId="2147483991"/>
+          </pc:sldLayoutMkLst>
+          <pc:spChg chg="mod">
+            <ac:chgData name="Rieck, Jennifer (HC/SC)" userId="f15338df-41bc-4de2-9c55-7e5b1761acd3" providerId="ADAL" clId="{15F4335D-6335-43BA-A6A6-0196B4DBD3AC}" dt="2023-04-11T14:25:15.548" v="1" actId="404"/>
+            <ac:spMkLst>
+              <pc:docMk/>
+              <pc:sldMasterMk cId="0" sldId="2147483913"/>
+              <pc:sldLayoutMk cId="325640250" sldId="2147483991"/>
+              <ac:spMk id="20" creationId="{F4C4B83A-261A-F198-9099-6144D1A473D1}"/>
+            </ac:spMkLst>
+          </pc:spChg>
+        </pc:sldLayoutChg>
+      </pc:sldMasterChg>
+    </pc:docChg>
+  </pc:docChgLst>
+  <pc:docChgLst>
     <pc:chgData name="Rieck, Jennifer (HC/SC)" userId="f15338df-41bc-4de2-9c55-7e5b1761acd3" providerId="ADAL" clId="{8E5374F7-015C-4905-AFDC-A1474C2F28F4}"/>
     <pc:docChg chg="modMainMaster">
       <pc:chgData name="Rieck, Jennifer (HC/SC)" userId="f15338df-41bc-4de2-9c55-7e5b1761acd3" providerId="ADAL" clId="{8E5374F7-015C-4905-AFDC-A1474C2F28F4}" dt="2023-04-11T17:09:46.049" v="20"/>
@@ -1662,3719 +1695,7 @@
       </pc:sldMasterChg>
     </pc:docChg>
   </pc:docChgLst>
-  <pc:docChgLst>
-    <pc:chgData name="Rieck, Jennifer (HC/SC)" userId="f15338df-41bc-4de2-9c55-7e5b1761acd3" providerId="ADAL" clId="{15F4335D-6335-43BA-A6A6-0196B4DBD3AC}"/>
-    <pc:docChg chg="modMainMaster">
-      <pc:chgData name="Rieck, Jennifer (HC/SC)" userId="f15338df-41bc-4de2-9c55-7e5b1761acd3" providerId="ADAL" clId="{15F4335D-6335-43BA-A6A6-0196B4DBD3AC}" dt="2023-04-11T14:25:15.548" v="1" actId="404"/>
-      <pc:docMkLst>
-        <pc:docMk/>
-      </pc:docMkLst>
-      <pc:sldMasterChg chg="modSldLayout">
-        <pc:chgData name="Rieck, Jennifer (HC/SC)" userId="f15338df-41bc-4de2-9c55-7e5b1761acd3" providerId="ADAL" clId="{15F4335D-6335-43BA-A6A6-0196B4DBD3AC}" dt="2023-04-11T14:25:15.548" v="1" actId="404"/>
-        <pc:sldMasterMkLst>
-          <pc:docMk/>
-          <pc:sldMasterMk cId="0" sldId="2147483913"/>
-        </pc:sldMasterMkLst>
-        <pc:sldLayoutChg chg="modSp mod">
-          <pc:chgData name="Rieck, Jennifer (HC/SC)" userId="f15338df-41bc-4de2-9c55-7e5b1761acd3" providerId="ADAL" clId="{15F4335D-6335-43BA-A6A6-0196B4DBD3AC}" dt="2023-04-11T14:25:15.548" v="1" actId="404"/>
-          <pc:sldLayoutMkLst>
-            <pc:docMk/>
-            <pc:sldMasterMk cId="0" sldId="2147483913"/>
-            <pc:sldLayoutMk cId="325640250" sldId="2147483991"/>
-          </pc:sldLayoutMkLst>
-          <pc:spChg chg="mod">
-            <ac:chgData name="Rieck, Jennifer (HC/SC)" userId="f15338df-41bc-4de2-9c55-7e5b1761acd3" providerId="ADAL" clId="{15F4335D-6335-43BA-A6A6-0196B4DBD3AC}" dt="2023-04-11T14:25:15.548" v="1" actId="404"/>
-            <ac:spMkLst>
-              <pc:docMk/>
-              <pc:sldMasterMk cId="0" sldId="2147483913"/>
-              <pc:sldLayoutMk cId="325640250" sldId="2147483991"/>
-              <ac:spMk id="20" creationId="{F4C4B83A-261A-F198-9099-6144D1A473D1}"/>
-            </ac:spMkLst>
-          </pc:spChg>
-        </pc:sldLayoutChg>
-      </pc:sldMasterChg>
-    </pc:docChg>
-  </pc:docChgLst>
 </pc:chgInfo>
-</file>
-
-<file path=ppt/diagrams/colors1.xml><?xml version="1.0" encoding="utf-8"?>
-<dgm:colorsDef xmlns:dgm="http://schemas.openxmlformats.org/drawingml/2006/diagram" xmlns:a="http://schemas.openxmlformats.org/drawingml/2006/main" uniqueId="urn:microsoft.com/office/officeart/2005/8/colors/accent1_2">
-  <dgm:title val=""/>
-  <dgm:desc val=""/>
-  <dgm:catLst>
-    <dgm:cat type="accent1" pri="11200"/>
-  </dgm:catLst>
-  <dgm:styleLbl name="node0">
-    <dgm:fillClrLst meth="repeat">
-      <a:schemeClr val="accent1"/>
-    </dgm:fillClrLst>
-    <dgm:linClrLst meth="repeat">
-      <a:schemeClr val="lt1"/>
-    </dgm:linClrLst>
-    <dgm:effectClrLst/>
-    <dgm:txLinClrLst/>
-    <dgm:txFillClrLst/>
-    <dgm:txEffectClrLst/>
-  </dgm:styleLbl>
-  <dgm:styleLbl name="alignNode1">
-    <dgm:fillClrLst meth="repeat">
-      <a:schemeClr val="accent1"/>
-    </dgm:fillClrLst>
-    <dgm:linClrLst meth="repeat">
-      <a:schemeClr val="accent1"/>
-    </dgm:linClrLst>
-    <dgm:effectClrLst/>
-    <dgm:txLinClrLst/>
-    <dgm:txFillClrLst/>
-    <dgm:txEffectClrLst/>
-  </dgm:styleLbl>
-  <dgm:styleLbl name="node1">
-    <dgm:fillClrLst meth="repeat">
-      <a:schemeClr val="accent1"/>
-    </dgm:fillClrLst>
-    <dgm:linClrLst meth="repeat">
-      <a:schemeClr val="lt1"/>
-    </dgm:linClrLst>
-    <dgm:effectClrLst/>
-    <dgm:txLinClrLst/>
-    <dgm:txFillClrLst/>
-    <dgm:txEffectClrLst/>
-  </dgm:styleLbl>
-  <dgm:styleLbl name="lnNode1">
-    <dgm:fillClrLst meth="repeat">
-      <a:schemeClr val="accent1"/>
-    </dgm:fillClrLst>
-    <dgm:linClrLst meth="repeat">
-      <a:schemeClr val="lt1"/>
-    </dgm:linClrLst>
-    <dgm:effectClrLst/>
-    <dgm:txLinClrLst/>
-    <dgm:txFillClrLst/>
-    <dgm:txEffectClrLst/>
-  </dgm:styleLbl>
-  <dgm:styleLbl name="vennNode1">
-    <dgm:fillClrLst meth="repeat">
-      <a:schemeClr val="accent1">
-        <a:alpha val="50000"/>
-      </a:schemeClr>
-    </dgm:fillClrLst>
-    <dgm:linClrLst meth="repeat">
-      <a:schemeClr val="lt1"/>
-    </dgm:linClrLst>
-    <dgm:effectClrLst/>
-    <dgm:txLinClrLst/>
-    <dgm:txFillClrLst/>
-    <dgm:txEffectClrLst/>
-  </dgm:styleLbl>
-  <dgm:styleLbl name="node2">
-    <dgm:fillClrLst meth="repeat">
-      <a:schemeClr val="accent1"/>
-    </dgm:fillClrLst>
-    <dgm:linClrLst meth="repeat">
-      <a:schemeClr val="lt1"/>
-    </dgm:linClrLst>
-    <dgm:effectClrLst/>
-    <dgm:txLinClrLst/>
-    <dgm:txFillClrLst/>
-    <dgm:txEffectClrLst/>
-  </dgm:styleLbl>
-  <dgm:styleLbl name="node3">
-    <dgm:fillClrLst meth="repeat">
-      <a:schemeClr val="accent1"/>
-    </dgm:fillClrLst>
-    <dgm:linClrLst meth="repeat">
-      <a:schemeClr val="lt1"/>
-    </dgm:linClrLst>
-    <dgm:effectClrLst/>
-    <dgm:txLinClrLst/>
-    <dgm:txFillClrLst/>
-    <dgm:txEffectClrLst/>
-  </dgm:styleLbl>
-  <dgm:styleLbl name="node4">
-    <dgm:fillClrLst meth="repeat">
-      <a:schemeClr val="accent1"/>
-    </dgm:fillClrLst>
-    <dgm:linClrLst meth="repeat">
-      <a:schemeClr val="lt1"/>
-    </dgm:linClrLst>
-    <dgm:effectClrLst/>
-    <dgm:txLinClrLst/>
-    <dgm:txFillClrLst/>
-    <dgm:txEffectClrLst/>
-  </dgm:styleLbl>
-  <dgm:styleLbl name="fgImgPlace1">
-    <dgm:fillClrLst meth="repeat">
-      <a:schemeClr val="accent1">
-        <a:tint val="50000"/>
-      </a:schemeClr>
-    </dgm:fillClrLst>
-    <dgm:linClrLst meth="repeat">
-      <a:schemeClr val="lt1"/>
-    </dgm:linClrLst>
-    <dgm:effectClrLst/>
-    <dgm:txLinClrLst/>
-    <dgm:txFillClrLst meth="repeat">
-      <a:schemeClr val="lt1"/>
-    </dgm:txFillClrLst>
-    <dgm:txEffectClrLst/>
-  </dgm:styleLbl>
-  <dgm:styleLbl name="alignImgPlace1">
-    <dgm:fillClrLst meth="repeat">
-      <a:schemeClr val="accent1">
-        <a:tint val="50000"/>
-      </a:schemeClr>
-    </dgm:fillClrLst>
-    <dgm:linClrLst meth="repeat">
-      <a:schemeClr val="lt1"/>
-    </dgm:linClrLst>
-    <dgm:effectClrLst/>
-    <dgm:txLinClrLst/>
-    <dgm:txFillClrLst meth="repeat">
-      <a:schemeClr val="lt1"/>
-    </dgm:txFillClrLst>
-    <dgm:txEffectClrLst/>
-  </dgm:styleLbl>
-  <dgm:styleLbl name="bgImgPlace1">
-    <dgm:fillClrLst meth="repeat">
-      <a:schemeClr val="accent1">
-        <a:tint val="50000"/>
-      </a:schemeClr>
-    </dgm:fillClrLst>
-    <dgm:linClrLst meth="repeat">
-      <a:schemeClr val="lt1"/>
-    </dgm:linClrLst>
-    <dgm:effectClrLst/>
-    <dgm:txLinClrLst/>
-    <dgm:txFillClrLst meth="repeat">
-      <a:schemeClr val="lt1"/>
-    </dgm:txFillClrLst>
-    <dgm:txEffectClrLst/>
-  </dgm:styleLbl>
-  <dgm:styleLbl name="sibTrans2D1">
-    <dgm:fillClrLst meth="repeat">
-      <a:schemeClr val="accent1">
-        <a:tint val="60000"/>
-      </a:schemeClr>
-    </dgm:fillClrLst>
-    <dgm:linClrLst meth="repeat">
-      <a:schemeClr val="accent1">
-        <a:tint val="60000"/>
-      </a:schemeClr>
-    </dgm:linClrLst>
-    <dgm:effectClrLst/>
-    <dgm:txLinClrLst/>
-    <dgm:txFillClrLst/>
-    <dgm:txEffectClrLst/>
-  </dgm:styleLbl>
-  <dgm:styleLbl name="fgSibTrans2D1">
-    <dgm:fillClrLst meth="repeat">
-      <a:schemeClr val="accent1">
-        <a:tint val="60000"/>
-      </a:schemeClr>
-    </dgm:fillClrLst>
-    <dgm:linClrLst meth="repeat">
-      <a:schemeClr val="accent1">
-        <a:tint val="60000"/>
-      </a:schemeClr>
-    </dgm:linClrLst>
-    <dgm:effectClrLst/>
-    <dgm:txLinClrLst/>
-    <dgm:txFillClrLst/>
-    <dgm:txEffectClrLst/>
-  </dgm:styleLbl>
-  <dgm:styleLbl name="bgSibTrans2D1">
-    <dgm:fillClrLst meth="repeat">
-      <a:schemeClr val="accent1">
-        <a:tint val="60000"/>
-      </a:schemeClr>
-    </dgm:fillClrLst>
-    <dgm:linClrLst meth="repeat">
-      <a:schemeClr val="accent1">
-        <a:tint val="60000"/>
-      </a:schemeClr>
-    </dgm:linClrLst>
-    <dgm:effectClrLst/>
-    <dgm:txLinClrLst/>
-    <dgm:txFillClrLst/>
-    <dgm:txEffectClrLst/>
-  </dgm:styleLbl>
-  <dgm:styleLbl name="sibTrans1D1">
-    <dgm:fillClrLst meth="repeat">
-      <a:schemeClr val="accent1"/>
-    </dgm:fillClrLst>
-    <dgm:linClrLst meth="repeat">
-      <a:schemeClr val="accent1"/>
-    </dgm:linClrLst>
-    <dgm:effectClrLst/>
-    <dgm:txLinClrLst/>
-    <dgm:txFillClrLst meth="repeat">
-      <a:schemeClr val="tx1"/>
-    </dgm:txFillClrLst>
-    <dgm:txEffectClrLst/>
-  </dgm:styleLbl>
-  <dgm:styleLbl name="callout">
-    <dgm:fillClrLst meth="repeat">
-      <a:schemeClr val="accent1"/>
-    </dgm:fillClrLst>
-    <dgm:linClrLst meth="repeat">
-      <a:schemeClr val="accent1">
-        <a:tint val="50000"/>
-      </a:schemeClr>
-    </dgm:linClrLst>
-    <dgm:effectClrLst/>
-    <dgm:txLinClrLst/>
-    <dgm:txFillClrLst meth="repeat">
-      <a:schemeClr val="tx1"/>
-    </dgm:txFillClrLst>
-    <dgm:txEffectClrLst/>
-  </dgm:styleLbl>
-  <dgm:styleLbl name="asst0">
-    <dgm:fillClrLst meth="repeat">
-      <a:schemeClr val="accent1"/>
-    </dgm:fillClrLst>
-    <dgm:linClrLst meth="repeat">
-      <a:schemeClr val="lt1"/>
-    </dgm:linClrLst>
-    <dgm:effectClrLst/>
-    <dgm:txLinClrLst/>
-    <dgm:txFillClrLst/>
-    <dgm:txEffectClrLst/>
-  </dgm:styleLbl>
-  <dgm:styleLbl name="asst1">
-    <dgm:fillClrLst meth="repeat">
-      <a:schemeClr val="accent1"/>
-    </dgm:fillClrLst>
-    <dgm:linClrLst meth="repeat">
-      <a:schemeClr val="lt1"/>
-    </dgm:linClrLst>
-    <dgm:effectClrLst/>
-    <dgm:txLinClrLst/>
-    <dgm:txFillClrLst/>
-    <dgm:txEffectClrLst/>
-  </dgm:styleLbl>
-  <dgm:styleLbl name="asst2">
-    <dgm:fillClrLst meth="repeat">
-      <a:schemeClr val="accent1"/>
-    </dgm:fillClrLst>
-    <dgm:linClrLst meth="repeat">
-      <a:schemeClr val="lt1"/>
-    </dgm:linClrLst>
-    <dgm:effectClrLst/>
-    <dgm:txLinClrLst/>
-    <dgm:txFillClrLst/>
-    <dgm:txEffectClrLst/>
-  </dgm:styleLbl>
-  <dgm:styleLbl name="asst3">
-    <dgm:fillClrLst meth="repeat">
-      <a:schemeClr val="accent1"/>
-    </dgm:fillClrLst>
-    <dgm:linClrLst meth="repeat">
-      <a:schemeClr val="lt1"/>
-    </dgm:linClrLst>
-    <dgm:effectClrLst/>
-    <dgm:txLinClrLst/>
-    <dgm:txFillClrLst/>
-    <dgm:txEffectClrLst/>
-  </dgm:styleLbl>
-  <dgm:styleLbl name="asst4">
-    <dgm:fillClrLst meth="repeat">
-      <a:schemeClr val="accent1"/>
-    </dgm:fillClrLst>
-    <dgm:linClrLst meth="repeat">
-      <a:schemeClr val="lt1"/>
-    </dgm:linClrLst>
-    <dgm:effectClrLst/>
-    <dgm:txLinClrLst/>
-    <dgm:txFillClrLst/>
-    <dgm:txEffectClrLst/>
-  </dgm:styleLbl>
-  <dgm:styleLbl name="parChTrans2D1">
-    <dgm:fillClrLst meth="repeat">
-      <a:schemeClr val="accent1">
-        <a:tint val="60000"/>
-      </a:schemeClr>
-    </dgm:fillClrLst>
-    <dgm:linClrLst meth="repeat">
-      <a:schemeClr val="accent1">
-        <a:tint val="60000"/>
-      </a:schemeClr>
-    </dgm:linClrLst>
-    <dgm:effectClrLst/>
-    <dgm:txLinClrLst/>
-    <dgm:txFillClrLst meth="repeat">
-      <a:schemeClr val="lt1"/>
-    </dgm:txFillClrLst>
-    <dgm:txEffectClrLst/>
-  </dgm:styleLbl>
-  <dgm:styleLbl name="parChTrans2D2">
-    <dgm:fillClrLst meth="repeat">
-      <a:schemeClr val="accent1"/>
-    </dgm:fillClrLst>
-    <dgm:linClrLst meth="repeat">
-      <a:schemeClr val="accent1"/>
-    </dgm:linClrLst>
-    <dgm:effectClrLst/>
-    <dgm:txLinClrLst/>
-    <dgm:txFillClrLst meth="repeat">
-      <a:schemeClr val="lt1"/>
-    </dgm:txFillClrLst>
-    <dgm:txEffectClrLst/>
-  </dgm:styleLbl>
-  <dgm:styleLbl name="parChTrans2D3">
-    <dgm:fillClrLst meth="repeat">
-      <a:schemeClr val="accent1"/>
-    </dgm:fillClrLst>
-    <dgm:linClrLst meth="repeat">
-      <a:schemeClr val="accent1"/>
-    </dgm:linClrLst>
-    <dgm:effectClrLst/>
-    <dgm:txLinClrLst/>
-    <dgm:txFillClrLst meth="repeat">
-      <a:schemeClr val="lt1"/>
-    </dgm:txFillClrLst>
-    <dgm:txEffectClrLst/>
-  </dgm:styleLbl>
-  <dgm:styleLbl name="parChTrans2D4">
-    <dgm:fillClrLst meth="repeat">
-      <a:schemeClr val="accent1"/>
-    </dgm:fillClrLst>
-    <dgm:linClrLst meth="repeat">
-      <a:schemeClr val="accent1"/>
-    </dgm:linClrLst>
-    <dgm:effectClrLst/>
-    <dgm:txLinClrLst/>
-    <dgm:txFillClrLst meth="repeat">
-      <a:schemeClr val="lt1"/>
-    </dgm:txFillClrLst>
-    <dgm:txEffectClrLst/>
-  </dgm:styleLbl>
-  <dgm:styleLbl name="parChTrans1D1">
-    <dgm:fillClrLst meth="repeat">
-      <a:schemeClr val="accent1"/>
-    </dgm:fillClrLst>
-    <dgm:linClrLst meth="repeat">
-      <a:schemeClr val="accent1">
-        <a:shade val="60000"/>
-      </a:schemeClr>
-    </dgm:linClrLst>
-    <dgm:effectClrLst/>
-    <dgm:txLinClrLst/>
-    <dgm:txFillClrLst meth="repeat">
-      <a:schemeClr val="tx1"/>
-    </dgm:txFillClrLst>
-    <dgm:txEffectClrLst/>
-  </dgm:styleLbl>
-  <dgm:styleLbl name="parChTrans1D2">
-    <dgm:fillClrLst meth="repeat">
-      <a:schemeClr val="accent1"/>
-    </dgm:fillClrLst>
-    <dgm:linClrLst meth="repeat">
-      <a:schemeClr val="accent1">
-        <a:shade val="60000"/>
-      </a:schemeClr>
-    </dgm:linClrLst>
-    <dgm:effectClrLst/>
-    <dgm:txLinClrLst/>
-    <dgm:txFillClrLst meth="repeat">
-      <a:schemeClr val="tx1"/>
-    </dgm:txFillClrLst>
-    <dgm:txEffectClrLst/>
-  </dgm:styleLbl>
-  <dgm:styleLbl name="parChTrans1D3">
-    <dgm:fillClrLst meth="repeat">
-      <a:schemeClr val="accent1"/>
-    </dgm:fillClrLst>
-    <dgm:linClrLst meth="repeat">
-      <a:schemeClr val="accent1">
-        <a:shade val="80000"/>
-      </a:schemeClr>
-    </dgm:linClrLst>
-    <dgm:effectClrLst/>
-    <dgm:txLinClrLst/>
-    <dgm:txFillClrLst meth="repeat">
-      <a:schemeClr val="tx1"/>
-    </dgm:txFillClrLst>
-    <dgm:txEffectClrLst/>
-  </dgm:styleLbl>
-  <dgm:styleLbl name="parChTrans1D4">
-    <dgm:fillClrLst meth="repeat">
-      <a:schemeClr val="accent1"/>
-    </dgm:fillClrLst>
-    <dgm:linClrLst meth="repeat">
-      <a:schemeClr val="accent1">
-        <a:shade val="80000"/>
-      </a:schemeClr>
-    </dgm:linClrLst>
-    <dgm:effectClrLst/>
-    <dgm:txLinClrLst/>
-    <dgm:txFillClrLst meth="repeat">
-      <a:schemeClr val="tx1"/>
-    </dgm:txFillClrLst>
-    <dgm:txEffectClrLst/>
-  </dgm:styleLbl>
-  <dgm:styleLbl name="fgAcc1">
-    <dgm:fillClrLst meth="repeat">
-      <a:schemeClr val="lt1">
-        <a:alpha val="90000"/>
-      </a:schemeClr>
-    </dgm:fillClrLst>
-    <dgm:linClrLst meth="repeat">
-      <a:schemeClr val="accent1"/>
-    </dgm:linClrLst>
-    <dgm:effectClrLst/>
-    <dgm:txLinClrLst/>
-    <dgm:txFillClrLst meth="repeat">
-      <a:schemeClr val="dk1"/>
-    </dgm:txFillClrLst>
-    <dgm:txEffectClrLst/>
-  </dgm:styleLbl>
-  <dgm:styleLbl name="conFgAcc1">
-    <dgm:fillClrLst meth="repeat">
-      <a:schemeClr val="lt1">
-        <a:alpha val="90000"/>
-      </a:schemeClr>
-    </dgm:fillClrLst>
-    <dgm:linClrLst meth="repeat">
-      <a:schemeClr val="accent1"/>
-    </dgm:linClrLst>
-    <dgm:effectClrLst/>
-    <dgm:txLinClrLst/>
-    <dgm:txFillClrLst meth="repeat">
-      <a:schemeClr val="dk1"/>
-    </dgm:txFillClrLst>
-    <dgm:txEffectClrLst/>
-  </dgm:styleLbl>
-  <dgm:styleLbl name="alignAcc1">
-    <dgm:fillClrLst meth="repeat">
-      <a:schemeClr val="lt1">
-        <a:alpha val="90000"/>
-      </a:schemeClr>
-    </dgm:fillClrLst>
-    <dgm:linClrLst meth="repeat">
-      <a:schemeClr val="accent1"/>
-    </dgm:linClrLst>
-    <dgm:effectClrLst/>
-    <dgm:txLinClrLst/>
-    <dgm:txFillClrLst meth="repeat">
-      <a:schemeClr val="dk1"/>
-    </dgm:txFillClrLst>
-    <dgm:txEffectClrLst/>
-  </dgm:styleLbl>
-  <dgm:styleLbl name="trAlignAcc1">
-    <dgm:fillClrLst meth="repeat">
-      <a:schemeClr val="lt1">
-        <a:alpha val="40000"/>
-      </a:schemeClr>
-    </dgm:fillClrLst>
-    <dgm:linClrLst meth="repeat">
-      <a:schemeClr val="accent1"/>
-    </dgm:linClrLst>
-    <dgm:effectClrLst/>
-    <dgm:txLinClrLst/>
-    <dgm:txFillClrLst meth="repeat">
-      <a:schemeClr val="dk1"/>
-    </dgm:txFillClrLst>
-    <dgm:txEffectClrLst/>
-  </dgm:styleLbl>
-  <dgm:styleLbl name="bgAcc1">
-    <dgm:fillClrLst meth="repeat">
-      <a:schemeClr val="lt1">
-        <a:alpha val="90000"/>
-      </a:schemeClr>
-    </dgm:fillClrLst>
-    <dgm:linClrLst meth="repeat">
-      <a:schemeClr val="accent1"/>
-    </dgm:linClrLst>
-    <dgm:effectClrLst/>
-    <dgm:txLinClrLst/>
-    <dgm:txFillClrLst meth="repeat">
-      <a:schemeClr val="dk1"/>
-    </dgm:txFillClrLst>
-    <dgm:txEffectClrLst/>
-  </dgm:styleLbl>
-  <dgm:styleLbl name="solidFgAcc1">
-    <dgm:fillClrLst meth="repeat">
-      <a:schemeClr val="lt1"/>
-    </dgm:fillClrLst>
-    <dgm:linClrLst meth="repeat">
-      <a:schemeClr val="accent1"/>
-    </dgm:linClrLst>
-    <dgm:effectClrLst/>
-    <dgm:txLinClrLst/>
-    <dgm:txFillClrLst meth="repeat">
-      <a:schemeClr val="dk1"/>
-    </dgm:txFillClrLst>
-    <dgm:txEffectClrLst/>
-  </dgm:styleLbl>
-  <dgm:styleLbl name="solidAlignAcc1">
-    <dgm:fillClrLst meth="repeat">
-      <a:schemeClr val="lt1"/>
-    </dgm:fillClrLst>
-    <dgm:linClrLst meth="repeat">
-      <a:schemeClr val="accent1"/>
-    </dgm:linClrLst>
-    <dgm:effectClrLst/>
-    <dgm:txLinClrLst/>
-    <dgm:txFillClrLst meth="repeat">
-      <a:schemeClr val="dk1"/>
-    </dgm:txFillClrLst>
-    <dgm:txEffectClrLst/>
-  </dgm:styleLbl>
-  <dgm:styleLbl name="solidBgAcc1">
-    <dgm:fillClrLst meth="repeat">
-      <a:schemeClr val="lt1"/>
-    </dgm:fillClrLst>
-    <dgm:linClrLst meth="repeat">
-      <a:schemeClr val="accent1"/>
-    </dgm:linClrLst>
-    <dgm:effectClrLst/>
-    <dgm:txLinClrLst/>
-    <dgm:txFillClrLst meth="repeat">
-      <a:schemeClr val="dk1"/>
-    </dgm:txFillClrLst>
-    <dgm:txEffectClrLst/>
-  </dgm:styleLbl>
-  <dgm:styleLbl name="fgAccFollowNode1">
-    <dgm:fillClrLst meth="repeat">
-      <a:schemeClr val="accent1">
-        <a:alpha val="90000"/>
-        <a:tint val="40000"/>
-      </a:schemeClr>
-    </dgm:fillClrLst>
-    <dgm:linClrLst meth="repeat">
-      <a:schemeClr val="accent1">
-        <a:alpha val="90000"/>
-        <a:tint val="40000"/>
-      </a:schemeClr>
-    </dgm:linClrLst>
-    <dgm:effectClrLst/>
-    <dgm:txLinClrLst/>
-    <dgm:txFillClrLst meth="repeat">
-      <a:schemeClr val="dk1"/>
-    </dgm:txFillClrLst>
-    <dgm:txEffectClrLst/>
-  </dgm:styleLbl>
-  <dgm:styleLbl name="alignAccFollowNode1">
-    <dgm:fillClrLst meth="repeat">
-      <a:schemeClr val="accent1">
-        <a:alpha val="90000"/>
-        <a:tint val="40000"/>
-      </a:schemeClr>
-    </dgm:fillClrLst>
-    <dgm:linClrLst meth="repeat">
-      <a:schemeClr val="accent1">
-        <a:alpha val="90000"/>
-        <a:tint val="40000"/>
-      </a:schemeClr>
-    </dgm:linClrLst>
-    <dgm:effectClrLst/>
-    <dgm:txLinClrLst/>
-    <dgm:txFillClrLst meth="repeat">
-      <a:schemeClr val="dk1"/>
-    </dgm:txFillClrLst>
-    <dgm:txEffectClrLst/>
-  </dgm:styleLbl>
-  <dgm:styleLbl name="bgAccFollowNode1">
-    <dgm:fillClrLst meth="repeat">
-      <a:schemeClr val="accent1">
-        <a:alpha val="90000"/>
-        <a:tint val="40000"/>
-      </a:schemeClr>
-    </dgm:fillClrLst>
-    <dgm:linClrLst meth="repeat">
-      <a:schemeClr val="accent1">
-        <a:alpha val="90000"/>
-        <a:tint val="40000"/>
-      </a:schemeClr>
-    </dgm:linClrLst>
-    <dgm:effectClrLst/>
-    <dgm:txLinClrLst/>
-    <dgm:txFillClrLst meth="repeat">
-      <a:schemeClr val="dk1"/>
-    </dgm:txFillClrLst>
-    <dgm:txEffectClrLst/>
-  </dgm:styleLbl>
-  <dgm:styleLbl name="fgAcc0">
-    <dgm:fillClrLst meth="repeat">
-      <a:schemeClr val="lt1">
-        <a:alpha val="90000"/>
-      </a:schemeClr>
-    </dgm:fillClrLst>
-    <dgm:linClrLst meth="repeat">
-      <a:schemeClr val="accent1"/>
-    </dgm:linClrLst>
-    <dgm:effectClrLst/>
-    <dgm:txLinClrLst/>
-    <dgm:txFillClrLst meth="repeat">
-      <a:schemeClr val="dk1"/>
-    </dgm:txFillClrLst>
-    <dgm:txEffectClrLst/>
-  </dgm:styleLbl>
-  <dgm:styleLbl name="fgAcc2">
-    <dgm:fillClrLst meth="repeat">
-      <a:schemeClr val="lt1">
-        <a:alpha val="90000"/>
-      </a:schemeClr>
-    </dgm:fillClrLst>
-    <dgm:linClrLst meth="repeat">
-      <a:schemeClr val="accent1"/>
-    </dgm:linClrLst>
-    <dgm:effectClrLst/>
-    <dgm:txLinClrLst/>
-    <dgm:txFillClrLst meth="repeat">
-      <a:schemeClr val="dk1"/>
-    </dgm:txFillClrLst>
-    <dgm:txEffectClrLst/>
-  </dgm:styleLbl>
-  <dgm:styleLbl name="fgAcc3">
-    <dgm:fillClrLst meth="repeat">
-      <a:schemeClr val="lt1">
-        <a:alpha val="90000"/>
-      </a:schemeClr>
-    </dgm:fillClrLst>
-    <dgm:linClrLst meth="repeat">
-      <a:schemeClr val="accent1"/>
-    </dgm:linClrLst>
-    <dgm:effectClrLst/>
-    <dgm:txLinClrLst/>
-    <dgm:txFillClrLst meth="repeat">
-      <a:schemeClr val="dk1"/>
-    </dgm:txFillClrLst>
-    <dgm:txEffectClrLst/>
-  </dgm:styleLbl>
-  <dgm:styleLbl name="fgAcc4">
-    <dgm:fillClrLst meth="repeat">
-      <a:schemeClr val="lt1">
-        <a:alpha val="90000"/>
-      </a:schemeClr>
-    </dgm:fillClrLst>
-    <dgm:linClrLst meth="repeat">
-      <a:schemeClr val="accent1"/>
-    </dgm:linClrLst>
-    <dgm:effectClrLst/>
-    <dgm:txLinClrLst/>
-    <dgm:txFillClrLst meth="repeat">
-      <a:schemeClr val="dk1"/>
-    </dgm:txFillClrLst>
-    <dgm:txEffectClrLst/>
-  </dgm:styleLbl>
-  <dgm:styleLbl name="bgShp">
-    <dgm:fillClrLst meth="repeat">
-      <a:schemeClr val="accent1">
-        <a:tint val="40000"/>
-      </a:schemeClr>
-    </dgm:fillClrLst>
-    <dgm:linClrLst meth="repeat">
-      <a:schemeClr val="accent1"/>
-    </dgm:linClrLst>
-    <dgm:effectClrLst/>
-    <dgm:txLinClrLst/>
-    <dgm:txFillClrLst meth="repeat">
-      <a:schemeClr val="dk1"/>
-    </dgm:txFillClrLst>
-    <dgm:txEffectClrLst/>
-  </dgm:styleLbl>
-  <dgm:styleLbl name="dkBgShp">
-    <dgm:fillClrLst meth="repeat">
-      <a:schemeClr val="accent1">
-        <a:shade val="80000"/>
-      </a:schemeClr>
-    </dgm:fillClrLst>
-    <dgm:linClrLst meth="repeat">
-      <a:schemeClr val="accent1"/>
-    </dgm:linClrLst>
-    <dgm:effectClrLst/>
-    <dgm:txLinClrLst/>
-    <dgm:txFillClrLst meth="repeat">
-      <a:schemeClr val="lt1"/>
-    </dgm:txFillClrLst>
-    <dgm:txEffectClrLst/>
-  </dgm:styleLbl>
-  <dgm:styleLbl name="trBgShp">
-    <dgm:fillClrLst meth="repeat">
-      <a:schemeClr val="accent1">
-        <a:tint val="50000"/>
-        <a:alpha val="40000"/>
-      </a:schemeClr>
-    </dgm:fillClrLst>
-    <dgm:linClrLst meth="repeat">
-      <a:schemeClr val="accent1"/>
-    </dgm:linClrLst>
-    <dgm:effectClrLst/>
-    <dgm:txLinClrLst/>
-    <dgm:txFillClrLst meth="repeat">
-      <a:schemeClr val="lt1"/>
-    </dgm:txFillClrLst>
-    <dgm:txEffectClrLst/>
-  </dgm:styleLbl>
-  <dgm:styleLbl name="fgShp">
-    <dgm:fillClrLst meth="repeat">
-      <a:schemeClr val="accent1">
-        <a:tint val="60000"/>
-      </a:schemeClr>
-    </dgm:fillClrLst>
-    <dgm:linClrLst meth="repeat">
-      <a:schemeClr val="lt1"/>
-    </dgm:linClrLst>
-    <dgm:effectClrLst/>
-    <dgm:txLinClrLst/>
-    <dgm:txFillClrLst meth="repeat">
-      <a:schemeClr val="dk1"/>
-    </dgm:txFillClrLst>
-    <dgm:txEffectClrLst/>
-  </dgm:styleLbl>
-  <dgm:styleLbl name="revTx">
-    <dgm:fillClrLst meth="repeat">
-      <a:schemeClr val="lt1">
-        <a:alpha val="0"/>
-      </a:schemeClr>
-    </dgm:fillClrLst>
-    <dgm:linClrLst meth="repeat">
-      <a:schemeClr val="dk1">
-        <a:alpha val="0"/>
-      </a:schemeClr>
-    </dgm:linClrLst>
-    <dgm:effectClrLst/>
-    <dgm:txLinClrLst/>
-    <dgm:txFillClrLst meth="repeat">
-      <a:schemeClr val="tx1"/>
-    </dgm:txFillClrLst>
-    <dgm:txEffectClrLst/>
-  </dgm:styleLbl>
-</dgm:colorsDef>
-</file>
-
-<file path=ppt/diagrams/data1.xml><?xml version="1.0" encoding="utf-8"?>
-<dgm:dataModel xmlns:dgm="http://schemas.openxmlformats.org/drawingml/2006/diagram" xmlns:a="http://schemas.openxmlformats.org/drawingml/2006/main">
-  <dgm:ptLst>
-    <dgm:pt modelId="{9CA579DE-A93E-48B2-9CD1-2521E6D634DC}" type="doc">
-      <dgm:prSet loTypeId="urn:microsoft.com/office/officeart/2005/8/layout/hierarchy1" loCatId="hierarchy" qsTypeId="urn:microsoft.com/office/officeart/2005/8/quickstyle/simple4" qsCatId="simple" csTypeId="urn:microsoft.com/office/officeart/2005/8/colors/accent1_2" csCatId="accent1" phldr="1"/>
-      <dgm:spPr/>
-      <dgm:t>
-        <a:bodyPr/>
-        <a:lstStyle/>
-        <a:p>
-          <a:endParaRPr lang="en-US"/>
-        </a:p>
-      </dgm:t>
-    </dgm:pt>
-    <dgm:pt modelId="{0BA85747-B763-4262-844C-3C86CB33DC12}">
-      <dgm:prSet/>
-      <dgm:spPr/>
-      <dgm:t>
-        <a:bodyPr/>
-        <a:lstStyle/>
-        <a:p>
-          <a:pPr rtl="0"/>
-          <a:endParaRPr lang="en-US" dirty="0"/>
-        </a:p>
-      </dgm:t>
-    </dgm:pt>
-    <dgm:pt modelId="{B336F9C0-57C8-4CC0-8F06-2CBF372BA6CC}" type="parTrans" cxnId="{3046B993-1F1D-4EA2-8F0E-46AD88AC15FF}">
-      <dgm:prSet/>
-      <dgm:spPr/>
-      <dgm:t>
-        <a:bodyPr/>
-        <a:lstStyle/>
-        <a:p>
-          <a:endParaRPr lang="en-US"/>
-        </a:p>
-      </dgm:t>
-    </dgm:pt>
-    <dgm:pt modelId="{AA148616-5F40-4D58-9743-C7BC347F9015}" type="sibTrans" cxnId="{3046B993-1F1D-4EA2-8F0E-46AD88AC15FF}">
-      <dgm:prSet/>
-      <dgm:spPr/>
-      <dgm:t>
-        <a:bodyPr/>
-        <a:lstStyle/>
-        <a:p>
-          <a:endParaRPr lang="en-US"/>
-        </a:p>
-      </dgm:t>
-    </dgm:pt>
-    <dgm:pt modelId="{D3DC05D5-D571-4CE6-A969-C4107A775C2F}">
-      <dgm:prSet/>
-      <dgm:spPr/>
-      <dgm:t>
-        <a:bodyPr/>
-        <a:lstStyle/>
-        <a:p>
-          <a:pPr rtl="0"/>
-          <a:endParaRPr lang="en-US" dirty="0"/>
-        </a:p>
-      </dgm:t>
-    </dgm:pt>
-    <dgm:pt modelId="{574F32AB-A4FB-448C-928E-82162318F1A1}" type="parTrans" cxnId="{DD896A45-58F9-48CD-BBF2-C7A9B71EFB3D}">
-      <dgm:prSet/>
-      <dgm:spPr/>
-      <dgm:t>
-        <a:bodyPr/>
-        <a:lstStyle/>
-        <a:p>
-          <a:endParaRPr lang="en-US"/>
-        </a:p>
-      </dgm:t>
-    </dgm:pt>
-    <dgm:pt modelId="{8FFCFB89-5390-4082-AABF-D64E5F2E378B}" type="sibTrans" cxnId="{DD896A45-58F9-48CD-BBF2-C7A9B71EFB3D}">
-      <dgm:prSet/>
-      <dgm:spPr/>
-      <dgm:t>
-        <a:bodyPr/>
-        <a:lstStyle/>
-        <a:p>
-          <a:endParaRPr lang="en-US"/>
-        </a:p>
-      </dgm:t>
-    </dgm:pt>
-    <dgm:pt modelId="{F4A0169D-9645-450F-81A6-C46C020F7444}">
-      <dgm:prSet/>
-      <dgm:spPr/>
-      <dgm:t>
-        <a:bodyPr/>
-        <a:lstStyle/>
-        <a:p>
-          <a:pPr rtl="0"/>
-          <a:endParaRPr lang="en-US" dirty="0"/>
-        </a:p>
-      </dgm:t>
-    </dgm:pt>
-    <dgm:pt modelId="{A7BBF5C9-DD31-4066-8A48-78F3F28E2FA8}" type="parTrans" cxnId="{1062233F-DCA8-4E70-9A6B-66BDFACC82ED}">
-      <dgm:prSet/>
-      <dgm:spPr/>
-      <dgm:t>
-        <a:bodyPr/>
-        <a:lstStyle/>
-        <a:p>
-          <a:endParaRPr lang="en-US"/>
-        </a:p>
-      </dgm:t>
-    </dgm:pt>
-    <dgm:pt modelId="{D1F9A2AE-2CCE-4A2B-A899-EE5AE1EE47FE}" type="sibTrans" cxnId="{1062233F-DCA8-4E70-9A6B-66BDFACC82ED}">
-      <dgm:prSet/>
-      <dgm:spPr/>
-      <dgm:t>
-        <a:bodyPr/>
-        <a:lstStyle/>
-        <a:p>
-          <a:endParaRPr lang="en-US"/>
-        </a:p>
-      </dgm:t>
-    </dgm:pt>
-    <dgm:pt modelId="{B76C14AF-A087-4230-8732-4CB827EDE1FD}">
-      <dgm:prSet/>
-      <dgm:spPr/>
-      <dgm:t>
-        <a:bodyPr/>
-        <a:lstStyle/>
-        <a:p>
-          <a:pPr rtl="0"/>
-          <a:endParaRPr lang="en-US" dirty="0"/>
-        </a:p>
-      </dgm:t>
-    </dgm:pt>
-    <dgm:pt modelId="{2EEB5A0C-68E6-4CB0-9AA3-9AF659F4729C}" type="parTrans" cxnId="{D5587936-FC03-4884-9E60-849BE3DF3D96}">
-      <dgm:prSet/>
-      <dgm:spPr/>
-      <dgm:t>
-        <a:bodyPr/>
-        <a:lstStyle/>
-        <a:p>
-          <a:endParaRPr lang="en-US"/>
-        </a:p>
-      </dgm:t>
-    </dgm:pt>
-    <dgm:pt modelId="{C39D7428-A4EE-41DF-84F6-BE543385B0DE}" type="sibTrans" cxnId="{D5587936-FC03-4884-9E60-849BE3DF3D96}">
-      <dgm:prSet/>
-      <dgm:spPr/>
-      <dgm:t>
-        <a:bodyPr/>
-        <a:lstStyle/>
-        <a:p>
-          <a:endParaRPr lang="en-US"/>
-        </a:p>
-      </dgm:t>
-    </dgm:pt>
-    <dgm:pt modelId="{C5E47A78-B1BC-49ED-B479-E45C90893A27}">
-      <dgm:prSet/>
-      <dgm:spPr/>
-      <dgm:t>
-        <a:bodyPr/>
-        <a:lstStyle/>
-        <a:p>
-          <a:pPr rtl="0"/>
-          <a:endParaRPr lang="en-CA" dirty="0"/>
-        </a:p>
-      </dgm:t>
-    </dgm:pt>
-    <dgm:pt modelId="{7201A05E-2B57-4CF9-ACBE-23F49957ECB8}" type="sibTrans" cxnId="{FE9CE332-0D3F-40CA-ACBB-B0310EF62EFA}">
-      <dgm:prSet/>
-      <dgm:spPr/>
-      <dgm:t>
-        <a:bodyPr/>
-        <a:lstStyle/>
-        <a:p>
-          <a:endParaRPr lang="en-US"/>
-        </a:p>
-      </dgm:t>
-    </dgm:pt>
-    <dgm:pt modelId="{A79F7ACB-2EBD-4C58-B88A-3122BD38A247}" type="parTrans" cxnId="{FE9CE332-0D3F-40CA-ACBB-B0310EF62EFA}">
-      <dgm:prSet/>
-      <dgm:spPr/>
-      <dgm:t>
-        <a:bodyPr/>
-        <a:lstStyle/>
-        <a:p>
-          <a:endParaRPr lang="en-US"/>
-        </a:p>
-      </dgm:t>
-    </dgm:pt>
-    <dgm:pt modelId="{309791AC-9DE5-4BF5-BA79-2E143B073D25}" type="pres">
-      <dgm:prSet presAssocID="{9CA579DE-A93E-48B2-9CD1-2521E6D634DC}" presName="hierChild1" presStyleCnt="0">
-        <dgm:presLayoutVars>
-          <dgm:chPref val="1"/>
-          <dgm:dir/>
-          <dgm:animOne val="branch"/>
-          <dgm:animLvl val="lvl"/>
-          <dgm:resizeHandles/>
-        </dgm:presLayoutVars>
-      </dgm:prSet>
-      <dgm:spPr/>
-    </dgm:pt>
-    <dgm:pt modelId="{C1F7BA30-5EF8-4707-97FB-0F3DD79ECD36}" type="pres">
-      <dgm:prSet presAssocID="{C5E47A78-B1BC-49ED-B479-E45C90893A27}" presName="hierRoot1" presStyleCnt="0"/>
-      <dgm:spPr/>
-    </dgm:pt>
-    <dgm:pt modelId="{EAB2BBC5-D8D8-4157-B2FD-D1352E5D607E}" type="pres">
-      <dgm:prSet presAssocID="{C5E47A78-B1BC-49ED-B479-E45C90893A27}" presName="composite" presStyleCnt="0"/>
-      <dgm:spPr/>
-    </dgm:pt>
-    <dgm:pt modelId="{E2061931-1133-49B7-966A-5C48DA18B289}" type="pres">
-      <dgm:prSet presAssocID="{C5E47A78-B1BC-49ED-B479-E45C90893A27}" presName="background" presStyleLbl="node0" presStyleIdx="0" presStyleCnt="1"/>
-      <dgm:spPr>
-        <a:gradFill rotWithShape="0">
-          <a:gsLst>
-            <a:gs pos="0">
-              <a:schemeClr val="accent2"/>
-            </a:gs>
-            <a:gs pos="100000">
-              <a:srgbClr val="3494BA"/>
-            </a:gs>
-          </a:gsLst>
-        </a:gradFill>
-      </dgm:spPr>
-    </dgm:pt>
-    <dgm:pt modelId="{6BCA3583-F2EE-4F29-9BB8-73E7F05E14E7}" type="pres">
-      <dgm:prSet presAssocID="{C5E47A78-B1BC-49ED-B479-E45C90893A27}" presName="text" presStyleLbl="fgAcc0" presStyleIdx="0" presStyleCnt="1">
-        <dgm:presLayoutVars>
-          <dgm:chPref val="3"/>
-        </dgm:presLayoutVars>
-      </dgm:prSet>
-      <dgm:spPr/>
-    </dgm:pt>
-    <dgm:pt modelId="{CCCBB3B1-213F-450E-BF51-DAE805A9DB82}" type="pres">
-      <dgm:prSet presAssocID="{C5E47A78-B1BC-49ED-B479-E45C90893A27}" presName="hierChild2" presStyleCnt="0"/>
-      <dgm:spPr/>
-    </dgm:pt>
-    <dgm:pt modelId="{F634F8B6-5083-477F-9341-AE8578EEED75}" type="pres">
-      <dgm:prSet presAssocID="{B336F9C0-57C8-4CC0-8F06-2CBF372BA6CC}" presName="Name10" presStyleLbl="parChTrans1D2" presStyleIdx="0" presStyleCnt="4"/>
-      <dgm:spPr/>
-    </dgm:pt>
-    <dgm:pt modelId="{B4B1C8CD-4818-4EE8-AD74-67D35C8476FC}" type="pres">
-      <dgm:prSet presAssocID="{0BA85747-B763-4262-844C-3C86CB33DC12}" presName="hierRoot2" presStyleCnt="0"/>
-      <dgm:spPr/>
-    </dgm:pt>
-    <dgm:pt modelId="{ED507FEB-9B00-421D-8C69-EB1A2EF1C9E7}" type="pres">
-      <dgm:prSet presAssocID="{0BA85747-B763-4262-844C-3C86CB33DC12}" presName="composite2" presStyleCnt="0"/>
-      <dgm:spPr/>
-    </dgm:pt>
-    <dgm:pt modelId="{D254E614-51DE-41DD-A98C-60D49618BD9E}" type="pres">
-      <dgm:prSet presAssocID="{0BA85747-B763-4262-844C-3C86CB33DC12}" presName="background2" presStyleLbl="node2" presStyleIdx="0" presStyleCnt="4"/>
-      <dgm:spPr>
-        <a:gradFill rotWithShape="0">
-          <a:gsLst>
-            <a:gs pos="0">
-              <a:schemeClr val="accent2"/>
-            </a:gs>
-            <a:gs pos="100000">
-              <a:schemeClr val="accent1"/>
-            </a:gs>
-          </a:gsLst>
-        </a:gradFill>
-      </dgm:spPr>
-    </dgm:pt>
-    <dgm:pt modelId="{933AD797-2624-48BE-80CA-A9F7328F5C03}" type="pres">
-      <dgm:prSet presAssocID="{0BA85747-B763-4262-844C-3C86CB33DC12}" presName="text2" presStyleLbl="fgAcc2" presStyleIdx="0" presStyleCnt="4">
-        <dgm:presLayoutVars>
-          <dgm:chPref val="3"/>
-        </dgm:presLayoutVars>
-      </dgm:prSet>
-      <dgm:spPr/>
-    </dgm:pt>
-    <dgm:pt modelId="{571CF3A5-91F5-4462-A2B2-F3124910C753}" type="pres">
-      <dgm:prSet presAssocID="{0BA85747-B763-4262-844C-3C86CB33DC12}" presName="hierChild3" presStyleCnt="0"/>
-      <dgm:spPr/>
-    </dgm:pt>
-    <dgm:pt modelId="{5A6404FA-08A5-483E-BBFA-17014294FA20}" type="pres">
-      <dgm:prSet presAssocID="{574F32AB-A4FB-448C-928E-82162318F1A1}" presName="Name10" presStyleLbl="parChTrans1D2" presStyleIdx="1" presStyleCnt="4"/>
-      <dgm:spPr/>
-    </dgm:pt>
-    <dgm:pt modelId="{A4AB5932-0860-4665-9017-6DC1427BEFBB}" type="pres">
-      <dgm:prSet presAssocID="{D3DC05D5-D571-4CE6-A969-C4107A775C2F}" presName="hierRoot2" presStyleCnt="0"/>
-      <dgm:spPr/>
-    </dgm:pt>
-    <dgm:pt modelId="{BF1BA149-BFE3-4FDB-817E-C5CEB55C6A62}" type="pres">
-      <dgm:prSet presAssocID="{D3DC05D5-D571-4CE6-A969-C4107A775C2F}" presName="composite2" presStyleCnt="0"/>
-      <dgm:spPr/>
-    </dgm:pt>
-    <dgm:pt modelId="{416329E6-4A05-4BEF-86B2-9D39C76BB316}" type="pres">
-      <dgm:prSet presAssocID="{D3DC05D5-D571-4CE6-A969-C4107A775C2F}" presName="background2" presStyleLbl="node2" presStyleIdx="1" presStyleCnt="4"/>
-      <dgm:spPr>
-        <a:gradFill rotWithShape="0">
-          <a:gsLst>
-            <a:gs pos="0">
-              <a:schemeClr val="accent2"/>
-            </a:gs>
-            <a:gs pos="100000">
-              <a:schemeClr val="accent1"/>
-            </a:gs>
-          </a:gsLst>
-        </a:gradFill>
-      </dgm:spPr>
-    </dgm:pt>
-    <dgm:pt modelId="{0D418E03-7754-4070-ABCC-0A3F3437E261}" type="pres">
-      <dgm:prSet presAssocID="{D3DC05D5-D571-4CE6-A969-C4107A775C2F}" presName="text2" presStyleLbl="fgAcc2" presStyleIdx="1" presStyleCnt="4">
-        <dgm:presLayoutVars>
-          <dgm:chPref val="3"/>
-        </dgm:presLayoutVars>
-      </dgm:prSet>
-      <dgm:spPr/>
-    </dgm:pt>
-    <dgm:pt modelId="{86F36E7D-4924-4B98-9ACB-CB535398A5C8}" type="pres">
-      <dgm:prSet presAssocID="{D3DC05D5-D571-4CE6-A969-C4107A775C2F}" presName="hierChild3" presStyleCnt="0"/>
-      <dgm:spPr/>
-    </dgm:pt>
-    <dgm:pt modelId="{9C88C740-4A78-4D73-89EB-43FA7F486EB3}" type="pres">
-      <dgm:prSet presAssocID="{A7BBF5C9-DD31-4066-8A48-78F3F28E2FA8}" presName="Name10" presStyleLbl="parChTrans1D2" presStyleIdx="2" presStyleCnt="4"/>
-      <dgm:spPr/>
-    </dgm:pt>
-    <dgm:pt modelId="{39BFB92A-123D-409A-96D3-50D5F206DBC0}" type="pres">
-      <dgm:prSet presAssocID="{F4A0169D-9645-450F-81A6-C46C020F7444}" presName="hierRoot2" presStyleCnt="0"/>
-      <dgm:spPr/>
-    </dgm:pt>
-    <dgm:pt modelId="{224F5C4D-FC1B-49E8-9EF5-7D96D8BB1027}" type="pres">
-      <dgm:prSet presAssocID="{F4A0169D-9645-450F-81A6-C46C020F7444}" presName="composite2" presStyleCnt="0"/>
-      <dgm:spPr/>
-    </dgm:pt>
-    <dgm:pt modelId="{73F9CB8B-CFC2-47BF-86D0-78931921DB26}" type="pres">
-      <dgm:prSet presAssocID="{F4A0169D-9645-450F-81A6-C46C020F7444}" presName="background2" presStyleLbl="node2" presStyleIdx="2" presStyleCnt="4"/>
-      <dgm:spPr>
-        <a:gradFill rotWithShape="0">
-          <a:gsLst>
-            <a:gs pos="0">
-              <a:schemeClr val="accent2"/>
-            </a:gs>
-            <a:gs pos="100000">
-              <a:schemeClr val="accent1"/>
-            </a:gs>
-          </a:gsLst>
-        </a:gradFill>
-      </dgm:spPr>
-    </dgm:pt>
-    <dgm:pt modelId="{A358A23E-A6BE-48A9-B175-8861366412D8}" type="pres">
-      <dgm:prSet presAssocID="{F4A0169D-9645-450F-81A6-C46C020F7444}" presName="text2" presStyleLbl="fgAcc2" presStyleIdx="2" presStyleCnt="4">
-        <dgm:presLayoutVars>
-          <dgm:chPref val="3"/>
-        </dgm:presLayoutVars>
-      </dgm:prSet>
-      <dgm:spPr/>
-    </dgm:pt>
-    <dgm:pt modelId="{2FFE4872-719C-4DB1-ABDB-CE44E43B3A7D}" type="pres">
-      <dgm:prSet presAssocID="{F4A0169D-9645-450F-81A6-C46C020F7444}" presName="hierChild3" presStyleCnt="0"/>
-      <dgm:spPr/>
-    </dgm:pt>
-    <dgm:pt modelId="{F6D35208-E0DC-465D-B3BC-ED0B53669263}" type="pres">
-      <dgm:prSet presAssocID="{2EEB5A0C-68E6-4CB0-9AA3-9AF659F4729C}" presName="Name10" presStyleLbl="parChTrans1D2" presStyleIdx="3" presStyleCnt="4"/>
-      <dgm:spPr/>
-    </dgm:pt>
-    <dgm:pt modelId="{98F74B0F-AAE5-470F-9A8E-001E671811C0}" type="pres">
-      <dgm:prSet presAssocID="{B76C14AF-A087-4230-8732-4CB827EDE1FD}" presName="hierRoot2" presStyleCnt="0"/>
-      <dgm:spPr/>
-    </dgm:pt>
-    <dgm:pt modelId="{191A0CA8-5E88-4879-ABDF-40FA4CCCCF50}" type="pres">
-      <dgm:prSet presAssocID="{B76C14AF-A087-4230-8732-4CB827EDE1FD}" presName="composite2" presStyleCnt="0"/>
-      <dgm:spPr/>
-    </dgm:pt>
-    <dgm:pt modelId="{F3FD4A43-023D-4EEF-A00E-665A6FE74398}" type="pres">
-      <dgm:prSet presAssocID="{B76C14AF-A087-4230-8732-4CB827EDE1FD}" presName="background2" presStyleLbl="node2" presStyleIdx="3" presStyleCnt="4"/>
-      <dgm:spPr>
-        <a:gradFill rotWithShape="0">
-          <a:gsLst>
-            <a:gs pos="0">
-              <a:schemeClr val="accent2"/>
-            </a:gs>
-            <a:gs pos="100000">
-              <a:schemeClr val="accent1"/>
-            </a:gs>
-          </a:gsLst>
-        </a:gradFill>
-      </dgm:spPr>
-    </dgm:pt>
-    <dgm:pt modelId="{6C852CE4-C864-4134-A035-CD38D8DF4EE4}" type="pres">
-      <dgm:prSet presAssocID="{B76C14AF-A087-4230-8732-4CB827EDE1FD}" presName="text2" presStyleLbl="fgAcc2" presStyleIdx="3" presStyleCnt="4">
-        <dgm:presLayoutVars>
-          <dgm:chPref val="3"/>
-        </dgm:presLayoutVars>
-      </dgm:prSet>
-      <dgm:spPr/>
-    </dgm:pt>
-    <dgm:pt modelId="{6BE976D8-2A8B-4EF7-8718-91EFB2514D96}" type="pres">
-      <dgm:prSet presAssocID="{B76C14AF-A087-4230-8732-4CB827EDE1FD}" presName="hierChild3" presStyleCnt="0"/>
-      <dgm:spPr/>
-    </dgm:pt>
-  </dgm:ptLst>
-  <dgm:cxnLst>
-    <dgm:cxn modelId="{4280CB11-E3F5-4F40-A94F-06B0B98C2961}" type="presOf" srcId="{2EEB5A0C-68E6-4CB0-9AA3-9AF659F4729C}" destId="{F6D35208-E0DC-465D-B3BC-ED0B53669263}" srcOrd="0" destOrd="0" presId="urn:microsoft.com/office/officeart/2005/8/layout/hierarchy1"/>
-    <dgm:cxn modelId="{7BA9CA30-07A0-42CD-B8C4-7B1B104D27FD}" type="presOf" srcId="{0BA85747-B763-4262-844C-3C86CB33DC12}" destId="{933AD797-2624-48BE-80CA-A9F7328F5C03}" srcOrd="0" destOrd="0" presId="urn:microsoft.com/office/officeart/2005/8/layout/hierarchy1"/>
-    <dgm:cxn modelId="{FE9CE332-0D3F-40CA-ACBB-B0310EF62EFA}" srcId="{9CA579DE-A93E-48B2-9CD1-2521E6D634DC}" destId="{C5E47A78-B1BC-49ED-B479-E45C90893A27}" srcOrd="0" destOrd="0" parTransId="{A79F7ACB-2EBD-4C58-B88A-3122BD38A247}" sibTransId="{7201A05E-2B57-4CF9-ACBE-23F49957ECB8}"/>
-    <dgm:cxn modelId="{D5587936-FC03-4884-9E60-849BE3DF3D96}" srcId="{C5E47A78-B1BC-49ED-B479-E45C90893A27}" destId="{B76C14AF-A087-4230-8732-4CB827EDE1FD}" srcOrd="3" destOrd="0" parTransId="{2EEB5A0C-68E6-4CB0-9AA3-9AF659F4729C}" sibTransId="{C39D7428-A4EE-41DF-84F6-BE543385B0DE}"/>
-    <dgm:cxn modelId="{1062233F-DCA8-4E70-9A6B-66BDFACC82ED}" srcId="{C5E47A78-B1BC-49ED-B479-E45C90893A27}" destId="{F4A0169D-9645-450F-81A6-C46C020F7444}" srcOrd="2" destOrd="0" parTransId="{A7BBF5C9-DD31-4066-8A48-78F3F28E2FA8}" sibTransId="{D1F9A2AE-2CCE-4A2B-A899-EE5AE1EE47FE}"/>
-    <dgm:cxn modelId="{6B21E33F-C2B4-481B-B574-2CB03890910D}" type="presOf" srcId="{B336F9C0-57C8-4CC0-8F06-2CBF372BA6CC}" destId="{F634F8B6-5083-477F-9341-AE8578EEED75}" srcOrd="0" destOrd="0" presId="urn:microsoft.com/office/officeart/2005/8/layout/hierarchy1"/>
-    <dgm:cxn modelId="{B5A9A143-1C83-4C9E-9120-85FE52E6E13E}" type="presOf" srcId="{B76C14AF-A087-4230-8732-4CB827EDE1FD}" destId="{6C852CE4-C864-4134-A035-CD38D8DF4EE4}" srcOrd="0" destOrd="0" presId="urn:microsoft.com/office/officeart/2005/8/layout/hierarchy1"/>
-    <dgm:cxn modelId="{DD896A45-58F9-48CD-BBF2-C7A9B71EFB3D}" srcId="{C5E47A78-B1BC-49ED-B479-E45C90893A27}" destId="{D3DC05D5-D571-4CE6-A969-C4107A775C2F}" srcOrd="1" destOrd="0" parTransId="{574F32AB-A4FB-448C-928E-82162318F1A1}" sibTransId="{8FFCFB89-5390-4082-AABF-D64E5F2E378B}"/>
-    <dgm:cxn modelId="{F2F00D6B-6D5A-4AAB-BC83-8694FADBCB76}" type="presOf" srcId="{D3DC05D5-D571-4CE6-A969-C4107A775C2F}" destId="{0D418E03-7754-4070-ABCC-0A3F3437E261}" srcOrd="0" destOrd="0" presId="urn:microsoft.com/office/officeart/2005/8/layout/hierarchy1"/>
-    <dgm:cxn modelId="{F800DA4F-9AD4-470B-9581-8A7496290DC9}" type="presOf" srcId="{A7BBF5C9-DD31-4066-8A48-78F3F28E2FA8}" destId="{9C88C740-4A78-4D73-89EB-43FA7F486EB3}" srcOrd="0" destOrd="0" presId="urn:microsoft.com/office/officeart/2005/8/layout/hierarchy1"/>
-    <dgm:cxn modelId="{3046B993-1F1D-4EA2-8F0E-46AD88AC15FF}" srcId="{C5E47A78-B1BC-49ED-B479-E45C90893A27}" destId="{0BA85747-B763-4262-844C-3C86CB33DC12}" srcOrd="0" destOrd="0" parTransId="{B336F9C0-57C8-4CC0-8F06-2CBF372BA6CC}" sibTransId="{AA148616-5F40-4D58-9743-C7BC347F9015}"/>
-    <dgm:cxn modelId="{C34375CF-D15E-4F70-A0EC-01819031A682}" type="presOf" srcId="{574F32AB-A4FB-448C-928E-82162318F1A1}" destId="{5A6404FA-08A5-483E-BBFA-17014294FA20}" srcOrd="0" destOrd="0" presId="urn:microsoft.com/office/officeart/2005/8/layout/hierarchy1"/>
-    <dgm:cxn modelId="{F6BC51ED-5DA9-4BA9-93B5-A98D8AD3B9E3}" type="presOf" srcId="{9CA579DE-A93E-48B2-9CD1-2521E6D634DC}" destId="{309791AC-9DE5-4BF5-BA79-2E143B073D25}" srcOrd="0" destOrd="0" presId="urn:microsoft.com/office/officeart/2005/8/layout/hierarchy1"/>
-    <dgm:cxn modelId="{E3CE6FFA-DE60-4696-8D7F-A9020C60F771}" type="presOf" srcId="{F4A0169D-9645-450F-81A6-C46C020F7444}" destId="{A358A23E-A6BE-48A9-B175-8861366412D8}" srcOrd="0" destOrd="0" presId="urn:microsoft.com/office/officeart/2005/8/layout/hierarchy1"/>
-    <dgm:cxn modelId="{26E5CBFA-667A-4427-83EF-F18BF3E7D3AB}" type="presOf" srcId="{C5E47A78-B1BC-49ED-B479-E45C90893A27}" destId="{6BCA3583-F2EE-4F29-9BB8-73E7F05E14E7}" srcOrd="0" destOrd="0" presId="urn:microsoft.com/office/officeart/2005/8/layout/hierarchy1"/>
-    <dgm:cxn modelId="{FD15C2B1-1239-4A39-B16E-DD1B4F62A6E8}" type="presParOf" srcId="{309791AC-9DE5-4BF5-BA79-2E143B073D25}" destId="{C1F7BA30-5EF8-4707-97FB-0F3DD79ECD36}" srcOrd="0" destOrd="0" presId="urn:microsoft.com/office/officeart/2005/8/layout/hierarchy1"/>
-    <dgm:cxn modelId="{ED2C10E8-D3D9-4B2C-BF1F-8FD9784087FA}" type="presParOf" srcId="{C1F7BA30-5EF8-4707-97FB-0F3DD79ECD36}" destId="{EAB2BBC5-D8D8-4157-B2FD-D1352E5D607E}" srcOrd="0" destOrd="0" presId="urn:microsoft.com/office/officeart/2005/8/layout/hierarchy1"/>
-    <dgm:cxn modelId="{BCC80652-6234-496D-8CC5-C72FE02D38B8}" type="presParOf" srcId="{EAB2BBC5-D8D8-4157-B2FD-D1352E5D607E}" destId="{E2061931-1133-49B7-966A-5C48DA18B289}" srcOrd="0" destOrd="0" presId="urn:microsoft.com/office/officeart/2005/8/layout/hierarchy1"/>
-    <dgm:cxn modelId="{33B2345F-8F30-48EE-ADE6-A36C5EEC4FF6}" type="presParOf" srcId="{EAB2BBC5-D8D8-4157-B2FD-D1352E5D607E}" destId="{6BCA3583-F2EE-4F29-9BB8-73E7F05E14E7}" srcOrd="1" destOrd="0" presId="urn:microsoft.com/office/officeart/2005/8/layout/hierarchy1"/>
-    <dgm:cxn modelId="{C44BEB1D-8D11-48BF-AC0F-8E6FBABA9E48}" type="presParOf" srcId="{C1F7BA30-5EF8-4707-97FB-0F3DD79ECD36}" destId="{CCCBB3B1-213F-450E-BF51-DAE805A9DB82}" srcOrd="1" destOrd="0" presId="urn:microsoft.com/office/officeart/2005/8/layout/hierarchy1"/>
-    <dgm:cxn modelId="{7EFD1102-B804-44CB-92E3-FB96AEE110A3}" type="presParOf" srcId="{CCCBB3B1-213F-450E-BF51-DAE805A9DB82}" destId="{F634F8B6-5083-477F-9341-AE8578EEED75}" srcOrd="0" destOrd="0" presId="urn:microsoft.com/office/officeart/2005/8/layout/hierarchy1"/>
-    <dgm:cxn modelId="{2C0B700A-ED65-4D9D-9B88-590221B2656E}" type="presParOf" srcId="{CCCBB3B1-213F-450E-BF51-DAE805A9DB82}" destId="{B4B1C8CD-4818-4EE8-AD74-67D35C8476FC}" srcOrd="1" destOrd="0" presId="urn:microsoft.com/office/officeart/2005/8/layout/hierarchy1"/>
-    <dgm:cxn modelId="{31696805-0762-49E2-88B6-B837730E41B7}" type="presParOf" srcId="{B4B1C8CD-4818-4EE8-AD74-67D35C8476FC}" destId="{ED507FEB-9B00-421D-8C69-EB1A2EF1C9E7}" srcOrd="0" destOrd="0" presId="urn:microsoft.com/office/officeart/2005/8/layout/hierarchy1"/>
-    <dgm:cxn modelId="{643EA790-AC55-4DE3-8D24-05B42B87E571}" type="presParOf" srcId="{ED507FEB-9B00-421D-8C69-EB1A2EF1C9E7}" destId="{D254E614-51DE-41DD-A98C-60D49618BD9E}" srcOrd="0" destOrd="0" presId="urn:microsoft.com/office/officeart/2005/8/layout/hierarchy1"/>
-    <dgm:cxn modelId="{5F2C0C93-785F-43FD-889F-3158E1242C60}" type="presParOf" srcId="{ED507FEB-9B00-421D-8C69-EB1A2EF1C9E7}" destId="{933AD797-2624-48BE-80CA-A9F7328F5C03}" srcOrd="1" destOrd="0" presId="urn:microsoft.com/office/officeart/2005/8/layout/hierarchy1"/>
-    <dgm:cxn modelId="{2163897C-163B-45E3-B598-2110474253A7}" type="presParOf" srcId="{B4B1C8CD-4818-4EE8-AD74-67D35C8476FC}" destId="{571CF3A5-91F5-4462-A2B2-F3124910C753}" srcOrd="1" destOrd="0" presId="urn:microsoft.com/office/officeart/2005/8/layout/hierarchy1"/>
-    <dgm:cxn modelId="{C4B98888-A9B8-4D4D-BF92-4E0F37A281D2}" type="presParOf" srcId="{CCCBB3B1-213F-450E-BF51-DAE805A9DB82}" destId="{5A6404FA-08A5-483E-BBFA-17014294FA20}" srcOrd="2" destOrd="0" presId="urn:microsoft.com/office/officeart/2005/8/layout/hierarchy1"/>
-    <dgm:cxn modelId="{9D1D7E98-A692-432B-9378-607C6013114F}" type="presParOf" srcId="{CCCBB3B1-213F-450E-BF51-DAE805A9DB82}" destId="{A4AB5932-0860-4665-9017-6DC1427BEFBB}" srcOrd="3" destOrd="0" presId="urn:microsoft.com/office/officeart/2005/8/layout/hierarchy1"/>
-    <dgm:cxn modelId="{7AC51216-D004-4B06-B724-4EA44B283EA1}" type="presParOf" srcId="{A4AB5932-0860-4665-9017-6DC1427BEFBB}" destId="{BF1BA149-BFE3-4FDB-817E-C5CEB55C6A62}" srcOrd="0" destOrd="0" presId="urn:microsoft.com/office/officeart/2005/8/layout/hierarchy1"/>
-    <dgm:cxn modelId="{DFB4BD34-AB3C-473B-9812-31BC79096065}" type="presParOf" srcId="{BF1BA149-BFE3-4FDB-817E-C5CEB55C6A62}" destId="{416329E6-4A05-4BEF-86B2-9D39C76BB316}" srcOrd="0" destOrd="0" presId="urn:microsoft.com/office/officeart/2005/8/layout/hierarchy1"/>
-    <dgm:cxn modelId="{C0437F52-0DFF-4E43-B4A3-4CED1710E82A}" type="presParOf" srcId="{BF1BA149-BFE3-4FDB-817E-C5CEB55C6A62}" destId="{0D418E03-7754-4070-ABCC-0A3F3437E261}" srcOrd="1" destOrd="0" presId="urn:microsoft.com/office/officeart/2005/8/layout/hierarchy1"/>
-    <dgm:cxn modelId="{030E7EA2-886B-4EB0-883C-B7502F4A143F}" type="presParOf" srcId="{A4AB5932-0860-4665-9017-6DC1427BEFBB}" destId="{86F36E7D-4924-4B98-9ACB-CB535398A5C8}" srcOrd="1" destOrd="0" presId="urn:microsoft.com/office/officeart/2005/8/layout/hierarchy1"/>
-    <dgm:cxn modelId="{E309AED5-A7B3-4B30-9AC2-ECBB96B5EE94}" type="presParOf" srcId="{CCCBB3B1-213F-450E-BF51-DAE805A9DB82}" destId="{9C88C740-4A78-4D73-89EB-43FA7F486EB3}" srcOrd="4" destOrd="0" presId="urn:microsoft.com/office/officeart/2005/8/layout/hierarchy1"/>
-    <dgm:cxn modelId="{17B2A5B2-1F3A-45E8-A0C0-FE872CA874B2}" type="presParOf" srcId="{CCCBB3B1-213F-450E-BF51-DAE805A9DB82}" destId="{39BFB92A-123D-409A-96D3-50D5F206DBC0}" srcOrd="5" destOrd="0" presId="urn:microsoft.com/office/officeart/2005/8/layout/hierarchy1"/>
-    <dgm:cxn modelId="{BEF086F4-ED62-4058-A2C2-511E82DEFB27}" type="presParOf" srcId="{39BFB92A-123D-409A-96D3-50D5F206DBC0}" destId="{224F5C4D-FC1B-49E8-9EF5-7D96D8BB1027}" srcOrd="0" destOrd="0" presId="urn:microsoft.com/office/officeart/2005/8/layout/hierarchy1"/>
-    <dgm:cxn modelId="{016D89A8-8FB7-4EE9-95CC-6D48264C82C0}" type="presParOf" srcId="{224F5C4D-FC1B-49E8-9EF5-7D96D8BB1027}" destId="{73F9CB8B-CFC2-47BF-86D0-78931921DB26}" srcOrd="0" destOrd="0" presId="urn:microsoft.com/office/officeart/2005/8/layout/hierarchy1"/>
-    <dgm:cxn modelId="{2406C3F4-B495-429D-9C62-9B0E09EE7182}" type="presParOf" srcId="{224F5C4D-FC1B-49E8-9EF5-7D96D8BB1027}" destId="{A358A23E-A6BE-48A9-B175-8861366412D8}" srcOrd="1" destOrd="0" presId="urn:microsoft.com/office/officeart/2005/8/layout/hierarchy1"/>
-    <dgm:cxn modelId="{FC0686EB-F329-4F58-A0B1-9D0B6490BE08}" type="presParOf" srcId="{39BFB92A-123D-409A-96D3-50D5F206DBC0}" destId="{2FFE4872-719C-4DB1-ABDB-CE44E43B3A7D}" srcOrd="1" destOrd="0" presId="urn:microsoft.com/office/officeart/2005/8/layout/hierarchy1"/>
-    <dgm:cxn modelId="{E23623FC-2F2F-4D4A-B6E1-369AC13099C4}" type="presParOf" srcId="{CCCBB3B1-213F-450E-BF51-DAE805A9DB82}" destId="{F6D35208-E0DC-465D-B3BC-ED0B53669263}" srcOrd="6" destOrd="0" presId="urn:microsoft.com/office/officeart/2005/8/layout/hierarchy1"/>
-    <dgm:cxn modelId="{92D9A921-0B0C-4B52-B2D3-AB178A65E2BF}" type="presParOf" srcId="{CCCBB3B1-213F-450E-BF51-DAE805A9DB82}" destId="{98F74B0F-AAE5-470F-9A8E-001E671811C0}" srcOrd="7" destOrd="0" presId="urn:microsoft.com/office/officeart/2005/8/layout/hierarchy1"/>
-    <dgm:cxn modelId="{2DA5F0C7-8AC0-4899-836C-E027B6A19720}" type="presParOf" srcId="{98F74B0F-AAE5-470F-9A8E-001E671811C0}" destId="{191A0CA8-5E88-4879-ABDF-40FA4CCCCF50}" srcOrd="0" destOrd="0" presId="urn:microsoft.com/office/officeart/2005/8/layout/hierarchy1"/>
-    <dgm:cxn modelId="{DFB6956C-8447-4BFF-BA4E-08B031384CA6}" type="presParOf" srcId="{191A0CA8-5E88-4879-ABDF-40FA4CCCCF50}" destId="{F3FD4A43-023D-4EEF-A00E-665A6FE74398}" srcOrd="0" destOrd="0" presId="urn:microsoft.com/office/officeart/2005/8/layout/hierarchy1"/>
-    <dgm:cxn modelId="{F8E9D5AB-591F-45BC-B701-85F952130D33}" type="presParOf" srcId="{191A0CA8-5E88-4879-ABDF-40FA4CCCCF50}" destId="{6C852CE4-C864-4134-A035-CD38D8DF4EE4}" srcOrd="1" destOrd="0" presId="urn:microsoft.com/office/officeart/2005/8/layout/hierarchy1"/>
-    <dgm:cxn modelId="{14FA8939-95CA-487D-B268-69882A372A55}" type="presParOf" srcId="{98F74B0F-AAE5-470F-9A8E-001E671811C0}" destId="{6BE976D8-2A8B-4EF7-8718-91EFB2514D96}" srcOrd="1" destOrd="0" presId="urn:microsoft.com/office/officeart/2005/8/layout/hierarchy1"/>
-  </dgm:cxnLst>
-  <dgm:bg/>
-  <dgm:whole/>
-  <dgm:extLst>
-    <a:ext uri="http://schemas.microsoft.com/office/drawing/2008/diagram">
-      <dsp:dataModelExt xmlns:dsp="http://schemas.microsoft.com/office/drawing/2008/diagram" relId="rId6" minVer="http://schemas.openxmlformats.org/drawingml/2006/diagram"/>
-    </a:ext>
-  </dgm:extLst>
-</dgm:dataModel>
-</file>
-
-<file path=ppt/diagrams/drawing1.xml><?xml version="1.0" encoding="utf-8"?>
-<dsp:drawing xmlns:dgm="http://schemas.openxmlformats.org/drawingml/2006/diagram" xmlns:dsp="http://schemas.microsoft.com/office/drawing/2008/diagram" xmlns:a="http://schemas.openxmlformats.org/drawingml/2006/main">
-  <dsp:spTree>
-    <dsp:nvGrpSpPr>
-      <dsp:cNvPr id="0" name=""/>
-      <dsp:cNvGrpSpPr/>
-    </dsp:nvGrpSpPr>
-    <dsp:grpSpPr/>
-    <dsp:sp modelId="{F6D35208-E0DC-465D-B3BC-ED0B53669263}">
-      <dsp:nvSpPr>
-        <dsp:cNvPr id="0" name=""/>
-        <dsp:cNvSpPr/>
-      </dsp:nvSpPr>
-      <dsp:spPr>
-        <a:xfrm>
-          <a:off x="5588373" y="1973530"/>
-          <a:ext cx="4388230" cy="696132"/>
-        </a:xfrm>
-        <a:custGeom>
-          <a:avLst/>
-          <a:gdLst/>
-          <a:ahLst/>
-          <a:cxnLst/>
-          <a:rect l="0" t="0" r="0" b="0"/>
-          <a:pathLst>
-            <a:path>
-              <a:moveTo>
-                <a:pt x="0" y="0"/>
-              </a:moveTo>
-              <a:lnTo>
-                <a:pt x="0" y="474394"/>
-              </a:lnTo>
-              <a:lnTo>
-                <a:pt x="4388230" y="474394"/>
-              </a:lnTo>
-              <a:lnTo>
-                <a:pt x="4388230" y="696132"/>
-              </a:lnTo>
-            </a:path>
-          </a:pathLst>
-        </a:custGeom>
-        <a:noFill/>
-        <a:ln w="9525" cap="flat" cmpd="sng" algn="ctr">
-          <a:solidFill>
-            <a:schemeClr val="accent1">
-              <a:shade val="60000"/>
-              <a:hueOff val="0"/>
-              <a:satOff val="0"/>
-              <a:lumOff val="0"/>
-              <a:alphaOff val="0"/>
-            </a:schemeClr>
-          </a:solidFill>
-          <a:prstDash val="solid"/>
-        </a:ln>
-        <a:effectLst/>
-      </dsp:spPr>
-      <dsp:style>
-        <a:lnRef idx="1">
-          <a:scrgbClr r="0" g="0" b="0"/>
-        </a:lnRef>
-        <a:fillRef idx="0">
-          <a:scrgbClr r="0" g="0" b="0"/>
-        </a:fillRef>
-        <a:effectRef idx="0">
-          <a:scrgbClr r="0" g="0" b="0"/>
-        </a:effectRef>
-        <a:fontRef idx="minor"/>
-      </dsp:style>
-    </dsp:sp>
-    <dsp:sp modelId="{9C88C740-4A78-4D73-89EB-43FA7F486EB3}">
-      <dsp:nvSpPr>
-        <dsp:cNvPr id="0" name=""/>
-        <dsp:cNvSpPr/>
-      </dsp:nvSpPr>
-      <dsp:spPr>
-        <a:xfrm>
-          <a:off x="5588373" y="1973530"/>
-          <a:ext cx="1462743" cy="696132"/>
-        </a:xfrm>
-        <a:custGeom>
-          <a:avLst/>
-          <a:gdLst/>
-          <a:ahLst/>
-          <a:cxnLst/>
-          <a:rect l="0" t="0" r="0" b="0"/>
-          <a:pathLst>
-            <a:path>
-              <a:moveTo>
-                <a:pt x="0" y="0"/>
-              </a:moveTo>
-              <a:lnTo>
-                <a:pt x="0" y="474394"/>
-              </a:lnTo>
-              <a:lnTo>
-                <a:pt x="1462743" y="474394"/>
-              </a:lnTo>
-              <a:lnTo>
-                <a:pt x="1462743" y="696132"/>
-              </a:lnTo>
-            </a:path>
-          </a:pathLst>
-        </a:custGeom>
-        <a:noFill/>
-        <a:ln w="9525" cap="flat" cmpd="sng" algn="ctr">
-          <a:solidFill>
-            <a:schemeClr val="accent1">
-              <a:shade val="60000"/>
-              <a:hueOff val="0"/>
-              <a:satOff val="0"/>
-              <a:lumOff val="0"/>
-              <a:alphaOff val="0"/>
-            </a:schemeClr>
-          </a:solidFill>
-          <a:prstDash val="solid"/>
-        </a:ln>
-        <a:effectLst/>
-      </dsp:spPr>
-      <dsp:style>
-        <a:lnRef idx="1">
-          <a:scrgbClr r="0" g="0" b="0"/>
-        </a:lnRef>
-        <a:fillRef idx="0">
-          <a:scrgbClr r="0" g="0" b="0"/>
-        </a:fillRef>
-        <a:effectRef idx="0">
-          <a:scrgbClr r="0" g="0" b="0"/>
-        </a:effectRef>
-        <a:fontRef idx="minor"/>
-      </dsp:style>
-    </dsp:sp>
-    <dsp:sp modelId="{5A6404FA-08A5-483E-BBFA-17014294FA20}">
-      <dsp:nvSpPr>
-        <dsp:cNvPr id="0" name=""/>
-        <dsp:cNvSpPr/>
-      </dsp:nvSpPr>
-      <dsp:spPr>
-        <a:xfrm>
-          <a:off x="4125629" y="1973530"/>
-          <a:ext cx="1462743" cy="696132"/>
-        </a:xfrm>
-        <a:custGeom>
-          <a:avLst/>
-          <a:gdLst/>
-          <a:ahLst/>
-          <a:cxnLst/>
-          <a:rect l="0" t="0" r="0" b="0"/>
-          <a:pathLst>
-            <a:path>
-              <a:moveTo>
-                <a:pt x="1462743" y="0"/>
-              </a:moveTo>
-              <a:lnTo>
-                <a:pt x="1462743" y="474394"/>
-              </a:lnTo>
-              <a:lnTo>
-                <a:pt x="0" y="474394"/>
-              </a:lnTo>
-              <a:lnTo>
-                <a:pt x="0" y="696132"/>
-              </a:lnTo>
-            </a:path>
-          </a:pathLst>
-        </a:custGeom>
-        <a:noFill/>
-        <a:ln w="9525" cap="flat" cmpd="sng" algn="ctr">
-          <a:solidFill>
-            <a:schemeClr val="accent1">
-              <a:shade val="60000"/>
-              <a:hueOff val="0"/>
-              <a:satOff val="0"/>
-              <a:lumOff val="0"/>
-              <a:alphaOff val="0"/>
-            </a:schemeClr>
-          </a:solidFill>
-          <a:prstDash val="solid"/>
-        </a:ln>
-        <a:effectLst/>
-      </dsp:spPr>
-      <dsp:style>
-        <a:lnRef idx="1">
-          <a:scrgbClr r="0" g="0" b="0"/>
-        </a:lnRef>
-        <a:fillRef idx="0">
-          <a:scrgbClr r="0" g="0" b="0"/>
-        </a:fillRef>
-        <a:effectRef idx="0">
-          <a:scrgbClr r="0" g="0" b="0"/>
-        </a:effectRef>
-        <a:fontRef idx="minor"/>
-      </dsp:style>
-    </dsp:sp>
-    <dsp:sp modelId="{F634F8B6-5083-477F-9341-AE8578EEED75}">
-      <dsp:nvSpPr>
-        <dsp:cNvPr id="0" name=""/>
-        <dsp:cNvSpPr/>
-      </dsp:nvSpPr>
-      <dsp:spPr>
-        <a:xfrm>
-          <a:off x="1200142" y="1973530"/>
-          <a:ext cx="4388230" cy="696132"/>
-        </a:xfrm>
-        <a:custGeom>
-          <a:avLst/>
-          <a:gdLst/>
-          <a:ahLst/>
-          <a:cxnLst/>
-          <a:rect l="0" t="0" r="0" b="0"/>
-          <a:pathLst>
-            <a:path>
-              <a:moveTo>
-                <a:pt x="4388230" y="0"/>
-              </a:moveTo>
-              <a:lnTo>
-                <a:pt x="4388230" y="474394"/>
-              </a:lnTo>
-              <a:lnTo>
-                <a:pt x="0" y="474394"/>
-              </a:lnTo>
-              <a:lnTo>
-                <a:pt x="0" y="696132"/>
-              </a:lnTo>
-            </a:path>
-          </a:pathLst>
-        </a:custGeom>
-        <a:noFill/>
-        <a:ln w="9525" cap="flat" cmpd="sng" algn="ctr">
-          <a:solidFill>
-            <a:schemeClr val="accent1">
-              <a:shade val="60000"/>
-              <a:hueOff val="0"/>
-              <a:satOff val="0"/>
-              <a:lumOff val="0"/>
-              <a:alphaOff val="0"/>
-            </a:schemeClr>
-          </a:solidFill>
-          <a:prstDash val="solid"/>
-        </a:ln>
-        <a:effectLst/>
-      </dsp:spPr>
-      <dsp:style>
-        <a:lnRef idx="1">
-          <a:scrgbClr r="0" g="0" b="0"/>
-        </a:lnRef>
-        <a:fillRef idx="0">
-          <a:scrgbClr r="0" g="0" b="0"/>
-        </a:fillRef>
-        <a:effectRef idx="0">
-          <a:scrgbClr r="0" g="0" b="0"/>
-        </a:effectRef>
-        <a:fontRef idx="minor"/>
-      </dsp:style>
-    </dsp:sp>
-    <dsp:sp modelId="{E2061931-1133-49B7-966A-5C48DA18B289}">
-      <dsp:nvSpPr>
-        <dsp:cNvPr id="0" name=""/>
-        <dsp:cNvSpPr/>
-      </dsp:nvSpPr>
-      <dsp:spPr>
-        <a:xfrm>
-          <a:off x="4391583" y="453607"/>
-          <a:ext cx="2393580" cy="1519923"/>
-        </a:xfrm>
-        <a:prstGeom prst="roundRect">
-          <a:avLst>
-            <a:gd name="adj" fmla="val 10000"/>
-          </a:avLst>
-        </a:prstGeom>
-        <a:gradFill rotWithShape="0">
-          <a:gsLst>
-            <a:gs pos="0">
-              <a:schemeClr val="accent2"/>
-            </a:gs>
-            <a:gs pos="100000">
-              <a:srgbClr val="3494BA"/>
-            </a:gs>
-          </a:gsLst>
-          <a:lin ang="16200000" scaled="0"/>
-        </a:gradFill>
-        <a:ln>
-          <a:noFill/>
-        </a:ln>
-        <a:effectLst>
-          <a:outerShdw blurRad="40000" dist="23000" dir="5400000" rotWithShape="0">
-            <a:srgbClr val="000000">
-              <a:alpha val="35000"/>
-            </a:srgbClr>
-          </a:outerShdw>
-        </a:effectLst>
-      </dsp:spPr>
-      <dsp:style>
-        <a:lnRef idx="0">
-          <a:scrgbClr r="0" g="0" b="0"/>
-        </a:lnRef>
-        <a:fillRef idx="3">
-          <a:scrgbClr r="0" g="0" b="0"/>
-        </a:fillRef>
-        <a:effectRef idx="2">
-          <a:scrgbClr r="0" g="0" b="0"/>
-        </a:effectRef>
-        <a:fontRef idx="minor">
-          <a:schemeClr val="lt1"/>
-        </a:fontRef>
-      </dsp:style>
-    </dsp:sp>
-    <dsp:sp modelId="{6BCA3583-F2EE-4F29-9BB8-73E7F05E14E7}">
-      <dsp:nvSpPr>
-        <dsp:cNvPr id="0" name=""/>
-        <dsp:cNvSpPr/>
-      </dsp:nvSpPr>
-      <dsp:spPr>
-        <a:xfrm>
-          <a:off x="4657536" y="706262"/>
-          <a:ext cx="2393580" cy="1519923"/>
-        </a:xfrm>
-        <a:prstGeom prst="roundRect">
-          <a:avLst>
-            <a:gd name="adj" fmla="val 10000"/>
-          </a:avLst>
-        </a:prstGeom>
-        <a:solidFill>
-          <a:schemeClr val="lt1">
-            <a:alpha val="90000"/>
-            <a:hueOff val="0"/>
-            <a:satOff val="0"/>
-            <a:lumOff val="0"/>
-            <a:alphaOff val="0"/>
-          </a:schemeClr>
-        </a:solidFill>
-        <a:ln w="9525" cap="flat" cmpd="sng" algn="ctr">
-          <a:solidFill>
-            <a:schemeClr val="accent1">
-              <a:hueOff val="0"/>
-              <a:satOff val="0"/>
-              <a:lumOff val="0"/>
-              <a:alphaOff val="0"/>
-            </a:schemeClr>
-          </a:solidFill>
-          <a:prstDash val="solid"/>
-        </a:ln>
-        <a:effectLst/>
-      </dsp:spPr>
-      <dsp:style>
-        <a:lnRef idx="1">
-          <a:scrgbClr r="0" g="0" b="0"/>
-        </a:lnRef>
-        <a:fillRef idx="1">
-          <a:scrgbClr r="0" g="0" b="0"/>
-        </a:fillRef>
-        <a:effectRef idx="0">
-          <a:scrgbClr r="0" g="0" b="0"/>
-        </a:effectRef>
-        <a:fontRef idx="minor"/>
-      </dsp:style>
-      <dsp:txBody>
-        <a:bodyPr spcFirstLastPara="0" vert="horz" wrap="square" lIns="247650" tIns="247650" rIns="247650" bIns="247650" numCol="1" spcCol="1270" anchor="ctr" anchorCtr="0">
-          <a:noAutofit/>
-        </a:bodyPr>
-        <a:lstStyle/>
-        <a:p>
-          <a:pPr marL="0" lvl="0" indent="0" algn="ctr" defTabSz="2889250" rtl="0">
-            <a:lnSpc>
-              <a:spcPct val="90000"/>
-            </a:lnSpc>
-            <a:spcBef>
-              <a:spcPct val="0"/>
-            </a:spcBef>
-            <a:spcAft>
-              <a:spcPct val="35000"/>
-            </a:spcAft>
-            <a:buNone/>
-          </a:pPr>
-          <a:endParaRPr lang="en-CA" sz="6500" kern="1200" dirty="0"/>
-        </a:p>
-      </dsp:txBody>
-      <dsp:txXfrm>
-        <a:off x="4702053" y="750779"/>
-        <a:ext cx="2304546" cy="1430889"/>
-      </dsp:txXfrm>
-    </dsp:sp>
-    <dsp:sp modelId="{D254E614-51DE-41DD-A98C-60D49618BD9E}">
-      <dsp:nvSpPr>
-        <dsp:cNvPr id="0" name=""/>
-        <dsp:cNvSpPr/>
-      </dsp:nvSpPr>
-      <dsp:spPr>
-        <a:xfrm>
-          <a:off x="3352" y="2669663"/>
-          <a:ext cx="2393580" cy="1519923"/>
-        </a:xfrm>
-        <a:prstGeom prst="roundRect">
-          <a:avLst>
-            <a:gd name="adj" fmla="val 10000"/>
-          </a:avLst>
-        </a:prstGeom>
-        <a:gradFill rotWithShape="0">
-          <a:gsLst>
-            <a:gs pos="0">
-              <a:schemeClr val="accent2"/>
-            </a:gs>
-            <a:gs pos="100000">
-              <a:schemeClr val="accent1"/>
-            </a:gs>
-          </a:gsLst>
-          <a:lin ang="16200000" scaled="0"/>
-        </a:gradFill>
-        <a:ln>
-          <a:noFill/>
-        </a:ln>
-        <a:effectLst>
-          <a:outerShdw blurRad="40000" dist="23000" dir="5400000" rotWithShape="0">
-            <a:srgbClr val="000000">
-              <a:alpha val="35000"/>
-            </a:srgbClr>
-          </a:outerShdw>
-        </a:effectLst>
-      </dsp:spPr>
-      <dsp:style>
-        <a:lnRef idx="0">
-          <a:scrgbClr r="0" g="0" b="0"/>
-        </a:lnRef>
-        <a:fillRef idx="3">
-          <a:scrgbClr r="0" g="0" b="0"/>
-        </a:fillRef>
-        <a:effectRef idx="2">
-          <a:scrgbClr r="0" g="0" b="0"/>
-        </a:effectRef>
-        <a:fontRef idx="minor">
-          <a:schemeClr val="lt1"/>
-        </a:fontRef>
-      </dsp:style>
-    </dsp:sp>
-    <dsp:sp modelId="{933AD797-2624-48BE-80CA-A9F7328F5C03}">
-      <dsp:nvSpPr>
-        <dsp:cNvPr id="0" name=""/>
-        <dsp:cNvSpPr/>
-      </dsp:nvSpPr>
-      <dsp:spPr>
-        <a:xfrm>
-          <a:off x="269305" y="2922319"/>
-          <a:ext cx="2393580" cy="1519923"/>
-        </a:xfrm>
-        <a:prstGeom prst="roundRect">
-          <a:avLst>
-            <a:gd name="adj" fmla="val 10000"/>
-          </a:avLst>
-        </a:prstGeom>
-        <a:solidFill>
-          <a:schemeClr val="lt1">
-            <a:alpha val="90000"/>
-            <a:hueOff val="0"/>
-            <a:satOff val="0"/>
-            <a:lumOff val="0"/>
-            <a:alphaOff val="0"/>
-          </a:schemeClr>
-        </a:solidFill>
-        <a:ln w="9525" cap="flat" cmpd="sng" algn="ctr">
-          <a:solidFill>
-            <a:schemeClr val="accent1">
-              <a:hueOff val="0"/>
-              <a:satOff val="0"/>
-              <a:lumOff val="0"/>
-              <a:alphaOff val="0"/>
-            </a:schemeClr>
-          </a:solidFill>
-          <a:prstDash val="solid"/>
-        </a:ln>
-        <a:effectLst/>
-      </dsp:spPr>
-      <dsp:style>
-        <a:lnRef idx="1">
-          <a:scrgbClr r="0" g="0" b="0"/>
-        </a:lnRef>
-        <a:fillRef idx="1">
-          <a:scrgbClr r="0" g="0" b="0"/>
-        </a:fillRef>
-        <a:effectRef idx="0">
-          <a:scrgbClr r="0" g="0" b="0"/>
-        </a:effectRef>
-        <a:fontRef idx="minor"/>
-      </dsp:style>
-      <dsp:txBody>
-        <a:bodyPr spcFirstLastPara="0" vert="horz" wrap="square" lIns="247650" tIns="247650" rIns="247650" bIns="247650" numCol="1" spcCol="1270" anchor="ctr" anchorCtr="0">
-          <a:noAutofit/>
-        </a:bodyPr>
-        <a:lstStyle/>
-        <a:p>
-          <a:pPr marL="0" lvl="0" indent="0" algn="ctr" defTabSz="2889250" rtl="0">
-            <a:lnSpc>
-              <a:spcPct val="90000"/>
-            </a:lnSpc>
-            <a:spcBef>
-              <a:spcPct val="0"/>
-            </a:spcBef>
-            <a:spcAft>
-              <a:spcPct val="35000"/>
-            </a:spcAft>
-            <a:buNone/>
-          </a:pPr>
-          <a:endParaRPr lang="en-US" sz="6500" kern="1200" dirty="0"/>
-        </a:p>
-      </dsp:txBody>
-      <dsp:txXfrm>
-        <a:off x="313822" y="2966836"/>
-        <a:ext cx="2304546" cy="1430889"/>
-      </dsp:txXfrm>
-    </dsp:sp>
-    <dsp:sp modelId="{416329E6-4A05-4BEF-86B2-9D39C76BB316}">
-      <dsp:nvSpPr>
-        <dsp:cNvPr id="0" name=""/>
-        <dsp:cNvSpPr/>
-      </dsp:nvSpPr>
-      <dsp:spPr>
-        <a:xfrm>
-          <a:off x="2928839" y="2669663"/>
-          <a:ext cx="2393580" cy="1519923"/>
-        </a:xfrm>
-        <a:prstGeom prst="roundRect">
-          <a:avLst>
-            <a:gd name="adj" fmla="val 10000"/>
-          </a:avLst>
-        </a:prstGeom>
-        <a:gradFill rotWithShape="0">
-          <a:gsLst>
-            <a:gs pos="0">
-              <a:schemeClr val="accent2"/>
-            </a:gs>
-            <a:gs pos="100000">
-              <a:schemeClr val="accent1"/>
-            </a:gs>
-          </a:gsLst>
-          <a:lin ang="16200000" scaled="0"/>
-        </a:gradFill>
-        <a:ln>
-          <a:noFill/>
-        </a:ln>
-        <a:effectLst>
-          <a:outerShdw blurRad="40000" dist="23000" dir="5400000" rotWithShape="0">
-            <a:srgbClr val="000000">
-              <a:alpha val="35000"/>
-            </a:srgbClr>
-          </a:outerShdw>
-        </a:effectLst>
-      </dsp:spPr>
-      <dsp:style>
-        <a:lnRef idx="0">
-          <a:scrgbClr r="0" g="0" b="0"/>
-        </a:lnRef>
-        <a:fillRef idx="3">
-          <a:scrgbClr r="0" g="0" b="0"/>
-        </a:fillRef>
-        <a:effectRef idx="2">
-          <a:scrgbClr r="0" g="0" b="0"/>
-        </a:effectRef>
-        <a:fontRef idx="minor">
-          <a:schemeClr val="lt1"/>
-        </a:fontRef>
-      </dsp:style>
-    </dsp:sp>
-    <dsp:sp modelId="{0D418E03-7754-4070-ABCC-0A3F3437E261}">
-      <dsp:nvSpPr>
-        <dsp:cNvPr id="0" name=""/>
-        <dsp:cNvSpPr/>
-      </dsp:nvSpPr>
-      <dsp:spPr>
-        <a:xfrm>
-          <a:off x="3194792" y="2922319"/>
-          <a:ext cx="2393580" cy="1519923"/>
-        </a:xfrm>
-        <a:prstGeom prst="roundRect">
-          <a:avLst>
-            <a:gd name="adj" fmla="val 10000"/>
-          </a:avLst>
-        </a:prstGeom>
-        <a:solidFill>
-          <a:schemeClr val="lt1">
-            <a:alpha val="90000"/>
-            <a:hueOff val="0"/>
-            <a:satOff val="0"/>
-            <a:lumOff val="0"/>
-            <a:alphaOff val="0"/>
-          </a:schemeClr>
-        </a:solidFill>
-        <a:ln w="9525" cap="flat" cmpd="sng" algn="ctr">
-          <a:solidFill>
-            <a:schemeClr val="accent1">
-              <a:hueOff val="0"/>
-              <a:satOff val="0"/>
-              <a:lumOff val="0"/>
-              <a:alphaOff val="0"/>
-            </a:schemeClr>
-          </a:solidFill>
-          <a:prstDash val="solid"/>
-        </a:ln>
-        <a:effectLst/>
-      </dsp:spPr>
-      <dsp:style>
-        <a:lnRef idx="1">
-          <a:scrgbClr r="0" g="0" b="0"/>
-        </a:lnRef>
-        <a:fillRef idx="1">
-          <a:scrgbClr r="0" g="0" b="0"/>
-        </a:fillRef>
-        <a:effectRef idx="0">
-          <a:scrgbClr r="0" g="0" b="0"/>
-        </a:effectRef>
-        <a:fontRef idx="minor"/>
-      </dsp:style>
-      <dsp:txBody>
-        <a:bodyPr spcFirstLastPara="0" vert="horz" wrap="square" lIns="247650" tIns="247650" rIns="247650" bIns="247650" numCol="1" spcCol="1270" anchor="ctr" anchorCtr="0">
-          <a:noAutofit/>
-        </a:bodyPr>
-        <a:lstStyle/>
-        <a:p>
-          <a:pPr marL="0" lvl="0" indent="0" algn="ctr" defTabSz="2889250" rtl="0">
-            <a:lnSpc>
-              <a:spcPct val="90000"/>
-            </a:lnSpc>
-            <a:spcBef>
-              <a:spcPct val="0"/>
-            </a:spcBef>
-            <a:spcAft>
-              <a:spcPct val="35000"/>
-            </a:spcAft>
-            <a:buNone/>
-          </a:pPr>
-          <a:endParaRPr lang="en-US" sz="6500" kern="1200" dirty="0"/>
-        </a:p>
-      </dsp:txBody>
-      <dsp:txXfrm>
-        <a:off x="3239309" y="2966836"/>
-        <a:ext cx="2304546" cy="1430889"/>
-      </dsp:txXfrm>
-    </dsp:sp>
-    <dsp:sp modelId="{73F9CB8B-CFC2-47BF-86D0-78931921DB26}">
-      <dsp:nvSpPr>
-        <dsp:cNvPr id="0" name=""/>
-        <dsp:cNvSpPr/>
-      </dsp:nvSpPr>
-      <dsp:spPr>
-        <a:xfrm>
-          <a:off x="5854326" y="2669663"/>
-          <a:ext cx="2393580" cy="1519923"/>
-        </a:xfrm>
-        <a:prstGeom prst="roundRect">
-          <a:avLst>
-            <a:gd name="adj" fmla="val 10000"/>
-          </a:avLst>
-        </a:prstGeom>
-        <a:gradFill rotWithShape="0">
-          <a:gsLst>
-            <a:gs pos="0">
-              <a:schemeClr val="accent2"/>
-            </a:gs>
-            <a:gs pos="100000">
-              <a:schemeClr val="accent1"/>
-            </a:gs>
-          </a:gsLst>
-          <a:lin ang="16200000" scaled="0"/>
-        </a:gradFill>
-        <a:ln>
-          <a:noFill/>
-        </a:ln>
-        <a:effectLst>
-          <a:outerShdw blurRad="40000" dist="23000" dir="5400000" rotWithShape="0">
-            <a:srgbClr val="000000">
-              <a:alpha val="35000"/>
-            </a:srgbClr>
-          </a:outerShdw>
-        </a:effectLst>
-      </dsp:spPr>
-      <dsp:style>
-        <a:lnRef idx="0">
-          <a:scrgbClr r="0" g="0" b="0"/>
-        </a:lnRef>
-        <a:fillRef idx="3">
-          <a:scrgbClr r="0" g="0" b="0"/>
-        </a:fillRef>
-        <a:effectRef idx="2">
-          <a:scrgbClr r="0" g="0" b="0"/>
-        </a:effectRef>
-        <a:fontRef idx="minor">
-          <a:schemeClr val="lt1"/>
-        </a:fontRef>
-      </dsp:style>
-    </dsp:sp>
-    <dsp:sp modelId="{A358A23E-A6BE-48A9-B175-8861366412D8}">
-      <dsp:nvSpPr>
-        <dsp:cNvPr id="0" name=""/>
-        <dsp:cNvSpPr/>
-      </dsp:nvSpPr>
-      <dsp:spPr>
-        <a:xfrm>
-          <a:off x="6120280" y="2922319"/>
-          <a:ext cx="2393580" cy="1519923"/>
-        </a:xfrm>
-        <a:prstGeom prst="roundRect">
-          <a:avLst>
-            <a:gd name="adj" fmla="val 10000"/>
-          </a:avLst>
-        </a:prstGeom>
-        <a:solidFill>
-          <a:schemeClr val="lt1">
-            <a:alpha val="90000"/>
-            <a:hueOff val="0"/>
-            <a:satOff val="0"/>
-            <a:lumOff val="0"/>
-            <a:alphaOff val="0"/>
-          </a:schemeClr>
-        </a:solidFill>
-        <a:ln w="9525" cap="flat" cmpd="sng" algn="ctr">
-          <a:solidFill>
-            <a:schemeClr val="accent1">
-              <a:hueOff val="0"/>
-              <a:satOff val="0"/>
-              <a:lumOff val="0"/>
-              <a:alphaOff val="0"/>
-            </a:schemeClr>
-          </a:solidFill>
-          <a:prstDash val="solid"/>
-        </a:ln>
-        <a:effectLst/>
-      </dsp:spPr>
-      <dsp:style>
-        <a:lnRef idx="1">
-          <a:scrgbClr r="0" g="0" b="0"/>
-        </a:lnRef>
-        <a:fillRef idx="1">
-          <a:scrgbClr r="0" g="0" b="0"/>
-        </a:fillRef>
-        <a:effectRef idx="0">
-          <a:scrgbClr r="0" g="0" b="0"/>
-        </a:effectRef>
-        <a:fontRef idx="minor"/>
-      </dsp:style>
-      <dsp:txBody>
-        <a:bodyPr spcFirstLastPara="0" vert="horz" wrap="square" lIns="247650" tIns="247650" rIns="247650" bIns="247650" numCol="1" spcCol="1270" anchor="ctr" anchorCtr="0">
-          <a:noAutofit/>
-        </a:bodyPr>
-        <a:lstStyle/>
-        <a:p>
-          <a:pPr marL="0" lvl="0" indent="0" algn="ctr" defTabSz="2889250" rtl="0">
-            <a:lnSpc>
-              <a:spcPct val="90000"/>
-            </a:lnSpc>
-            <a:spcBef>
-              <a:spcPct val="0"/>
-            </a:spcBef>
-            <a:spcAft>
-              <a:spcPct val="35000"/>
-            </a:spcAft>
-            <a:buNone/>
-          </a:pPr>
-          <a:endParaRPr lang="en-US" sz="6500" kern="1200" dirty="0"/>
-        </a:p>
-      </dsp:txBody>
-      <dsp:txXfrm>
-        <a:off x="6164797" y="2966836"/>
-        <a:ext cx="2304546" cy="1430889"/>
-      </dsp:txXfrm>
-    </dsp:sp>
-    <dsp:sp modelId="{F3FD4A43-023D-4EEF-A00E-665A6FE74398}">
-      <dsp:nvSpPr>
-        <dsp:cNvPr id="0" name=""/>
-        <dsp:cNvSpPr/>
-      </dsp:nvSpPr>
-      <dsp:spPr>
-        <a:xfrm>
-          <a:off x="8779813" y="2669663"/>
-          <a:ext cx="2393580" cy="1519923"/>
-        </a:xfrm>
-        <a:prstGeom prst="roundRect">
-          <a:avLst>
-            <a:gd name="adj" fmla="val 10000"/>
-          </a:avLst>
-        </a:prstGeom>
-        <a:gradFill rotWithShape="0">
-          <a:gsLst>
-            <a:gs pos="0">
-              <a:schemeClr val="accent2"/>
-            </a:gs>
-            <a:gs pos="100000">
-              <a:schemeClr val="accent1"/>
-            </a:gs>
-          </a:gsLst>
-          <a:lin ang="16200000" scaled="0"/>
-        </a:gradFill>
-        <a:ln>
-          <a:noFill/>
-        </a:ln>
-        <a:effectLst>
-          <a:outerShdw blurRad="40000" dist="23000" dir="5400000" rotWithShape="0">
-            <a:srgbClr val="000000">
-              <a:alpha val="35000"/>
-            </a:srgbClr>
-          </a:outerShdw>
-        </a:effectLst>
-      </dsp:spPr>
-      <dsp:style>
-        <a:lnRef idx="0">
-          <a:scrgbClr r="0" g="0" b="0"/>
-        </a:lnRef>
-        <a:fillRef idx="3">
-          <a:scrgbClr r="0" g="0" b="0"/>
-        </a:fillRef>
-        <a:effectRef idx="2">
-          <a:scrgbClr r="0" g="0" b="0"/>
-        </a:effectRef>
-        <a:fontRef idx="minor">
-          <a:schemeClr val="lt1"/>
-        </a:fontRef>
-      </dsp:style>
-    </dsp:sp>
-    <dsp:sp modelId="{6C852CE4-C864-4134-A035-CD38D8DF4EE4}">
-      <dsp:nvSpPr>
-        <dsp:cNvPr id="0" name=""/>
-        <dsp:cNvSpPr/>
-      </dsp:nvSpPr>
-      <dsp:spPr>
-        <a:xfrm>
-          <a:off x="9045767" y="2922319"/>
-          <a:ext cx="2393580" cy="1519923"/>
-        </a:xfrm>
-        <a:prstGeom prst="roundRect">
-          <a:avLst>
-            <a:gd name="adj" fmla="val 10000"/>
-          </a:avLst>
-        </a:prstGeom>
-        <a:solidFill>
-          <a:schemeClr val="lt1">
-            <a:alpha val="90000"/>
-            <a:hueOff val="0"/>
-            <a:satOff val="0"/>
-            <a:lumOff val="0"/>
-            <a:alphaOff val="0"/>
-          </a:schemeClr>
-        </a:solidFill>
-        <a:ln w="9525" cap="flat" cmpd="sng" algn="ctr">
-          <a:solidFill>
-            <a:schemeClr val="accent1">
-              <a:hueOff val="0"/>
-              <a:satOff val="0"/>
-              <a:lumOff val="0"/>
-              <a:alphaOff val="0"/>
-            </a:schemeClr>
-          </a:solidFill>
-          <a:prstDash val="solid"/>
-        </a:ln>
-        <a:effectLst/>
-      </dsp:spPr>
-      <dsp:style>
-        <a:lnRef idx="1">
-          <a:scrgbClr r="0" g="0" b="0"/>
-        </a:lnRef>
-        <a:fillRef idx="1">
-          <a:scrgbClr r="0" g="0" b="0"/>
-        </a:fillRef>
-        <a:effectRef idx="0">
-          <a:scrgbClr r="0" g="0" b="0"/>
-        </a:effectRef>
-        <a:fontRef idx="minor"/>
-      </dsp:style>
-      <dsp:txBody>
-        <a:bodyPr spcFirstLastPara="0" vert="horz" wrap="square" lIns="247650" tIns="247650" rIns="247650" bIns="247650" numCol="1" spcCol="1270" anchor="ctr" anchorCtr="0">
-          <a:noAutofit/>
-        </a:bodyPr>
-        <a:lstStyle/>
-        <a:p>
-          <a:pPr marL="0" lvl="0" indent="0" algn="ctr" defTabSz="2889250" rtl="0">
-            <a:lnSpc>
-              <a:spcPct val="90000"/>
-            </a:lnSpc>
-            <a:spcBef>
-              <a:spcPct val="0"/>
-            </a:spcBef>
-            <a:spcAft>
-              <a:spcPct val="35000"/>
-            </a:spcAft>
-            <a:buNone/>
-          </a:pPr>
-          <a:endParaRPr lang="en-US" sz="6500" kern="1200" dirty="0"/>
-        </a:p>
-      </dsp:txBody>
-      <dsp:txXfrm>
-        <a:off x="9090284" y="2966836"/>
-        <a:ext cx="2304546" cy="1430889"/>
-      </dsp:txXfrm>
-    </dsp:sp>
-  </dsp:spTree>
-</dsp:drawing>
-</file>
-
-<file path=ppt/diagrams/layout1.xml><?xml version="1.0" encoding="utf-8"?>
-<dgm:layoutDef xmlns:dgm="http://schemas.openxmlformats.org/drawingml/2006/diagram" xmlns:a="http://schemas.openxmlformats.org/drawingml/2006/main" uniqueId="urn:microsoft.com/office/officeart/2005/8/layout/hierarchy1">
-  <dgm:title val=""/>
-  <dgm:desc val=""/>
-  <dgm:catLst>
-    <dgm:cat type="hierarchy" pri="2000"/>
-  </dgm:catLst>
-  <dgm:sampData>
-    <dgm:dataModel>
-      <dgm:ptLst>
-        <dgm:pt modelId="0" type="doc"/>
-        <dgm:pt modelId="1">
-          <dgm:prSet phldr="1"/>
-        </dgm:pt>
-        <dgm:pt modelId="2">
-          <dgm:prSet phldr="1"/>
-        </dgm:pt>
-        <dgm:pt modelId="21">
-          <dgm:prSet phldr="1"/>
-        </dgm:pt>
-        <dgm:pt modelId="22">
-          <dgm:prSet phldr="1"/>
-        </dgm:pt>
-        <dgm:pt modelId="3">
-          <dgm:prSet phldr="1"/>
-        </dgm:pt>
-        <dgm:pt modelId="31">
-          <dgm:prSet phldr="1"/>
-        </dgm:pt>
-      </dgm:ptLst>
-      <dgm:cxnLst>
-        <dgm:cxn modelId="4" srcId="0" destId="1" srcOrd="0" destOrd="0"/>
-        <dgm:cxn modelId="5" srcId="1" destId="2" srcOrd="0" destOrd="0"/>
-        <dgm:cxn modelId="6" srcId="1" destId="3" srcOrd="1" destOrd="0"/>
-        <dgm:cxn modelId="23" srcId="2" destId="21" srcOrd="0" destOrd="0"/>
-        <dgm:cxn modelId="24" srcId="2" destId="22" srcOrd="1" destOrd="0"/>
-        <dgm:cxn modelId="33" srcId="3" destId="31" srcOrd="0" destOrd="0"/>
-      </dgm:cxnLst>
-      <dgm:bg/>
-      <dgm:whole/>
-    </dgm:dataModel>
-  </dgm:sampData>
-  <dgm:styleData>
-    <dgm:dataModel>
-      <dgm:ptLst>
-        <dgm:pt modelId="0" type="doc"/>
-        <dgm:pt modelId="1"/>
-        <dgm:pt modelId="11"/>
-        <dgm:pt modelId="12"/>
-      </dgm:ptLst>
-      <dgm:cxnLst>
-        <dgm:cxn modelId="2" srcId="0" destId="1" srcOrd="0" destOrd="0"/>
-        <dgm:cxn modelId="13" srcId="1" destId="11" srcOrd="0" destOrd="0"/>
-        <dgm:cxn modelId="14" srcId="1" destId="12" srcOrd="1" destOrd="0"/>
-      </dgm:cxnLst>
-      <dgm:bg/>
-      <dgm:whole/>
-    </dgm:dataModel>
-  </dgm:styleData>
-  <dgm:clrData>
-    <dgm:dataModel>
-      <dgm:ptLst>
-        <dgm:pt modelId="0" type="doc"/>
-        <dgm:pt modelId="1"/>
-        <dgm:pt modelId="2"/>
-        <dgm:pt modelId="21"/>
-        <dgm:pt modelId="211"/>
-        <dgm:pt modelId="3"/>
-        <dgm:pt modelId="31"/>
-        <dgm:pt modelId="311"/>
-      </dgm:ptLst>
-      <dgm:cxnLst>
-        <dgm:cxn modelId="4" srcId="0" destId="1" srcOrd="0" destOrd="0"/>
-        <dgm:cxn modelId="5" srcId="1" destId="2" srcOrd="0" destOrd="0"/>
-        <dgm:cxn modelId="6" srcId="1" destId="3" srcOrd="1" destOrd="0"/>
-        <dgm:cxn modelId="23" srcId="2" destId="21" srcOrd="0" destOrd="0"/>
-        <dgm:cxn modelId="24" srcId="21" destId="211" srcOrd="0" destOrd="0"/>
-        <dgm:cxn modelId="33" srcId="3" destId="31" srcOrd="0" destOrd="0"/>
-        <dgm:cxn modelId="34" srcId="31" destId="311" srcOrd="0" destOrd="0"/>
-      </dgm:cxnLst>
-      <dgm:bg/>
-      <dgm:whole/>
-    </dgm:dataModel>
-  </dgm:clrData>
-  <dgm:layoutNode name="hierChild1">
-    <dgm:varLst>
-      <dgm:chPref val="1"/>
-      <dgm:dir/>
-      <dgm:animOne val="branch"/>
-      <dgm:animLvl val="lvl"/>
-      <dgm:resizeHandles/>
-    </dgm:varLst>
-    <dgm:choose name="Name0">
-      <dgm:if name="Name1" func="var" arg="dir" op="equ" val="norm">
-        <dgm:alg type="hierChild">
-          <dgm:param type="linDir" val="fromL"/>
-        </dgm:alg>
-      </dgm:if>
-      <dgm:else name="Name2">
-        <dgm:alg type="hierChild">
-          <dgm:param type="linDir" val="fromR"/>
-        </dgm:alg>
-      </dgm:else>
-    </dgm:choose>
-    <dgm:shape xmlns:r="http://schemas.openxmlformats.org/officeDocument/2006/relationships" r:blip="">
-      <dgm:adjLst/>
-    </dgm:shape>
-    <dgm:presOf/>
-    <dgm:constrLst>
-      <dgm:constr type="primFontSz" for="des" ptType="node" op="equ" val="65"/>
-      <dgm:constr type="w" for="des" forName="composite" refType="w"/>
-      <dgm:constr type="h" for="des" forName="composite" refType="w" refFor="des" refForName="composite" fact="0.667"/>
-      <dgm:constr type="w" for="des" forName="composite2" refType="w" refFor="des" refForName="composite"/>
-      <dgm:constr type="h" for="des" forName="composite2" refType="h" refFor="des" refForName="composite"/>
-      <dgm:constr type="w" for="des" forName="composite3" refType="w" refFor="des" refForName="composite"/>
-      <dgm:constr type="h" for="des" forName="composite3" refType="h" refFor="des" refForName="composite"/>
-      <dgm:constr type="w" for="des" forName="composite4" refType="w" refFor="des" refForName="composite"/>
-      <dgm:constr type="h" for="des" forName="composite4" refType="h" refFor="des" refForName="composite"/>
-      <dgm:constr type="w" for="des" forName="composite5" refType="w" refFor="des" refForName="composite"/>
-      <dgm:constr type="h" for="des" forName="composite5" refType="h" refFor="des" refForName="composite"/>
-      <dgm:constr type="sibSp" refType="w" refFor="des" refForName="composite" fact="0.1"/>
-      <dgm:constr type="sibSp" for="des" forName="hierChild2" refType="sibSp"/>
-      <dgm:constr type="sibSp" for="des" forName="hierChild3" refType="sibSp"/>
-      <dgm:constr type="sibSp" for="des" forName="hierChild4" refType="sibSp"/>
-      <dgm:constr type="sibSp" for="des" forName="hierChild5" refType="sibSp"/>
-      <dgm:constr type="sibSp" for="des" forName="hierChild6" refType="sibSp"/>
-      <dgm:constr type="sp" for="des" forName="hierRoot1" refType="h" refFor="des" refForName="composite" fact="0.25"/>
-      <dgm:constr type="sp" for="des" forName="hierRoot2" refType="sp" refFor="des" refForName="hierRoot1"/>
-      <dgm:constr type="sp" for="des" forName="hierRoot3" refType="sp" refFor="des" refForName="hierRoot1"/>
-      <dgm:constr type="sp" for="des" forName="hierRoot4" refType="sp" refFor="des" refForName="hierRoot1"/>
-      <dgm:constr type="sp" for="des" forName="hierRoot5" refType="sp" refFor="des" refForName="hierRoot1"/>
-    </dgm:constrLst>
-    <dgm:ruleLst/>
-    <dgm:forEach name="Name3" axis="ch">
-      <dgm:forEach name="Name4" axis="self" ptType="node">
-        <dgm:layoutNode name="hierRoot1">
-          <dgm:alg type="hierRoot"/>
-          <dgm:shape xmlns:r="http://schemas.openxmlformats.org/officeDocument/2006/relationships" r:blip="">
-            <dgm:adjLst/>
-          </dgm:shape>
-          <dgm:presOf/>
-          <dgm:constrLst>
-            <dgm:constr type="bendDist" for="des" ptType="parTrans" refType="sp" fact="0.5"/>
-          </dgm:constrLst>
-          <dgm:ruleLst/>
-          <dgm:layoutNode name="composite">
-            <dgm:alg type="composite"/>
-            <dgm:shape xmlns:r="http://schemas.openxmlformats.org/officeDocument/2006/relationships" r:blip="">
-              <dgm:adjLst/>
-            </dgm:shape>
-            <dgm:presOf/>
-            <dgm:constrLst>
-              <dgm:constr type="w" for="ch" forName="background" refType="w" fact="0.9"/>
-              <dgm:constr type="h" for="ch" forName="background" refType="w" refFor="ch" refForName="background" fact="0.635"/>
-              <dgm:constr type="t" for="ch" forName="background"/>
-              <dgm:constr type="l" for="ch" forName="background"/>
-              <dgm:constr type="w" for="ch" forName="text" refType="w" fact="0.9"/>
-              <dgm:constr type="h" for="ch" forName="text" refType="w" refFor="ch" refForName="text" fact="0.635"/>
-              <dgm:constr type="t" for="ch" forName="text" refType="w" fact="0.095"/>
-              <dgm:constr type="l" for="ch" forName="text" refType="w" fact="0.1"/>
-            </dgm:constrLst>
-            <dgm:ruleLst/>
-            <dgm:layoutNode name="background" styleLbl="node0" moveWith="text">
-              <dgm:alg type="sp"/>
-              <dgm:shape xmlns:r="http://schemas.openxmlformats.org/officeDocument/2006/relationships" type="roundRect" r:blip="">
-                <dgm:adjLst>
-                  <dgm:adj idx="1" val="0.1"/>
-                </dgm:adjLst>
-              </dgm:shape>
-              <dgm:presOf/>
-              <dgm:constrLst/>
-              <dgm:ruleLst/>
-            </dgm:layoutNode>
-            <dgm:layoutNode name="text" styleLbl="fgAcc0">
-              <dgm:varLst>
-                <dgm:chPref val="3"/>
-              </dgm:varLst>
-              <dgm:alg type="tx"/>
-              <dgm:shape xmlns:r="http://schemas.openxmlformats.org/officeDocument/2006/relationships" type="roundRect" r:blip="">
-                <dgm:adjLst>
-                  <dgm:adj idx="1" val="0.1"/>
-                </dgm:adjLst>
-              </dgm:shape>
-              <dgm:presOf axis="self"/>
-              <dgm:constrLst>
-                <dgm:constr type="tMarg" refType="primFontSz" fact="0.3"/>
-                <dgm:constr type="bMarg" refType="primFontSz" fact="0.3"/>
-                <dgm:constr type="lMarg" refType="primFontSz" fact="0.3"/>
-                <dgm:constr type="rMarg" refType="primFontSz" fact="0.3"/>
-              </dgm:constrLst>
-              <dgm:ruleLst>
-                <dgm:rule type="primFontSz" val="5" fact="NaN" max="NaN"/>
-              </dgm:ruleLst>
-            </dgm:layoutNode>
-          </dgm:layoutNode>
-          <dgm:layoutNode name="hierChild2">
-            <dgm:choose name="Name5">
-              <dgm:if name="Name6" func="var" arg="dir" op="equ" val="norm">
-                <dgm:alg type="hierChild">
-                  <dgm:param type="linDir" val="fromL"/>
-                </dgm:alg>
-              </dgm:if>
-              <dgm:else name="Name7">
-                <dgm:alg type="hierChild">
-                  <dgm:param type="linDir" val="fromR"/>
-                </dgm:alg>
-              </dgm:else>
-            </dgm:choose>
-            <dgm:shape xmlns:r="http://schemas.openxmlformats.org/officeDocument/2006/relationships" r:blip="">
-              <dgm:adjLst/>
-            </dgm:shape>
-            <dgm:presOf/>
-            <dgm:constrLst/>
-            <dgm:ruleLst/>
-            <dgm:forEach name="Name8" axis="ch">
-              <dgm:forEach name="Name9" axis="self" ptType="parTrans" cnt="1">
-                <dgm:layoutNode name="Name10">
-                  <dgm:alg type="conn">
-                    <dgm:param type="dim" val="1D"/>
-                    <dgm:param type="endSty" val="noArr"/>
-                    <dgm:param type="connRout" val="bend"/>
-                    <dgm:param type="bendPt" val="end"/>
-                    <dgm:param type="begPts" val="bCtr"/>
-                    <dgm:param type="endPts" val="tCtr"/>
-                    <dgm:param type="srcNode" val="background"/>
-                    <dgm:param type="dstNode" val="background2"/>
-                  </dgm:alg>
-                  <dgm:shape xmlns:r="http://schemas.openxmlformats.org/officeDocument/2006/relationships" type="conn" r:blip="" zOrderOff="-999">
-                    <dgm:adjLst/>
-                  </dgm:shape>
-                  <dgm:presOf axis="self"/>
-                  <dgm:constrLst>
-                    <dgm:constr type="begPad"/>
-                    <dgm:constr type="endPad"/>
-                  </dgm:constrLst>
-                  <dgm:ruleLst/>
-                </dgm:layoutNode>
-              </dgm:forEach>
-              <dgm:forEach name="Name11" axis="self" ptType="node">
-                <dgm:layoutNode name="hierRoot2">
-                  <dgm:alg type="hierRoot"/>
-                  <dgm:shape xmlns:r="http://schemas.openxmlformats.org/officeDocument/2006/relationships" r:blip="">
-                    <dgm:adjLst/>
-                  </dgm:shape>
-                  <dgm:presOf/>
-                  <dgm:constrLst>
-                    <dgm:constr type="bendDist" for="des" ptType="parTrans" refType="sp" fact="0.5"/>
-                  </dgm:constrLst>
-                  <dgm:ruleLst/>
-                  <dgm:layoutNode name="composite2">
-                    <dgm:alg type="composite"/>
-                    <dgm:shape xmlns:r="http://schemas.openxmlformats.org/officeDocument/2006/relationships" r:blip="">
-                      <dgm:adjLst/>
-                    </dgm:shape>
-                    <dgm:presOf/>
-                    <dgm:constrLst>
-                      <dgm:constr type="w" for="ch" forName="background2" refType="w" fact="0.9"/>
-                      <dgm:constr type="h" for="ch" forName="background2" refType="w" refFor="ch" refForName="background2" fact="0.635"/>
-                      <dgm:constr type="t" for="ch" forName="background2"/>
-                      <dgm:constr type="l" for="ch" forName="background2"/>
-                      <dgm:constr type="w" for="ch" forName="text2" refType="w" fact="0.9"/>
-                      <dgm:constr type="h" for="ch" forName="text2" refType="w" refFor="ch" refForName="text2" fact="0.635"/>
-                      <dgm:constr type="t" for="ch" forName="text2" refType="w" fact="0.095"/>
-                      <dgm:constr type="l" for="ch" forName="text2" refType="w" fact="0.1"/>
-                    </dgm:constrLst>
-                    <dgm:ruleLst/>
-                    <dgm:layoutNode name="background2" moveWith="text2">
-                      <dgm:alg type="sp"/>
-                      <dgm:shape xmlns:r="http://schemas.openxmlformats.org/officeDocument/2006/relationships" type="roundRect" r:blip="">
-                        <dgm:adjLst>
-                          <dgm:adj idx="1" val="0.1"/>
-                        </dgm:adjLst>
-                      </dgm:shape>
-                      <dgm:presOf/>
-                      <dgm:constrLst/>
-                      <dgm:ruleLst/>
-                    </dgm:layoutNode>
-                    <dgm:layoutNode name="text2" styleLbl="fgAcc2">
-                      <dgm:varLst>
-                        <dgm:chPref val="3"/>
-                      </dgm:varLst>
-                      <dgm:alg type="tx"/>
-                      <dgm:shape xmlns:r="http://schemas.openxmlformats.org/officeDocument/2006/relationships" type="roundRect" r:blip="">
-                        <dgm:adjLst>
-                          <dgm:adj idx="1" val="0.1"/>
-                        </dgm:adjLst>
-                      </dgm:shape>
-                      <dgm:presOf axis="self"/>
-                      <dgm:constrLst>
-                        <dgm:constr type="tMarg" refType="primFontSz" fact="0.3"/>
-                        <dgm:constr type="bMarg" refType="primFontSz" fact="0.3"/>
-                        <dgm:constr type="lMarg" refType="primFontSz" fact="0.3"/>
-                        <dgm:constr type="rMarg" refType="primFontSz" fact="0.3"/>
-                      </dgm:constrLst>
-                      <dgm:ruleLst>
-                        <dgm:rule type="primFontSz" val="5" fact="NaN" max="NaN"/>
-                      </dgm:ruleLst>
-                    </dgm:layoutNode>
-                  </dgm:layoutNode>
-                  <dgm:layoutNode name="hierChild3">
-                    <dgm:choose name="Name12">
-                      <dgm:if name="Name13" func="var" arg="dir" op="equ" val="norm">
-                        <dgm:alg type="hierChild">
-                          <dgm:param type="linDir" val="fromL"/>
-                        </dgm:alg>
-                      </dgm:if>
-                      <dgm:else name="Name14">
-                        <dgm:alg type="hierChild">
-                          <dgm:param type="linDir" val="fromR"/>
-                        </dgm:alg>
-                      </dgm:else>
-                    </dgm:choose>
-                    <dgm:shape xmlns:r="http://schemas.openxmlformats.org/officeDocument/2006/relationships" r:blip="">
-                      <dgm:adjLst/>
-                    </dgm:shape>
-                    <dgm:presOf/>
-                    <dgm:constrLst/>
-                    <dgm:ruleLst/>
-                    <dgm:forEach name="Name15" axis="ch">
-                      <dgm:forEach name="Name16" axis="self" ptType="parTrans" cnt="1">
-                        <dgm:layoutNode name="Name17">
-                          <dgm:alg type="conn">
-                            <dgm:param type="dim" val="1D"/>
-                            <dgm:param type="endSty" val="noArr"/>
-                            <dgm:param type="connRout" val="bend"/>
-                            <dgm:param type="bendPt" val="end"/>
-                            <dgm:param type="begPts" val="bCtr"/>
-                            <dgm:param type="endPts" val="tCtr"/>
-                            <dgm:param type="srcNode" val="background2"/>
-                            <dgm:param type="dstNode" val="background3"/>
-                          </dgm:alg>
-                          <dgm:shape xmlns:r="http://schemas.openxmlformats.org/officeDocument/2006/relationships" type="conn" r:blip="" zOrderOff="-999">
-                            <dgm:adjLst/>
-                          </dgm:shape>
-                          <dgm:presOf axis="self"/>
-                          <dgm:constrLst>
-                            <dgm:constr type="begPad"/>
-                            <dgm:constr type="endPad"/>
-                          </dgm:constrLst>
-                          <dgm:ruleLst/>
-                        </dgm:layoutNode>
-                      </dgm:forEach>
-                      <dgm:forEach name="Name18" axis="self" ptType="node">
-                        <dgm:layoutNode name="hierRoot3">
-                          <dgm:alg type="hierRoot"/>
-                          <dgm:shape xmlns:r="http://schemas.openxmlformats.org/officeDocument/2006/relationships" r:blip="">
-                            <dgm:adjLst/>
-                          </dgm:shape>
-                          <dgm:presOf/>
-                          <dgm:constrLst>
-                            <dgm:constr type="bendDist" for="des" ptType="parTrans" refType="sp" fact="0.5"/>
-                          </dgm:constrLst>
-                          <dgm:ruleLst/>
-                          <dgm:layoutNode name="composite3">
-                            <dgm:alg type="composite"/>
-                            <dgm:shape xmlns:r="http://schemas.openxmlformats.org/officeDocument/2006/relationships" r:blip="">
-                              <dgm:adjLst/>
-                            </dgm:shape>
-                            <dgm:presOf/>
-                            <dgm:constrLst>
-                              <dgm:constr type="w" for="ch" forName="background3" refType="w" fact="0.9"/>
-                              <dgm:constr type="h" for="ch" forName="background3" refType="w" refFor="ch" refForName="background3" fact="0.635"/>
-                              <dgm:constr type="t" for="ch" forName="background3"/>
-                              <dgm:constr type="l" for="ch" forName="background3"/>
-                              <dgm:constr type="w" for="ch" forName="text3" refType="w" fact="0.9"/>
-                              <dgm:constr type="h" for="ch" forName="text3" refType="w" refFor="ch" refForName="text3" fact="0.635"/>
-                              <dgm:constr type="t" for="ch" forName="text3" refType="w" fact="0.095"/>
-                              <dgm:constr type="l" for="ch" forName="text3" refType="w" fact="0.1"/>
-                            </dgm:constrLst>
-                            <dgm:ruleLst/>
-                            <dgm:layoutNode name="background3" moveWith="text3">
-                              <dgm:alg type="sp"/>
-                              <dgm:shape xmlns:r="http://schemas.openxmlformats.org/officeDocument/2006/relationships" type="roundRect" r:blip="">
-                                <dgm:adjLst>
-                                  <dgm:adj idx="1" val="0.1"/>
-                                </dgm:adjLst>
-                              </dgm:shape>
-                              <dgm:presOf/>
-                              <dgm:constrLst/>
-                              <dgm:ruleLst/>
-                            </dgm:layoutNode>
-                            <dgm:layoutNode name="text3" styleLbl="fgAcc3">
-                              <dgm:varLst>
-                                <dgm:chPref val="3"/>
-                              </dgm:varLst>
-                              <dgm:alg type="tx"/>
-                              <dgm:shape xmlns:r="http://schemas.openxmlformats.org/officeDocument/2006/relationships" type="roundRect" r:blip="">
-                                <dgm:adjLst>
-                                  <dgm:adj idx="1" val="0.1"/>
-                                </dgm:adjLst>
-                              </dgm:shape>
-                              <dgm:presOf axis="self"/>
-                              <dgm:constrLst>
-                                <dgm:constr type="tMarg" refType="primFontSz" fact="0.3"/>
-                                <dgm:constr type="bMarg" refType="primFontSz" fact="0.3"/>
-                                <dgm:constr type="lMarg" refType="primFontSz" fact="0.3"/>
-                                <dgm:constr type="rMarg" refType="primFontSz" fact="0.3"/>
-                              </dgm:constrLst>
-                              <dgm:ruleLst>
-                                <dgm:rule type="primFontSz" val="5" fact="NaN" max="NaN"/>
-                              </dgm:ruleLst>
-                            </dgm:layoutNode>
-                          </dgm:layoutNode>
-                          <dgm:layoutNode name="hierChild4">
-                            <dgm:choose name="Name19">
-                              <dgm:if name="Name20" func="var" arg="dir" op="equ" val="norm">
-                                <dgm:alg type="hierChild">
-                                  <dgm:param type="linDir" val="fromL"/>
-                                </dgm:alg>
-                              </dgm:if>
-                              <dgm:else name="Name21">
-                                <dgm:alg type="hierChild">
-                                  <dgm:param type="linDir" val="fromR"/>
-                                </dgm:alg>
-                              </dgm:else>
-                            </dgm:choose>
-                            <dgm:shape xmlns:r="http://schemas.openxmlformats.org/officeDocument/2006/relationships" r:blip="">
-                              <dgm:adjLst/>
-                            </dgm:shape>
-                            <dgm:presOf/>
-                            <dgm:constrLst/>
-                            <dgm:ruleLst/>
-                            <dgm:forEach name="repeat" axis="ch">
-                              <dgm:forEach name="Name22" axis="self" ptType="parTrans" cnt="1">
-                                <dgm:layoutNode name="Name23">
-                                  <dgm:choose name="Name24">
-                                    <dgm:if name="Name25" axis="self" func="depth" op="lte" val="4">
-                                      <dgm:alg type="conn">
-                                        <dgm:param type="dim" val="1D"/>
-                                        <dgm:param type="endSty" val="noArr"/>
-                                        <dgm:param type="connRout" val="bend"/>
-                                        <dgm:param type="bendPt" val="end"/>
-                                        <dgm:param type="begPts" val="bCtr"/>
-                                        <dgm:param type="endPts" val="tCtr"/>
-                                        <dgm:param type="srcNode" val="background3"/>
-                                        <dgm:param type="dstNode" val="background4"/>
-                                      </dgm:alg>
-                                    </dgm:if>
-                                    <dgm:else name="Name26">
-                                      <dgm:alg type="conn">
-                                        <dgm:param type="dim" val="1D"/>
-                                        <dgm:param type="endSty" val="noArr"/>
-                                        <dgm:param type="connRout" val="bend"/>
-                                        <dgm:param type="bendPt" val="end"/>
-                                        <dgm:param type="begPts" val="bCtr"/>
-                                        <dgm:param type="endPts" val="tCtr"/>
-                                        <dgm:param type="srcNode" val="background4"/>
-                                        <dgm:param type="dstNode" val="background4"/>
-                                      </dgm:alg>
-                                    </dgm:else>
-                                  </dgm:choose>
-                                  <dgm:shape xmlns:r="http://schemas.openxmlformats.org/officeDocument/2006/relationships" type="conn" r:blip="" zOrderOff="-999">
-                                    <dgm:adjLst/>
-                                  </dgm:shape>
-                                  <dgm:presOf axis="self"/>
-                                  <dgm:constrLst>
-                                    <dgm:constr type="begPad"/>
-                                    <dgm:constr type="endPad"/>
-                                  </dgm:constrLst>
-                                  <dgm:ruleLst/>
-                                </dgm:layoutNode>
-                              </dgm:forEach>
-                              <dgm:forEach name="Name27" axis="self" ptType="node">
-                                <dgm:layoutNode name="hierRoot4">
-                                  <dgm:alg type="hierRoot"/>
-                                  <dgm:shape xmlns:r="http://schemas.openxmlformats.org/officeDocument/2006/relationships" r:blip="">
-                                    <dgm:adjLst/>
-                                  </dgm:shape>
-                                  <dgm:presOf/>
-                                  <dgm:constrLst>
-                                    <dgm:constr type="bendDist" for="des" ptType="parTrans" refType="sp" fact="0.5"/>
-                                  </dgm:constrLst>
-                                  <dgm:ruleLst/>
-                                  <dgm:layoutNode name="composite4">
-                                    <dgm:alg type="composite"/>
-                                    <dgm:shape xmlns:r="http://schemas.openxmlformats.org/officeDocument/2006/relationships" r:blip="">
-                                      <dgm:adjLst/>
-                                    </dgm:shape>
-                                    <dgm:presOf/>
-                                    <dgm:constrLst>
-                                      <dgm:constr type="w" for="ch" forName="background4" refType="w" fact="0.9"/>
-                                      <dgm:constr type="h" for="ch" forName="background4" refType="w" refFor="ch" refForName="background4" fact="0.635"/>
-                                      <dgm:constr type="t" for="ch" forName="background4"/>
-                                      <dgm:constr type="l" for="ch" forName="background4"/>
-                                      <dgm:constr type="w" for="ch" forName="text4" refType="w" fact="0.9"/>
-                                      <dgm:constr type="h" for="ch" forName="text4" refType="w" refFor="ch" refForName="text4" fact="0.635"/>
-                                      <dgm:constr type="t" for="ch" forName="text4" refType="w" fact="0.095"/>
-                                      <dgm:constr type="l" for="ch" forName="text4" refType="w" fact="0.1"/>
-                                    </dgm:constrLst>
-                                    <dgm:ruleLst/>
-                                    <dgm:layoutNode name="background4" moveWith="text4">
-                                      <dgm:alg type="sp"/>
-                                      <dgm:shape xmlns:r="http://schemas.openxmlformats.org/officeDocument/2006/relationships" type="roundRect" r:blip="">
-                                        <dgm:adjLst>
-                                          <dgm:adj idx="1" val="0.1"/>
-                                        </dgm:adjLst>
-                                      </dgm:shape>
-                                      <dgm:presOf/>
-                                      <dgm:constrLst/>
-                                      <dgm:ruleLst/>
-                                    </dgm:layoutNode>
-                                    <dgm:layoutNode name="text4" styleLbl="fgAcc4">
-                                      <dgm:varLst>
-                                        <dgm:chPref val="3"/>
-                                      </dgm:varLst>
-                                      <dgm:alg type="tx"/>
-                                      <dgm:shape xmlns:r="http://schemas.openxmlformats.org/officeDocument/2006/relationships" type="roundRect" r:blip="">
-                                        <dgm:adjLst>
-                                          <dgm:adj idx="1" val="0.1"/>
-                                        </dgm:adjLst>
-                                      </dgm:shape>
-                                      <dgm:presOf axis="self"/>
-                                      <dgm:constrLst>
-                                        <dgm:constr type="tMarg" refType="primFontSz" fact="0.3"/>
-                                        <dgm:constr type="bMarg" refType="primFontSz" fact="0.3"/>
-                                        <dgm:constr type="lMarg" refType="primFontSz" fact="0.3"/>
-                                        <dgm:constr type="rMarg" refType="primFontSz" fact="0.3"/>
-                                      </dgm:constrLst>
-                                      <dgm:ruleLst>
-                                        <dgm:rule type="primFontSz" val="5" fact="NaN" max="NaN"/>
-                                      </dgm:ruleLst>
-                                    </dgm:layoutNode>
-                                  </dgm:layoutNode>
-                                  <dgm:layoutNode name="hierChild5">
-                                    <dgm:choose name="Name28">
-                                      <dgm:if name="Name29" func="var" arg="dir" op="equ" val="norm">
-                                        <dgm:alg type="hierChild">
-                                          <dgm:param type="linDir" val="fromL"/>
-                                        </dgm:alg>
-                                      </dgm:if>
-                                      <dgm:else name="Name30">
-                                        <dgm:alg type="hierChild">
-                                          <dgm:param type="linDir" val="fromR"/>
-                                        </dgm:alg>
-                                      </dgm:else>
-                                    </dgm:choose>
-                                    <dgm:shape xmlns:r="http://schemas.openxmlformats.org/officeDocument/2006/relationships" r:blip="">
-                                      <dgm:adjLst/>
-                                    </dgm:shape>
-                                    <dgm:presOf/>
-                                    <dgm:constrLst/>
-                                    <dgm:ruleLst/>
-                                    <dgm:forEach name="Name31" ref="repeat"/>
-                                  </dgm:layoutNode>
-                                </dgm:layoutNode>
-                              </dgm:forEach>
-                            </dgm:forEach>
-                          </dgm:layoutNode>
-                        </dgm:layoutNode>
-                      </dgm:forEach>
-                    </dgm:forEach>
-                  </dgm:layoutNode>
-                </dgm:layoutNode>
-              </dgm:forEach>
-            </dgm:forEach>
-          </dgm:layoutNode>
-        </dgm:layoutNode>
-      </dgm:forEach>
-    </dgm:forEach>
-  </dgm:layoutNode>
-</dgm:layoutDef>
-</file>
-
-<file path=ppt/diagrams/quickStyle1.xml><?xml version="1.0" encoding="utf-8"?>
-<dgm:styleDef xmlns:dgm="http://schemas.openxmlformats.org/drawingml/2006/diagram" xmlns:a="http://schemas.openxmlformats.org/drawingml/2006/main" uniqueId="urn:microsoft.com/office/officeart/2005/8/quickstyle/simple4">
-  <dgm:title val=""/>
-  <dgm:desc val=""/>
-  <dgm:catLst>
-    <dgm:cat type="simple" pri="10400"/>
-  </dgm:catLst>
-  <dgm:scene3d>
-    <a:camera prst="orthographicFront"/>
-    <a:lightRig rig="threePt" dir="t"/>
-  </dgm:scene3d>
-  <dgm:styleLbl name="node0">
-    <dgm:scene3d>
-      <a:camera prst="orthographicFront"/>
-      <a:lightRig rig="threePt" dir="t"/>
-    </dgm:scene3d>
-    <dgm:sp3d/>
-    <dgm:txPr/>
-    <dgm:style>
-      <a:lnRef idx="0">
-        <a:scrgbClr r="0" g="0" b="0"/>
-      </a:lnRef>
-      <a:fillRef idx="3">
-        <a:scrgbClr r="0" g="0" b="0"/>
-      </a:fillRef>
-      <a:effectRef idx="2">
-        <a:scrgbClr r="0" g="0" b="0"/>
-      </a:effectRef>
-      <a:fontRef idx="minor">
-        <a:schemeClr val="lt1"/>
-      </a:fontRef>
-    </dgm:style>
-  </dgm:styleLbl>
-  <dgm:styleLbl name="lnNode1">
-    <dgm:scene3d>
-      <a:camera prst="orthographicFront"/>
-      <a:lightRig rig="threePt" dir="t"/>
-    </dgm:scene3d>
-    <dgm:sp3d/>
-    <dgm:txPr/>
-    <dgm:style>
-      <a:lnRef idx="1">
-        <a:scrgbClr r="0" g="0" b="0"/>
-      </a:lnRef>
-      <a:fillRef idx="3">
-        <a:scrgbClr r="0" g="0" b="0"/>
-      </a:fillRef>
-      <a:effectRef idx="2">
-        <a:scrgbClr r="0" g="0" b="0"/>
-      </a:effectRef>
-      <a:fontRef idx="minor">
-        <a:schemeClr val="lt1"/>
-      </a:fontRef>
-    </dgm:style>
-  </dgm:styleLbl>
-  <dgm:styleLbl name="vennNode1">
-    <dgm:scene3d>
-      <a:camera prst="orthographicFront"/>
-      <a:lightRig rig="threePt" dir="t"/>
-    </dgm:scene3d>
-    <dgm:sp3d/>
-    <dgm:txPr/>
-    <dgm:style>
-      <a:lnRef idx="0">
-        <a:scrgbClr r="0" g="0" b="0"/>
-      </a:lnRef>
-      <a:fillRef idx="3">
-        <a:scrgbClr r="0" g="0" b="0"/>
-      </a:fillRef>
-      <a:effectRef idx="0">
-        <a:scrgbClr r="0" g="0" b="0"/>
-      </a:effectRef>
-      <a:fontRef idx="minor">
-        <a:schemeClr val="tx1"/>
-      </a:fontRef>
-    </dgm:style>
-  </dgm:styleLbl>
-  <dgm:styleLbl name="alignNode1">
-    <dgm:scene3d>
-      <a:camera prst="orthographicFront"/>
-      <a:lightRig rig="threePt" dir="t"/>
-    </dgm:scene3d>
-    <dgm:sp3d/>
-    <dgm:txPr/>
-    <dgm:style>
-      <a:lnRef idx="1">
-        <a:scrgbClr r="0" g="0" b="0"/>
-      </a:lnRef>
-      <a:fillRef idx="3">
-        <a:scrgbClr r="0" g="0" b="0"/>
-      </a:fillRef>
-      <a:effectRef idx="2">
-        <a:scrgbClr r="0" g="0" b="0"/>
-      </a:effectRef>
-      <a:fontRef idx="minor">
-        <a:schemeClr val="lt1"/>
-      </a:fontRef>
-    </dgm:style>
-  </dgm:styleLbl>
-  <dgm:styleLbl name="node1">
-    <dgm:scene3d>
-      <a:camera prst="orthographicFront"/>
-      <a:lightRig rig="threePt" dir="t"/>
-    </dgm:scene3d>
-    <dgm:sp3d/>
-    <dgm:txPr/>
-    <dgm:style>
-      <a:lnRef idx="0">
-        <a:scrgbClr r="0" g="0" b="0"/>
-      </a:lnRef>
-      <a:fillRef idx="3">
-        <a:scrgbClr r="0" g="0" b="0"/>
-      </a:fillRef>
-      <a:effectRef idx="2">
-        <a:scrgbClr r="0" g="0" b="0"/>
-      </a:effectRef>
-      <a:fontRef idx="minor">
-        <a:schemeClr val="lt1"/>
-      </a:fontRef>
-    </dgm:style>
-  </dgm:styleLbl>
-  <dgm:styleLbl name="node2">
-    <dgm:scene3d>
-      <a:camera prst="orthographicFront"/>
-      <a:lightRig rig="threePt" dir="t"/>
-    </dgm:scene3d>
-    <dgm:sp3d/>
-    <dgm:txPr/>
-    <dgm:style>
-      <a:lnRef idx="0">
-        <a:scrgbClr r="0" g="0" b="0"/>
-      </a:lnRef>
-      <a:fillRef idx="3">
-        <a:scrgbClr r="0" g="0" b="0"/>
-      </a:fillRef>
-      <a:effectRef idx="2">
-        <a:scrgbClr r="0" g="0" b="0"/>
-      </a:effectRef>
-      <a:fontRef idx="minor">
-        <a:schemeClr val="lt1"/>
-      </a:fontRef>
-    </dgm:style>
-  </dgm:styleLbl>
-  <dgm:styleLbl name="node3">
-    <dgm:scene3d>
-      <a:camera prst="orthographicFront"/>
-      <a:lightRig rig="threePt" dir="t"/>
-    </dgm:scene3d>
-    <dgm:sp3d/>
-    <dgm:txPr/>
-    <dgm:style>
-      <a:lnRef idx="0">
-        <a:scrgbClr r="0" g="0" b="0"/>
-      </a:lnRef>
-      <a:fillRef idx="3">
-        <a:scrgbClr r="0" g="0" b="0"/>
-      </a:fillRef>
-      <a:effectRef idx="2">
-        <a:scrgbClr r="0" g="0" b="0"/>
-      </a:effectRef>
-      <a:fontRef idx="minor">
-        <a:schemeClr val="lt1"/>
-      </a:fontRef>
-    </dgm:style>
-  </dgm:styleLbl>
-  <dgm:styleLbl name="node4">
-    <dgm:scene3d>
-      <a:camera prst="orthographicFront"/>
-      <a:lightRig rig="threePt" dir="t"/>
-    </dgm:scene3d>
-    <dgm:sp3d/>
-    <dgm:txPr/>
-    <dgm:style>
-      <a:lnRef idx="0">
-        <a:scrgbClr r="0" g="0" b="0"/>
-      </a:lnRef>
-      <a:fillRef idx="3">
-        <a:scrgbClr r="0" g="0" b="0"/>
-      </a:fillRef>
-      <a:effectRef idx="2">
-        <a:scrgbClr r="0" g="0" b="0"/>
-      </a:effectRef>
-      <a:fontRef idx="minor">
-        <a:schemeClr val="lt1"/>
-      </a:fontRef>
-    </dgm:style>
-  </dgm:styleLbl>
-  <dgm:styleLbl name="fgImgPlace1">
-    <dgm:scene3d>
-      <a:camera prst="orthographicFront"/>
-      <a:lightRig rig="threePt" dir="t"/>
-    </dgm:scene3d>
-    <dgm:sp3d/>
-    <dgm:txPr/>
-    <dgm:style>
-      <a:lnRef idx="0">
-        <a:scrgbClr r="0" g="0" b="0"/>
-      </a:lnRef>
-      <a:fillRef idx="1">
-        <a:scrgbClr r="0" g="0" b="0"/>
-      </a:fillRef>
-      <a:effectRef idx="2">
-        <a:scrgbClr r="0" g="0" b="0"/>
-      </a:effectRef>
-      <a:fontRef idx="minor"/>
-    </dgm:style>
-  </dgm:styleLbl>
-  <dgm:styleLbl name="alignImgPlace1">
-    <dgm:scene3d>
-      <a:camera prst="orthographicFront"/>
-      <a:lightRig rig="threePt" dir="t"/>
-    </dgm:scene3d>
-    <dgm:sp3d/>
-    <dgm:txPr/>
-    <dgm:style>
-      <a:lnRef idx="0">
-        <a:scrgbClr r="0" g="0" b="0"/>
-      </a:lnRef>
-      <a:fillRef idx="1">
-        <a:scrgbClr r="0" g="0" b="0"/>
-      </a:fillRef>
-      <a:effectRef idx="2">
-        <a:scrgbClr r="0" g="0" b="0"/>
-      </a:effectRef>
-      <a:fontRef idx="minor"/>
-    </dgm:style>
-  </dgm:styleLbl>
-  <dgm:styleLbl name="bgImgPlace1">
-    <dgm:scene3d>
-      <a:camera prst="orthographicFront"/>
-      <a:lightRig rig="threePt" dir="t"/>
-    </dgm:scene3d>
-    <dgm:sp3d/>
-    <dgm:txPr/>
-    <dgm:style>
-      <a:lnRef idx="0">
-        <a:scrgbClr r="0" g="0" b="0"/>
-      </a:lnRef>
-      <a:fillRef idx="1">
-        <a:scrgbClr r="0" g="0" b="0"/>
-      </a:fillRef>
-      <a:effectRef idx="2">
-        <a:scrgbClr r="0" g="0" b="0"/>
-      </a:effectRef>
-      <a:fontRef idx="minor"/>
-    </dgm:style>
-  </dgm:styleLbl>
-  <dgm:styleLbl name="sibTrans2D1">
-    <dgm:scene3d>
-      <a:camera prst="orthographicFront"/>
-      <a:lightRig rig="threePt" dir="t"/>
-    </dgm:scene3d>
-    <dgm:sp3d/>
-    <dgm:txPr/>
-    <dgm:style>
-      <a:lnRef idx="0">
-        <a:scrgbClr r="0" g="0" b="0"/>
-      </a:lnRef>
-      <a:fillRef idx="3">
-        <a:scrgbClr r="0" g="0" b="0"/>
-      </a:fillRef>
-      <a:effectRef idx="2">
-        <a:scrgbClr r="0" g="0" b="0"/>
-      </a:effectRef>
-      <a:fontRef idx="minor">
-        <a:schemeClr val="lt1"/>
-      </a:fontRef>
-    </dgm:style>
-  </dgm:styleLbl>
-  <dgm:styleLbl name="fgSibTrans2D1">
-    <dgm:scene3d>
-      <a:camera prst="orthographicFront"/>
-      <a:lightRig rig="threePt" dir="t"/>
-    </dgm:scene3d>
-    <dgm:sp3d/>
-    <dgm:txPr/>
-    <dgm:style>
-      <a:lnRef idx="0">
-        <a:scrgbClr r="0" g="0" b="0"/>
-      </a:lnRef>
-      <a:fillRef idx="3">
-        <a:scrgbClr r="0" g="0" b="0"/>
-      </a:fillRef>
-      <a:effectRef idx="2">
-        <a:scrgbClr r="0" g="0" b="0"/>
-      </a:effectRef>
-      <a:fontRef idx="minor">
-        <a:schemeClr val="lt1"/>
-      </a:fontRef>
-    </dgm:style>
-  </dgm:styleLbl>
-  <dgm:styleLbl name="bgSibTrans2D1">
-    <dgm:scene3d>
-      <a:camera prst="orthographicFront"/>
-      <a:lightRig rig="threePt" dir="t"/>
-    </dgm:scene3d>
-    <dgm:sp3d/>
-    <dgm:txPr/>
-    <dgm:style>
-      <a:lnRef idx="0">
-        <a:scrgbClr r="0" g="0" b="0"/>
-      </a:lnRef>
-      <a:fillRef idx="3">
-        <a:scrgbClr r="0" g="0" b="0"/>
-      </a:fillRef>
-      <a:effectRef idx="2">
-        <a:scrgbClr r="0" g="0" b="0"/>
-      </a:effectRef>
-      <a:fontRef idx="minor">
-        <a:schemeClr val="lt1"/>
-      </a:fontRef>
-    </dgm:style>
-  </dgm:styleLbl>
-  <dgm:styleLbl name="sibTrans1D1">
-    <dgm:scene3d>
-      <a:camera prst="orthographicFront"/>
-      <a:lightRig rig="threePt" dir="t"/>
-    </dgm:scene3d>
-    <dgm:sp3d/>
-    <dgm:txPr/>
-    <dgm:style>
-      <a:lnRef idx="1">
-        <a:scrgbClr r="0" g="0" b="0"/>
-      </a:lnRef>
-      <a:fillRef idx="0">
-        <a:scrgbClr r="0" g="0" b="0"/>
-      </a:fillRef>
-      <a:effectRef idx="0">
-        <a:scrgbClr r="0" g="0" b="0"/>
-      </a:effectRef>
-      <a:fontRef idx="minor"/>
-    </dgm:style>
-  </dgm:styleLbl>
-  <dgm:styleLbl name="callout">
-    <dgm:scene3d>
-      <a:camera prst="orthographicFront"/>
-      <a:lightRig rig="threePt" dir="t"/>
-    </dgm:scene3d>
-    <dgm:sp3d/>
-    <dgm:txPr/>
-    <dgm:style>
-      <a:lnRef idx="2">
-        <a:scrgbClr r="0" g="0" b="0"/>
-      </a:lnRef>
-      <a:fillRef idx="1">
-        <a:scrgbClr r="0" g="0" b="0"/>
-      </a:fillRef>
-      <a:effectRef idx="1">
-        <a:scrgbClr r="0" g="0" b="0"/>
-      </a:effectRef>
-      <a:fontRef idx="minor"/>
-    </dgm:style>
-  </dgm:styleLbl>
-  <dgm:styleLbl name="asst0">
-    <dgm:scene3d>
-      <a:camera prst="orthographicFront"/>
-      <a:lightRig rig="threePt" dir="t"/>
-    </dgm:scene3d>
-    <dgm:sp3d/>
-    <dgm:txPr/>
-    <dgm:style>
-      <a:lnRef idx="0">
-        <a:scrgbClr r="0" g="0" b="0"/>
-      </a:lnRef>
-      <a:fillRef idx="3">
-        <a:scrgbClr r="0" g="0" b="0"/>
-      </a:fillRef>
-      <a:effectRef idx="2">
-        <a:scrgbClr r="0" g="0" b="0"/>
-      </a:effectRef>
-      <a:fontRef idx="minor">
-        <a:schemeClr val="lt1"/>
-      </a:fontRef>
-    </dgm:style>
-  </dgm:styleLbl>
-  <dgm:styleLbl name="asst1">
-    <dgm:scene3d>
-      <a:camera prst="orthographicFront"/>
-      <a:lightRig rig="threePt" dir="t"/>
-    </dgm:scene3d>
-    <dgm:sp3d/>
-    <dgm:txPr/>
-    <dgm:style>
-      <a:lnRef idx="0">
-        <a:scrgbClr r="0" g="0" b="0"/>
-      </a:lnRef>
-      <a:fillRef idx="3">
-        <a:scrgbClr r="0" g="0" b="0"/>
-      </a:fillRef>
-      <a:effectRef idx="2">
-        <a:scrgbClr r="0" g="0" b="0"/>
-      </a:effectRef>
-      <a:fontRef idx="minor">
-        <a:schemeClr val="lt1"/>
-      </a:fontRef>
-    </dgm:style>
-  </dgm:styleLbl>
-  <dgm:styleLbl name="asst2">
-    <dgm:scene3d>
-      <a:camera prst="orthographicFront"/>
-      <a:lightRig rig="threePt" dir="t"/>
-    </dgm:scene3d>
-    <dgm:sp3d/>
-    <dgm:txPr/>
-    <dgm:style>
-      <a:lnRef idx="0">
-        <a:scrgbClr r="0" g="0" b="0"/>
-      </a:lnRef>
-      <a:fillRef idx="3">
-        <a:scrgbClr r="0" g="0" b="0"/>
-      </a:fillRef>
-      <a:effectRef idx="2">
-        <a:scrgbClr r="0" g="0" b="0"/>
-      </a:effectRef>
-      <a:fontRef idx="minor">
-        <a:schemeClr val="lt1"/>
-      </a:fontRef>
-    </dgm:style>
-  </dgm:styleLbl>
-  <dgm:styleLbl name="asst3">
-    <dgm:scene3d>
-      <a:camera prst="orthographicFront"/>
-      <a:lightRig rig="threePt" dir="t"/>
-    </dgm:scene3d>
-    <dgm:sp3d/>
-    <dgm:txPr/>
-    <dgm:style>
-      <a:lnRef idx="0">
-        <a:scrgbClr r="0" g="0" b="0"/>
-      </a:lnRef>
-      <a:fillRef idx="3">
-        <a:scrgbClr r="0" g="0" b="0"/>
-      </a:fillRef>
-      <a:effectRef idx="2">
-        <a:scrgbClr r="0" g="0" b="0"/>
-      </a:effectRef>
-      <a:fontRef idx="minor">
-        <a:schemeClr val="lt1"/>
-      </a:fontRef>
-    </dgm:style>
-  </dgm:styleLbl>
-  <dgm:styleLbl name="asst4">
-    <dgm:scene3d>
-      <a:camera prst="orthographicFront"/>
-      <a:lightRig rig="threePt" dir="t"/>
-    </dgm:scene3d>
-    <dgm:sp3d/>
-    <dgm:txPr/>
-    <dgm:style>
-      <a:lnRef idx="0">
-        <a:scrgbClr r="0" g="0" b="0"/>
-      </a:lnRef>
-      <a:fillRef idx="3">
-        <a:scrgbClr r="0" g="0" b="0"/>
-      </a:fillRef>
-      <a:effectRef idx="2">
-        <a:scrgbClr r="0" g="0" b="0"/>
-      </a:effectRef>
-      <a:fontRef idx="minor">
-        <a:schemeClr val="lt1"/>
-      </a:fontRef>
-    </dgm:style>
-  </dgm:styleLbl>
-  <dgm:styleLbl name="parChTrans2D1">
-    <dgm:scene3d>
-      <a:camera prst="orthographicFront"/>
-      <a:lightRig rig="threePt" dir="t"/>
-    </dgm:scene3d>
-    <dgm:sp3d/>
-    <dgm:txPr/>
-    <dgm:style>
-      <a:lnRef idx="0">
-        <a:scrgbClr r="0" g="0" b="0"/>
-      </a:lnRef>
-      <a:fillRef idx="3">
-        <a:scrgbClr r="0" g="0" b="0"/>
-      </a:fillRef>
-      <a:effectRef idx="2">
-        <a:scrgbClr r="0" g="0" b="0"/>
-      </a:effectRef>
-      <a:fontRef idx="minor">
-        <a:schemeClr val="lt1"/>
-      </a:fontRef>
-    </dgm:style>
-  </dgm:styleLbl>
-  <dgm:styleLbl name="parChTrans2D2">
-    <dgm:scene3d>
-      <a:camera prst="orthographicFront"/>
-      <a:lightRig rig="threePt" dir="t"/>
-    </dgm:scene3d>
-    <dgm:sp3d/>
-    <dgm:txPr/>
-    <dgm:style>
-      <a:lnRef idx="0">
-        <a:scrgbClr r="0" g="0" b="0"/>
-      </a:lnRef>
-      <a:fillRef idx="3">
-        <a:scrgbClr r="0" g="0" b="0"/>
-      </a:fillRef>
-      <a:effectRef idx="2">
-        <a:scrgbClr r="0" g="0" b="0"/>
-      </a:effectRef>
-      <a:fontRef idx="minor">
-        <a:schemeClr val="lt1"/>
-      </a:fontRef>
-    </dgm:style>
-  </dgm:styleLbl>
-  <dgm:styleLbl name="parChTrans2D3">
-    <dgm:scene3d>
-      <a:camera prst="orthographicFront"/>
-      <a:lightRig rig="threePt" dir="t"/>
-    </dgm:scene3d>
-    <dgm:sp3d/>
-    <dgm:txPr/>
-    <dgm:style>
-      <a:lnRef idx="1">
-        <a:scrgbClr r="0" g="0" b="0"/>
-      </a:lnRef>
-      <a:fillRef idx="3">
-        <a:scrgbClr r="0" g="0" b="0"/>
-      </a:fillRef>
-      <a:effectRef idx="2">
-        <a:scrgbClr r="0" g="0" b="0"/>
-      </a:effectRef>
-      <a:fontRef idx="minor">
-        <a:schemeClr val="lt1"/>
-      </a:fontRef>
-    </dgm:style>
-  </dgm:styleLbl>
-  <dgm:styleLbl name="parChTrans2D4">
-    <dgm:scene3d>
-      <a:camera prst="orthographicFront"/>
-      <a:lightRig rig="threePt" dir="t"/>
-    </dgm:scene3d>
-    <dgm:sp3d/>
-    <dgm:txPr/>
-    <dgm:style>
-      <a:lnRef idx="1">
-        <a:scrgbClr r="0" g="0" b="0"/>
-      </a:lnRef>
-      <a:fillRef idx="3">
-        <a:scrgbClr r="0" g="0" b="0"/>
-      </a:fillRef>
-      <a:effectRef idx="2">
-        <a:scrgbClr r="0" g="0" b="0"/>
-      </a:effectRef>
-      <a:fontRef idx="minor">
-        <a:schemeClr val="lt1"/>
-      </a:fontRef>
-    </dgm:style>
-  </dgm:styleLbl>
-  <dgm:styleLbl name="parChTrans1D1">
-    <dgm:scene3d>
-      <a:camera prst="orthographicFront"/>
-      <a:lightRig rig="threePt" dir="t"/>
-    </dgm:scene3d>
-    <dgm:sp3d/>
-    <dgm:txPr/>
-    <dgm:style>
-      <a:lnRef idx="1">
-        <a:scrgbClr r="0" g="0" b="0"/>
-      </a:lnRef>
-      <a:fillRef idx="0">
-        <a:scrgbClr r="0" g="0" b="0"/>
-      </a:fillRef>
-      <a:effectRef idx="0">
-        <a:scrgbClr r="0" g="0" b="0"/>
-      </a:effectRef>
-      <a:fontRef idx="minor"/>
-    </dgm:style>
-  </dgm:styleLbl>
-  <dgm:styleLbl name="parChTrans1D2">
-    <dgm:scene3d>
-      <a:camera prst="orthographicFront"/>
-      <a:lightRig rig="threePt" dir="t"/>
-    </dgm:scene3d>
-    <dgm:sp3d/>
-    <dgm:txPr/>
-    <dgm:style>
-      <a:lnRef idx="1">
-        <a:scrgbClr r="0" g="0" b="0"/>
-      </a:lnRef>
-      <a:fillRef idx="0">
-        <a:scrgbClr r="0" g="0" b="0"/>
-      </a:fillRef>
-      <a:effectRef idx="0">
-        <a:scrgbClr r="0" g="0" b="0"/>
-      </a:effectRef>
-      <a:fontRef idx="minor"/>
-    </dgm:style>
-  </dgm:styleLbl>
-  <dgm:styleLbl name="parChTrans1D3">
-    <dgm:scene3d>
-      <a:camera prst="orthographicFront"/>
-      <a:lightRig rig="threePt" dir="t"/>
-    </dgm:scene3d>
-    <dgm:sp3d/>
-    <dgm:txPr/>
-    <dgm:style>
-      <a:lnRef idx="1">
-        <a:scrgbClr r="0" g="0" b="0"/>
-      </a:lnRef>
-      <a:fillRef idx="0">
-        <a:scrgbClr r="0" g="0" b="0"/>
-      </a:fillRef>
-      <a:effectRef idx="0">
-        <a:scrgbClr r="0" g="0" b="0"/>
-      </a:effectRef>
-      <a:fontRef idx="minor"/>
-    </dgm:style>
-  </dgm:styleLbl>
-  <dgm:styleLbl name="parChTrans1D4">
-    <dgm:scene3d>
-      <a:camera prst="orthographicFront"/>
-      <a:lightRig rig="threePt" dir="t"/>
-    </dgm:scene3d>
-    <dgm:sp3d/>
-    <dgm:txPr/>
-    <dgm:style>
-      <a:lnRef idx="1">
-        <a:scrgbClr r="0" g="0" b="0"/>
-      </a:lnRef>
-      <a:fillRef idx="0">
-        <a:scrgbClr r="0" g="0" b="0"/>
-      </a:fillRef>
-      <a:effectRef idx="0">
-        <a:scrgbClr r="0" g="0" b="0"/>
-      </a:effectRef>
-      <a:fontRef idx="minor"/>
-    </dgm:style>
-  </dgm:styleLbl>
-  <dgm:styleLbl name="fgAcc1">
-    <dgm:scene3d>
-      <a:camera prst="orthographicFront"/>
-      <a:lightRig rig="threePt" dir="t"/>
-    </dgm:scene3d>
-    <dgm:sp3d/>
-    <dgm:txPr/>
-    <dgm:style>
-      <a:lnRef idx="1">
-        <a:scrgbClr r="0" g="0" b="0"/>
-      </a:lnRef>
-      <a:fillRef idx="1">
-        <a:scrgbClr r="0" g="0" b="0"/>
-      </a:fillRef>
-      <a:effectRef idx="0">
-        <a:scrgbClr r="0" g="0" b="0"/>
-      </a:effectRef>
-      <a:fontRef idx="minor"/>
-    </dgm:style>
-  </dgm:styleLbl>
-  <dgm:styleLbl name="conFgAcc1">
-    <dgm:scene3d>
-      <a:camera prst="orthographicFront"/>
-      <a:lightRig rig="threePt" dir="t"/>
-    </dgm:scene3d>
-    <dgm:sp3d/>
-    <dgm:txPr/>
-    <dgm:style>
-      <a:lnRef idx="1">
-        <a:scrgbClr r="0" g="0" b="0"/>
-      </a:lnRef>
-      <a:fillRef idx="1">
-        <a:scrgbClr r="0" g="0" b="0"/>
-      </a:fillRef>
-      <a:effectRef idx="0">
-        <a:scrgbClr r="0" g="0" b="0"/>
-      </a:effectRef>
-      <a:fontRef idx="minor"/>
-    </dgm:style>
-  </dgm:styleLbl>
-  <dgm:styleLbl name="alignAcc1">
-    <dgm:scene3d>
-      <a:camera prst="orthographicFront"/>
-      <a:lightRig rig="threePt" dir="t"/>
-    </dgm:scene3d>
-    <dgm:sp3d/>
-    <dgm:txPr/>
-    <dgm:style>
-      <a:lnRef idx="1">
-        <a:scrgbClr r="0" g="0" b="0"/>
-      </a:lnRef>
-      <a:fillRef idx="1">
-        <a:scrgbClr r="0" g="0" b="0"/>
-      </a:fillRef>
-      <a:effectRef idx="0">
-        <a:scrgbClr r="0" g="0" b="0"/>
-      </a:effectRef>
-      <a:fontRef idx="minor"/>
-    </dgm:style>
-  </dgm:styleLbl>
-  <dgm:styleLbl name="trAlignAcc1">
-    <dgm:scene3d>
-      <a:camera prst="orthographicFront"/>
-      <a:lightRig rig="threePt" dir="t"/>
-    </dgm:scene3d>
-    <dgm:sp3d/>
-    <dgm:txPr/>
-    <dgm:style>
-      <a:lnRef idx="1">
-        <a:scrgbClr r="0" g="0" b="0"/>
-      </a:lnRef>
-      <a:fillRef idx="1">
-        <a:scrgbClr r="0" g="0" b="0"/>
-      </a:fillRef>
-      <a:effectRef idx="0">
-        <a:scrgbClr r="0" g="0" b="0"/>
-      </a:effectRef>
-      <a:fontRef idx="minor"/>
-    </dgm:style>
-  </dgm:styleLbl>
-  <dgm:styleLbl name="bgAcc1">
-    <dgm:scene3d>
-      <a:camera prst="orthographicFront"/>
-      <a:lightRig rig="threePt" dir="t"/>
-    </dgm:scene3d>
-    <dgm:sp3d/>
-    <dgm:txPr/>
-    <dgm:style>
-      <a:lnRef idx="1">
-        <a:scrgbClr r="0" g="0" b="0"/>
-      </a:lnRef>
-      <a:fillRef idx="1">
-        <a:scrgbClr r="0" g="0" b="0"/>
-      </a:fillRef>
-      <a:effectRef idx="0">
-        <a:scrgbClr r="0" g="0" b="0"/>
-      </a:effectRef>
-      <a:fontRef idx="minor"/>
-    </dgm:style>
-  </dgm:styleLbl>
-  <dgm:styleLbl name="solidFgAcc1">
-    <dgm:scene3d>
-      <a:camera prst="orthographicFront"/>
-      <a:lightRig rig="threePt" dir="t"/>
-    </dgm:scene3d>
-    <dgm:sp3d/>
-    <dgm:txPr/>
-    <dgm:style>
-      <a:lnRef idx="1">
-        <a:scrgbClr r="0" g="0" b="0"/>
-      </a:lnRef>
-      <a:fillRef idx="1">
-        <a:scrgbClr r="0" g="0" b="0"/>
-      </a:fillRef>
-      <a:effectRef idx="0">
-        <a:scrgbClr r="0" g="0" b="0"/>
-      </a:effectRef>
-      <a:fontRef idx="minor"/>
-    </dgm:style>
-  </dgm:styleLbl>
-  <dgm:styleLbl name="solidAlignAcc1">
-    <dgm:scene3d>
-      <a:camera prst="orthographicFront"/>
-      <a:lightRig rig="threePt" dir="t"/>
-    </dgm:scene3d>
-    <dgm:sp3d/>
-    <dgm:txPr/>
-    <dgm:style>
-      <a:lnRef idx="1">
-        <a:scrgbClr r="0" g="0" b="0"/>
-      </a:lnRef>
-      <a:fillRef idx="1">
-        <a:scrgbClr r="0" g="0" b="0"/>
-      </a:fillRef>
-      <a:effectRef idx="0">
-        <a:scrgbClr r="0" g="0" b="0"/>
-      </a:effectRef>
-      <a:fontRef idx="minor"/>
-    </dgm:style>
-  </dgm:styleLbl>
-  <dgm:styleLbl name="solidBgAcc1">
-    <dgm:scene3d>
-      <a:camera prst="orthographicFront"/>
-      <a:lightRig rig="threePt" dir="t"/>
-    </dgm:scene3d>
-    <dgm:sp3d/>
-    <dgm:txPr/>
-    <dgm:style>
-      <a:lnRef idx="1">
-        <a:scrgbClr r="0" g="0" b="0"/>
-      </a:lnRef>
-      <a:fillRef idx="1">
-        <a:scrgbClr r="0" g="0" b="0"/>
-      </a:fillRef>
-      <a:effectRef idx="0">
-        <a:scrgbClr r="0" g="0" b="0"/>
-      </a:effectRef>
-      <a:fontRef idx="minor"/>
-    </dgm:style>
-  </dgm:styleLbl>
-  <dgm:styleLbl name="fgAccFollowNode1">
-    <dgm:scene3d>
-      <a:camera prst="orthographicFront"/>
-      <a:lightRig rig="threePt" dir="t"/>
-    </dgm:scene3d>
-    <dgm:sp3d/>
-    <dgm:txPr/>
-    <dgm:style>
-      <a:lnRef idx="1">
-        <a:scrgbClr r="0" g="0" b="0"/>
-      </a:lnRef>
-      <a:fillRef idx="1">
-        <a:scrgbClr r="0" g="0" b="0"/>
-      </a:fillRef>
-      <a:effectRef idx="0">
-        <a:scrgbClr r="0" g="0" b="0"/>
-      </a:effectRef>
-      <a:fontRef idx="minor"/>
-    </dgm:style>
-  </dgm:styleLbl>
-  <dgm:styleLbl name="alignAccFollowNode1">
-    <dgm:scene3d>
-      <a:camera prst="orthographicFront"/>
-      <a:lightRig rig="threePt" dir="t"/>
-    </dgm:scene3d>
-    <dgm:sp3d/>
-    <dgm:txPr/>
-    <dgm:style>
-      <a:lnRef idx="1">
-        <a:scrgbClr r="0" g="0" b="0"/>
-      </a:lnRef>
-      <a:fillRef idx="1">
-        <a:scrgbClr r="0" g="0" b="0"/>
-      </a:fillRef>
-      <a:effectRef idx="0">
-        <a:scrgbClr r="0" g="0" b="0"/>
-      </a:effectRef>
-      <a:fontRef idx="minor"/>
-    </dgm:style>
-  </dgm:styleLbl>
-  <dgm:styleLbl name="bgAccFollowNode1">
-    <dgm:scene3d>
-      <a:camera prst="orthographicFront"/>
-      <a:lightRig rig="threePt" dir="t"/>
-    </dgm:scene3d>
-    <dgm:sp3d/>
-    <dgm:txPr/>
-    <dgm:style>
-      <a:lnRef idx="1">
-        <a:scrgbClr r="0" g="0" b="0"/>
-      </a:lnRef>
-      <a:fillRef idx="1">
-        <a:scrgbClr r="0" g="0" b="0"/>
-      </a:fillRef>
-      <a:effectRef idx="0">
-        <a:scrgbClr r="0" g="0" b="0"/>
-      </a:effectRef>
-      <a:fontRef idx="minor"/>
-    </dgm:style>
-  </dgm:styleLbl>
-  <dgm:styleLbl name="fgAcc0">
-    <dgm:scene3d>
-      <a:camera prst="orthographicFront"/>
-      <a:lightRig rig="threePt" dir="t"/>
-    </dgm:scene3d>
-    <dgm:sp3d/>
-    <dgm:txPr/>
-    <dgm:style>
-      <a:lnRef idx="1">
-        <a:scrgbClr r="0" g="0" b="0"/>
-      </a:lnRef>
-      <a:fillRef idx="1">
-        <a:scrgbClr r="0" g="0" b="0"/>
-      </a:fillRef>
-      <a:effectRef idx="0">
-        <a:scrgbClr r="0" g="0" b="0"/>
-      </a:effectRef>
-      <a:fontRef idx="minor"/>
-    </dgm:style>
-  </dgm:styleLbl>
-  <dgm:styleLbl name="fgAcc2">
-    <dgm:scene3d>
-      <a:camera prst="orthographicFront"/>
-      <a:lightRig rig="threePt" dir="t"/>
-    </dgm:scene3d>
-    <dgm:sp3d/>
-    <dgm:txPr/>
-    <dgm:style>
-      <a:lnRef idx="1">
-        <a:scrgbClr r="0" g="0" b="0"/>
-      </a:lnRef>
-      <a:fillRef idx="1">
-        <a:scrgbClr r="0" g="0" b="0"/>
-      </a:fillRef>
-      <a:effectRef idx="0">
-        <a:scrgbClr r="0" g="0" b="0"/>
-      </a:effectRef>
-      <a:fontRef idx="minor"/>
-    </dgm:style>
-  </dgm:styleLbl>
-  <dgm:styleLbl name="fgAcc3">
-    <dgm:scene3d>
-      <a:camera prst="orthographicFront"/>
-      <a:lightRig rig="threePt" dir="t"/>
-    </dgm:scene3d>
-    <dgm:sp3d/>
-    <dgm:txPr/>
-    <dgm:style>
-      <a:lnRef idx="1">
-        <a:scrgbClr r="0" g="0" b="0"/>
-      </a:lnRef>
-      <a:fillRef idx="1">
-        <a:scrgbClr r="0" g="0" b="0"/>
-      </a:fillRef>
-      <a:effectRef idx="0">
-        <a:scrgbClr r="0" g="0" b="0"/>
-      </a:effectRef>
-      <a:fontRef idx="minor"/>
-    </dgm:style>
-  </dgm:styleLbl>
-  <dgm:styleLbl name="fgAcc4">
-    <dgm:scene3d>
-      <a:camera prst="orthographicFront"/>
-      <a:lightRig rig="threePt" dir="t"/>
-    </dgm:scene3d>
-    <dgm:sp3d/>
-    <dgm:txPr/>
-    <dgm:style>
-      <a:lnRef idx="1">
-        <a:scrgbClr r="0" g="0" b="0"/>
-      </a:lnRef>
-      <a:fillRef idx="1">
-        <a:scrgbClr r="0" g="0" b="0"/>
-      </a:fillRef>
-      <a:effectRef idx="0">
-        <a:scrgbClr r="0" g="0" b="0"/>
-      </a:effectRef>
-      <a:fontRef idx="minor"/>
-    </dgm:style>
-  </dgm:styleLbl>
-  <dgm:styleLbl name="bgShp">
-    <dgm:scene3d>
-      <a:camera prst="orthographicFront"/>
-      <a:lightRig rig="threePt" dir="t"/>
-    </dgm:scene3d>
-    <dgm:sp3d/>
-    <dgm:txPr/>
-    <dgm:style>
-      <a:lnRef idx="0">
-        <a:scrgbClr r="0" g="0" b="0"/>
-      </a:lnRef>
-      <a:fillRef idx="1">
-        <a:scrgbClr r="0" g="0" b="0"/>
-      </a:fillRef>
-      <a:effectRef idx="2">
-        <a:scrgbClr r="0" g="0" b="0"/>
-      </a:effectRef>
-      <a:fontRef idx="minor"/>
-    </dgm:style>
-  </dgm:styleLbl>
-  <dgm:styleLbl name="dkBgShp">
-    <dgm:scene3d>
-      <a:camera prst="orthographicFront"/>
-      <a:lightRig rig="threePt" dir="t"/>
-    </dgm:scene3d>
-    <dgm:sp3d/>
-    <dgm:txPr/>
-    <dgm:style>
-      <a:lnRef idx="0">
-        <a:scrgbClr r="0" g="0" b="0"/>
-      </a:lnRef>
-      <a:fillRef idx="1">
-        <a:scrgbClr r="0" g="0" b="0"/>
-      </a:fillRef>
-      <a:effectRef idx="2">
-        <a:scrgbClr r="0" g="0" b="0"/>
-      </a:effectRef>
-      <a:fontRef idx="minor"/>
-    </dgm:style>
-  </dgm:styleLbl>
-  <dgm:styleLbl name="trBgShp">
-    <dgm:scene3d>
-      <a:camera prst="orthographicFront"/>
-      <a:lightRig rig="threePt" dir="t"/>
-    </dgm:scene3d>
-    <dgm:sp3d/>
-    <dgm:txPr/>
-    <dgm:style>
-      <a:lnRef idx="0">
-        <a:scrgbClr r="0" g="0" b="0"/>
-      </a:lnRef>
-      <a:fillRef idx="1">
-        <a:scrgbClr r="0" g="0" b="0"/>
-      </a:fillRef>
-      <a:effectRef idx="0">
-        <a:scrgbClr r="0" g="0" b="0"/>
-      </a:effectRef>
-      <a:fontRef idx="minor"/>
-    </dgm:style>
-  </dgm:styleLbl>
-  <dgm:styleLbl name="fgShp">
-    <dgm:scene3d>
-      <a:camera prst="orthographicFront"/>
-      <a:lightRig rig="threePt" dir="t"/>
-    </dgm:scene3d>
-    <dgm:sp3d/>
-    <dgm:txPr/>
-    <dgm:style>
-      <a:lnRef idx="0">
-        <a:scrgbClr r="0" g="0" b="0"/>
-      </a:lnRef>
-      <a:fillRef idx="3">
-        <a:scrgbClr r="0" g="0" b="0"/>
-      </a:fillRef>
-      <a:effectRef idx="2">
-        <a:scrgbClr r="0" g="0" b="0"/>
-      </a:effectRef>
-      <a:fontRef idx="minor"/>
-    </dgm:style>
-  </dgm:styleLbl>
-  <dgm:styleLbl name="revTx">
-    <dgm:scene3d>
-      <a:camera prst="orthographicFront"/>
-      <a:lightRig rig="threePt" dir="t"/>
-    </dgm:scene3d>
-    <dgm:sp3d/>
-    <dgm:txPr/>
-    <dgm:style>
-      <a:lnRef idx="0">
-        <a:scrgbClr r="0" g="0" b="0"/>
-      </a:lnRef>
-      <a:fillRef idx="0">
-        <a:scrgbClr r="0" g="0" b="0"/>
-      </a:fillRef>
-      <a:effectRef idx="0">
-        <a:scrgbClr r="0" g="0" b="0"/>
-      </a:effectRef>
-      <a:fontRef idx="minor"/>
-    </dgm:style>
-  </dgm:styleLbl>
-</dgm:styleDef>
 </file>
 
 <file path=ppt/handoutMasters/handoutMaster1.xml><?xml version="1.0" encoding="utf-8"?>
@@ -7713,719 +4034,6 @@
 
 <file path=ppt/slideLayouts/slideLayout3.xml><?xml version="1.0" encoding="utf-8"?>
 <p:sldLayout xmlns:a="http://schemas.openxmlformats.org/drawingml/2006/main" xmlns:r="http://schemas.openxmlformats.org/officeDocument/2006/relationships" xmlns:p="http://schemas.openxmlformats.org/presentationml/2006/main" preserve="1" userDrawn="1">
-  <p:cSld name="slide1_alt">
-    <p:spTree>
-      <p:nvGrpSpPr>
-        <p:cNvPr id="1" name=""/>
-        <p:cNvGrpSpPr/>
-        <p:nvPr/>
-      </p:nvGrpSpPr>
-      <p:grpSpPr>
-        <a:xfrm>
-          <a:off x="0" y="0"/>
-          <a:ext cx="0" cy="0"/>
-          <a:chOff x="0" y="0"/>
-          <a:chExt cx="0" cy="0"/>
-        </a:xfrm>
-      </p:grpSpPr>
-      <p:graphicFrame>
-        <p:nvGraphicFramePr>
-          <p:cNvPr id="9" name="Content Placeholder 1">
-            <a:extLst>
-              <a:ext uri="{FF2B5EF4-FFF2-40B4-BE49-F238E27FC236}">
-                <a16:creationId xmlns:a16="http://schemas.microsoft.com/office/drawing/2014/main" id="{9A21C038-F1EA-52D8-E06A-976E98CE8E48}"/>
-              </a:ext>
-            </a:extLst>
-          </p:cNvPr>
-          <p:cNvGraphicFramePr>
-            <a:graphicFrameLocks/>
-          </p:cNvGraphicFramePr>
-          <p:nvPr userDrawn="1">
-            <p:extLst>
-              <p:ext uri="{D42A27DB-BD31-4B8C-83A1-F6EECF244321}">
-                <p14:modId xmlns:p14="http://schemas.microsoft.com/office/powerpoint/2010/main" val="2849300927"/>
-              </p:ext>
-            </p:extLst>
-          </p:nvPr>
-        </p:nvGraphicFramePr>
-        <p:xfrm>
-          <a:off x="172651" y="1143000"/>
-          <a:ext cx="11442700" cy="4895850"/>
-        </p:xfrm>
-        <a:graphic>
-          <a:graphicData uri="http://schemas.openxmlformats.org/drawingml/2006/diagram">
-            <dgm:relIds xmlns:dgm="http://schemas.openxmlformats.org/drawingml/2006/diagram" xmlns:r="http://schemas.openxmlformats.org/officeDocument/2006/relationships" r:dm="rId2" r:lo="rId3" r:qs="rId4" r:cs="rId5"/>
-          </a:graphicData>
-        </a:graphic>
-      </p:graphicFrame>
-      <p:sp>
-        <p:nvSpPr>
-          <p:cNvPr id="15" name="textbox4">
-            <a:extLst>
-              <a:ext uri="{FF2B5EF4-FFF2-40B4-BE49-F238E27FC236}">
-                <a16:creationId xmlns:a16="http://schemas.microsoft.com/office/drawing/2014/main" id="{A084DD2A-4F9A-125A-B1DF-98744A51FCE7}"/>
-              </a:ext>
-            </a:extLst>
-          </p:cNvPr>
-          <p:cNvSpPr>
-            <a:spLocks noGrp="1"/>
-          </p:cNvSpPr>
-          <p:nvPr>
-            <p:ph type="body" sz="quarter" idx="16"/>
-          </p:nvPr>
-        </p:nvSpPr>
-        <p:spPr>
-          <a:xfrm>
-            <a:off x="9312000" y="4177800"/>
-            <a:ext cx="2256000" cy="1232400"/>
-          </a:xfrm>
-        </p:spPr>
-        <p:txBody>
-          <a:bodyPr anchor="ctr"/>
-          <a:lstStyle>
-            <a:lvl1pPr marL="0" indent="0" algn="ctr">
-              <a:buNone/>
-              <a:defRPr sz="1400" b="0">
-                <a:solidFill>
-                  <a:schemeClr val="tx1"/>
-                </a:solidFill>
-              </a:defRPr>
-            </a:lvl1pPr>
-            <a:lvl2pPr>
-              <a:defRPr sz="2200" b="1">
-                <a:solidFill>
-                  <a:srgbClr val="4F0D1E"/>
-                </a:solidFill>
-              </a:defRPr>
-            </a:lvl2pPr>
-            <a:lvl3pPr>
-              <a:defRPr sz="2200" b="1">
-                <a:solidFill>
-                  <a:srgbClr val="4F0D1E"/>
-                </a:solidFill>
-              </a:defRPr>
-            </a:lvl3pPr>
-            <a:lvl4pPr>
-              <a:defRPr sz="2200" b="1">
-                <a:solidFill>
-                  <a:srgbClr val="4F0D1E"/>
-                </a:solidFill>
-              </a:defRPr>
-            </a:lvl4pPr>
-            <a:lvl5pPr>
-              <a:defRPr sz="2200" b="1">
-                <a:solidFill>
-                  <a:srgbClr val="4F0D1E"/>
-                </a:solidFill>
-              </a:defRPr>
-            </a:lvl5pPr>
-          </a:lstStyle>
-          <a:p>
-            <a:pPr lvl="0"/>
-            <a:endParaRPr lang="en-CA" dirty="0"/>
-          </a:p>
-        </p:txBody>
-      </p:sp>
-      <p:sp>
-        <p:nvSpPr>
-          <p:cNvPr id="14" name="textbox3">
-            <a:extLst>
-              <a:ext uri="{FF2B5EF4-FFF2-40B4-BE49-F238E27FC236}">
-                <a16:creationId xmlns:a16="http://schemas.microsoft.com/office/drawing/2014/main" id="{BC9F38DA-743C-E08B-0043-5D20351E5F84}"/>
-              </a:ext>
-            </a:extLst>
-          </p:cNvPr>
-          <p:cNvSpPr>
-            <a:spLocks noGrp="1"/>
-          </p:cNvSpPr>
-          <p:nvPr>
-            <p:ph type="body" sz="quarter" idx="15"/>
-          </p:nvPr>
-        </p:nvSpPr>
-        <p:spPr>
-          <a:xfrm>
-            <a:off x="6384000" y="4177800"/>
-            <a:ext cx="2256000" cy="1232400"/>
-          </a:xfrm>
-        </p:spPr>
-        <p:txBody>
-          <a:bodyPr anchor="ctr"/>
-          <a:lstStyle>
-            <a:lvl1pPr marL="0" indent="0" algn="ctr">
-              <a:buNone/>
-              <a:defRPr sz="1400" b="0">
-                <a:solidFill>
-                  <a:schemeClr val="tx1"/>
-                </a:solidFill>
-              </a:defRPr>
-            </a:lvl1pPr>
-            <a:lvl2pPr>
-              <a:defRPr sz="2200" b="1">
-                <a:solidFill>
-                  <a:srgbClr val="4F0D1E"/>
-                </a:solidFill>
-              </a:defRPr>
-            </a:lvl2pPr>
-            <a:lvl3pPr>
-              <a:defRPr sz="2200" b="1">
-                <a:solidFill>
-                  <a:srgbClr val="4F0D1E"/>
-                </a:solidFill>
-              </a:defRPr>
-            </a:lvl3pPr>
-            <a:lvl4pPr>
-              <a:defRPr sz="2200" b="1">
-                <a:solidFill>
-                  <a:srgbClr val="4F0D1E"/>
-                </a:solidFill>
-              </a:defRPr>
-            </a:lvl4pPr>
-            <a:lvl5pPr>
-              <a:defRPr sz="2200" b="1">
-                <a:solidFill>
-                  <a:srgbClr val="4F0D1E"/>
-                </a:solidFill>
-              </a:defRPr>
-            </a:lvl5pPr>
-          </a:lstStyle>
-          <a:p>
-            <a:pPr lvl="0"/>
-            <a:endParaRPr lang="en-CA" dirty="0"/>
-          </a:p>
-        </p:txBody>
-      </p:sp>
-      <p:sp>
-        <p:nvSpPr>
-          <p:cNvPr id="5" name="textbox2">
-            <a:extLst>
-              <a:ext uri="{FF2B5EF4-FFF2-40B4-BE49-F238E27FC236}">
-                <a16:creationId xmlns:a16="http://schemas.microsoft.com/office/drawing/2014/main" id="{064F3FCE-EDDA-507D-DA5E-86D897FD7BE7}"/>
-              </a:ext>
-            </a:extLst>
-          </p:cNvPr>
-          <p:cNvSpPr>
-            <a:spLocks noGrp="1"/>
-          </p:cNvSpPr>
-          <p:nvPr>
-            <p:ph type="body" sz="quarter" idx="14"/>
-          </p:nvPr>
-        </p:nvSpPr>
-        <p:spPr>
-          <a:xfrm>
-            <a:off x="3456000" y="4177800"/>
-            <a:ext cx="2256000" cy="1232400"/>
-          </a:xfrm>
-        </p:spPr>
-        <p:txBody>
-          <a:bodyPr anchor="ctr"/>
-          <a:lstStyle>
-            <a:lvl1pPr marL="0" indent="0" algn="ctr">
-              <a:buNone/>
-              <a:defRPr sz="1400" b="0">
-                <a:solidFill>
-                  <a:schemeClr val="tx1"/>
-                </a:solidFill>
-              </a:defRPr>
-            </a:lvl1pPr>
-            <a:lvl2pPr>
-              <a:defRPr sz="2200" b="1">
-                <a:solidFill>
-                  <a:srgbClr val="4F0D1E"/>
-                </a:solidFill>
-              </a:defRPr>
-            </a:lvl2pPr>
-            <a:lvl3pPr>
-              <a:defRPr sz="2200" b="1">
-                <a:solidFill>
-                  <a:srgbClr val="4F0D1E"/>
-                </a:solidFill>
-              </a:defRPr>
-            </a:lvl3pPr>
-            <a:lvl4pPr>
-              <a:defRPr sz="2200" b="1">
-                <a:solidFill>
-                  <a:srgbClr val="4F0D1E"/>
-                </a:solidFill>
-              </a:defRPr>
-            </a:lvl4pPr>
-            <a:lvl5pPr>
-              <a:defRPr sz="2200" b="1">
-                <a:solidFill>
-                  <a:srgbClr val="4F0D1E"/>
-                </a:solidFill>
-              </a:defRPr>
-            </a:lvl5pPr>
-          </a:lstStyle>
-          <a:p>
-            <a:pPr lvl="0"/>
-            <a:endParaRPr lang="en-CA" dirty="0"/>
-          </a:p>
-        </p:txBody>
-      </p:sp>
-      <p:sp>
-        <p:nvSpPr>
-          <p:cNvPr id="4" name="textbox1">
-            <a:extLst>
-              <a:ext uri="{FF2B5EF4-FFF2-40B4-BE49-F238E27FC236}">
-                <a16:creationId xmlns:a16="http://schemas.microsoft.com/office/drawing/2014/main" id="{4ECC911B-8E63-FE26-297E-5C6ECEE3C393}"/>
-              </a:ext>
-            </a:extLst>
-          </p:cNvPr>
-          <p:cNvSpPr>
-            <a:spLocks noGrp="1"/>
-          </p:cNvSpPr>
-          <p:nvPr>
-            <p:ph type="body" sz="quarter" idx="13"/>
-          </p:nvPr>
-        </p:nvSpPr>
-        <p:spPr>
-          <a:xfrm>
-            <a:off x="542400" y="4177800"/>
-            <a:ext cx="2256000" cy="1232400"/>
-          </a:xfrm>
-        </p:spPr>
-        <p:txBody>
-          <a:bodyPr anchor="ctr"/>
-          <a:lstStyle>
-            <a:lvl1pPr marL="0" indent="0" algn="ctr">
-              <a:buNone/>
-              <a:defRPr sz="1400" b="0">
-                <a:solidFill>
-                  <a:schemeClr val="tx1"/>
-                </a:solidFill>
-              </a:defRPr>
-            </a:lvl1pPr>
-            <a:lvl2pPr>
-              <a:defRPr sz="2200" b="1">
-                <a:solidFill>
-                  <a:srgbClr val="4F0D1E"/>
-                </a:solidFill>
-              </a:defRPr>
-            </a:lvl2pPr>
-            <a:lvl3pPr>
-              <a:defRPr sz="2200" b="1">
-                <a:solidFill>
-                  <a:srgbClr val="4F0D1E"/>
-                </a:solidFill>
-              </a:defRPr>
-            </a:lvl3pPr>
-            <a:lvl4pPr>
-              <a:defRPr sz="2200" b="1">
-                <a:solidFill>
-                  <a:srgbClr val="4F0D1E"/>
-                </a:solidFill>
-              </a:defRPr>
-            </a:lvl4pPr>
-            <a:lvl5pPr>
-              <a:defRPr sz="2200" b="1">
-                <a:solidFill>
-                  <a:srgbClr val="4F0D1E"/>
-                </a:solidFill>
-              </a:defRPr>
-            </a:lvl5pPr>
-          </a:lstStyle>
-          <a:p>
-            <a:pPr lvl="0"/>
-            <a:endParaRPr lang="en-CA" dirty="0"/>
-          </a:p>
-        </p:txBody>
-      </p:sp>
-      <p:sp>
-        <p:nvSpPr>
-          <p:cNvPr id="2" name="textbox0">
-            <a:extLst>
-              <a:ext uri="{FF2B5EF4-FFF2-40B4-BE49-F238E27FC236}">
-                <a16:creationId xmlns:a16="http://schemas.microsoft.com/office/drawing/2014/main" id="{709F9439-43E1-81CB-62EE-D384B4D423F1}"/>
-              </a:ext>
-            </a:extLst>
-          </p:cNvPr>
-          <p:cNvSpPr>
-            <a:spLocks noGrp="1"/>
-          </p:cNvSpPr>
-          <p:nvPr>
-            <p:ph type="body" sz="quarter" idx="12"/>
-          </p:nvPr>
-        </p:nvSpPr>
-        <p:spPr>
-          <a:xfrm>
-            <a:off x="4896000" y="1905000"/>
-            <a:ext cx="2256000" cy="1371600"/>
-          </a:xfrm>
-        </p:spPr>
-        <p:txBody>
-          <a:bodyPr anchor="ctr"/>
-          <a:lstStyle>
-            <a:lvl1pPr marL="0" indent="0" algn="ctr">
-              <a:buNone/>
-              <a:defRPr sz="1400" b="0">
-                <a:solidFill>
-                  <a:schemeClr val="tx1"/>
-                </a:solidFill>
-              </a:defRPr>
-            </a:lvl1pPr>
-            <a:lvl2pPr>
-              <a:defRPr sz="2200" b="1">
-                <a:solidFill>
-                  <a:srgbClr val="4F0D1E"/>
-                </a:solidFill>
-              </a:defRPr>
-            </a:lvl2pPr>
-            <a:lvl3pPr>
-              <a:defRPr sz="2200" b="1">
-                <a:solidFill>
-                  <a:srgbClr val="4F0D1E"/>
-                </a:solidFill>
-              </a:defRPr>
-            </a:lvl3pPr>
-            <a:lvl4pPr>
-              <a:defRPr sz="2200" b="1">
-                <a:solidFill>
-                  <a:srgbClr val="4F0D1E"/>
-                </a:solidFill>
-              </a:defRPr>
-            </a:lvl4pPr>
-            <a:lvl5pPr>
-              <a:defRPr sz="2200" b="1">
-                <a:solidFill>
-                  <a:srgbClr val="4F0D1E"/>
-                </a:solidFill>
-              </a:defRPr>
-            </a:lvl5pPr>
-          </a:lstStyle>
-          <a:p>
-            <a:pPr lvl="0"/>
-            <a:endParaRPr lang="en-CA" dirty="0"/>
-          </a:p>
-        </p:txBody>
-      </p:sp>
-      <p:sp>
-        <p:nvSpPr>
-          <p:cNvPr id="3" name="subtitle2">
-            <a:extLst>
-              <a:ext uri="{FF2B5EF4-FFF2-40B4-BE49-F238E27FC236}">
-                <a16:creationId xmlns:a16="http://schemas.microsoft.com/office/drawing/2014/main" id="{9CD4C12E-980A-AFFB-C306-B6BEC590C091}"/>
-              </a:ext>
-            </a:extLst>
-          </p:cNvPr>
-          <p:cNvSpPr>
-            <a:spLocks noGrp="1"/>
-          </p:cNvSpPr>
-          <p:nvPr>
-            <p:ph type="body" sz="quarter" idx="17"/>
-          </p:nvPr>
-        </p:nvSpPr>
-        <p:spPr>
-          <a:xfrm>
-            <a:off x="336000" y="1066800"/>
-            <a:ext cx="11520000" cy="381000"/>
-          </a:xfrm>
-        </p:spPr>
-        <p:txBody>
-          <a:bodyPr/>
-          <a:lstStyle>
-            <a:lvl1pPr marL="0" indent="0" algn="ctr">
-              <a:buNone/>
-              <a:defRPr sz="2200" b="1">
-                <a:solidFill>
-                  <a:srgbClr val="4F0D1E"/>
-                </a:solidFill>
-              </a:defRPr>
-            </a:lvl1pPr>
-            <a:lvl2pPr>
-              <a:defRPr sz="2200" b="1">
-                <a:solidFill>
-                  <a:srgbClr val="4F0D1E"/>
-                </a:solidFill>
-              </a:defRPr>
-            </a:lvl2pPr>
-            <a:lvl3pPr>
-              <a:defRPr sz="2200" b="1">
-                <a:solidFill>
-                  <a:srgbClr val="4F0D1E"/>
-                </a:solidFill>
-              </a:defRPr>
-            </a:lvl3pPr>
-            <a:lvl4pPr>
-              <a:defRPr sz="2200" b="1">
-                <a:solidFill>
-                  <a:srgbClr val="4F0D1E"/>
-                </a:solidFill>
-              </a:defRPr>
-            </a:lvl4pPr>
-            <a:lvl5pPr>
-              <a:defRPr sz="2200" b="1">
-                <a:solidFill>
-                  <a:srgbClr val="4F0D1E"/>
-                </a:solidFill>
-              </a:defRPr>
-            </a:lvl5pPr>
-          </a:lstStyle>
-          <a:p>
-            <a:pPr lvl="0"/>
-            <a:endParaRPr lang="en-CA" dirty="0"/>
-          </a:p>
-        </p:txBody>
-      </p:sp>
-      <p:sp>
-        <p:nvSpPr>
-          <p:cNvPr id="7" name="subtitle1">
-            <a:extLst>
-              <a:ext uri="{FF2B5EF4-FFF2-40B4-BE49-F238E27FC236}">
-                <a16:creationId xmlns:a16="http://schemas.microsoft.com/office/drawing/2014/main" id="{CCCD6125-8168-660C-99C0-B46C612ECC9E}"/>
-              </a:ext>
-            </a:extLst>
-          </p:cNvPr>
-          <p:cNvSpPr>
-            <a:spLocks noGrp="1"/>
-          </p:cNvSpPr>
-          <p:nvPr>
-            <p:ph type="body" sz="quarter" idx="11"/>
-          </p:nvPr>
-        </p:nvSpPr>
-        <p:spPr>
-          <a:xfrm>
-            <a:off x="336000" y="762000"/>
-            <a:ext cx="11520000" cy="381000"/>
-          </a:xfrm>
-        </p:spPr>
-        <p:txBody>
-          <a:bodyPr/>
-          <a:lstStyle>
-            <a:lvl1pPr marL="0" indent="0" algn="ctr">
-              <a:buNone/>
-              <a:defRPr sz="2200" b="1" i="0" u="sng">
-                <a:solidFill>
-                  <a:srgbClr val="4F0D1E"/>
-                </a:solidFill>
-                <a:effectLst>
-                  <a:outerShdw blurRad="38100" dist="38100" dir="2700000" algn="tl">
-                    <a:srgbClr val="000000">
-                      <a:alpha val="43137"/>
-                    </a:srgbClr>
-                  </a:outerShdw>
-                </a:effectLst>
-              </a:defRPr>
-            </a:lvl1pPr>
-            <a:lvl2pPr>
-              <a:defRPr sz="2200" b="1">
-                <a:solidFill>
-                  <a:srgbClr val="4F0D1E"/>
-                </a:solidFill>
-              </a:defRPr>
-            </a:lvl2pPr>
-            <a:lvl3pPr>
-              <a:defRPr sz="2200" b="1">
-                <a:solidFill>
-                  <a:srgbClr val="4F0D1E"/>
-                </a:solidFill>
-              </a:defRPr>
-            </a:lvl3pPr>
-            <a:lvl4pPr>
-              <a:defRPr sz="2200" b="1">
-                <a:solidFill>
-                  <a:srgbClr val="4F0D1E"/>
-                </a:solidFill>
-              </a:defRPr>
-            </a:lvl4pPr>
-            <a:lvl5pPr>
-              <a:defRPr sz="2200" b="1">
-                <a:solidFill>
-                  <a:srgbClr val="4F0D1E"/>
-                </a:solidFill>
-              </a:defRPr>
-            </a:lvl5pPr>
-          </a:lstStyle>
-          <a:p>
-            <a:pPr lvl="0"/>
-            <a:endParaRPr lang="en-CA" dirty="0"/>
-          </a:p>
-        </p:txBody>
-      </p:sp>
-      <p:sp>
-        <p:nvSpPr>
-          <p:cNvPr id="8" name="title">
-            <a:extLst>
-              <a:ext uri="{FF2B5EF4-FFF2-40B4-BE49-F238E27FC236}">
-                <a16:creationId xmlns:a16="http://schemas.microsoft.com/office/drawing/2014/main" id="{9C4B1ED8-8F26-F606-3384-1C7007D8E804}"/>
-              </a:ext>
-            </a:extLst>
-          </p:cNvPr>
-          <p:cNvSpPr>
-            <a:spLocks noGrp="1"/>
-          </p:cNvSpPr>
-          <p:nvPr>
-            <p:ph type="body" sz="quarter" idx="10"/>
-          </p:nvPr>
-        </p:nvSpPr>
-        <p:spPr>
-          <a:xfrm>
-            <a:off x="336000" y="457200"/>
-            <a:ext cx="11520000" cy="381000"/>
-          </a:xfrm>
-        </p:spPr>
-        <p:txBody>
-          <a:bodyPr/>
-          <a:lstStyle>
-            <a:lvl1pPr marL="0" indent="0" algn="ctr">
-              <a:buNone/>
-              <a:defRPr sz="2200" b="1">
-                <a:solidFill>
-                  <a:srgbClr val="4F0D1E"/>
-                </a:solidFill>
-              </a:defRPr>
-            </a:lvl1pPr>
-            <a:lvl2pPr>
-              <a:defRPr sz="2200" b="1">
-                <a:solidFill>
-                  <a:srgbClr val="4F0D1E"/>
-                </a:solidFill>
-              </a:defRPr>
-            </a:lvl2pPr>
-            <a:lvl3pPr>
-              <a:defRPr sz="2200" b="1">
-                <a:solidFill>
-                  <a:srgbClr val="4F0D1E"/>
-                </a:solidFill>
-              </a:defRPr>
-            </a:lvl3pPr>
-            <a:lvl4pPr>
-              <a:defRPr sz="2200" b="1">
-                <a:solidFill>
-                  <a:srgbClr val="4F0D1E"/>
-                </a:solidFill>
-              </a:defRPr>
-            </a:lvl4pPr>
-            <a:lvl5pPr>
-              <a:defRPr sz="2200" b="1">
-                <a:solidFill>
-                  <a:srgbClr val="4F0D1E"/>
-                </a:solidFill>
-              </a:defRPr>
-            </a:lvl5pPr>
-          </a:lstStyle>
-          <a:p>
-            <a:pPr lvl="0"/>
-            <a:endParaRPr lang="en-CA" dirty="0"/>
-          </a:p>
-        </p:txBody>
-      </p:sp>
-      <p:sp>
-        <p:nvSpPr>
-          <p:cNvPr id="17" name="colorbar">
-            <a:extLst>
-              <a:ext uri="{FF2B5EF4-FFF2-40B4-BE49-F238E27FC236}">
-                <a16:creationId xmlns:a16="http://schemas.microsoft.com/office/drawing/2014/main" id="{3080A327-088C-FBA0-665D-8F1E394D916C}"/>
-              </a:ext>
-            </a:extLst>
-          </p:cNvPr>
-          <p:cNvSpPr/>
-          <p:nvPr userDrawn="1"/>
-        </p:nvSpPr>
-        <p:spPr>
-          <a:xfrm>
-            <a:off x="0" y="6477000"/>
-            <a:ext cx="12192000" cy="370800"/>
-          </a:xfrm>
-          <a:prstGeom prst="rect">
-            <a:avLst/>
-          </a:prstGeom>
-          <a:solidFill>
-            <a:schemeClr val="accent1">
-              <a:lumMod val="75000"/>
-            </a:schemeClr>
-          </a:solidFill>
-          <a:ln>
-            <a:noFill/>
-          </a:ln>
-        </p:spPr>
-        <p:style>
-          <a:lnRef idx="1">
-            <a:schemeClr val="accent1"/>
-          </a:lnRef>
-          <a:fillRef idx="3">
-            <a:schemeClr val="accent1"/>
-          </a:fillRef>
-          <a:effectRef idx="2">
-            <a:schemeClr val="accent1"/>
-          </a:effectRef>
-          <a:fontRef idx="minor">
-            <a:schemeClr val="lt1"/>
-          </a:fontRef>
-        </p:style>
-        <p:txBody>
-          <a:bodyPr rtlCol="0" anchor="ctr"/>
-          <a:lstStyle/>
-          <a:p>
-            <a:pPr algn="ctr"/>
-            <a:endParaRPr lang="en-CA" sz="2400"/>
-          </a:p>
-        </p:txBody>
-      </p:sp>
-      <p:sp>
-        <p:nvSpPr>
-          <p:cNvPr id="6" name="colorbar">
-            <a:extLst>
-              <a:ext uri="{FF2B5EF4-FFF2-40B4-BE49-F238E27FC236}">
-                <a16:creationId xmlns:a16="http://schemas.microsoft.com/office/drawing/2014/main" id="{B7786346-F875-A0E3-8C4E-AD43C72EB628}"/>
-              </a:ext>
-            </a:extLst>
-          </p:cNvPr>
-          <p:cNvSpPr/>
-          <p:nvPr userDrawn="1"/>
-        </p:nvSpPr>
-        <p:spPr>
-          <a:xfrm>
-            <a:off x="0" y="0"/>
-            <a:ext cx="12192000" cy="370800"/>
-          </a:xfrm>
-          <a:prstGeom prst="rect">
-            <a:avLst/>
-          </a:prstGeom>
-          <a:solidFill>
-            <a:srgbClr val="3494BA"/>
-          </a:solidFill>
-          <a:ln>
-            <a:noFill/>
-          </a:ln>
-        </p:spPr>
-        <p:style>
-          <a:lnRef idx="1">
-            <a:schemeClr val="accent1"/>
-          </a:lnRef>
-          <a:fillRef idx="3">
-            <a:schemeClr val="accent1"/>
-          </a:fillRef>
-          <a:effectRef idx="2">
-            <a:schemeClr val="accent1"/>
-          </a:effectRef>
-          <a:fontRef idx="minor">
-            <a:schemeClr val="lt1"/>
-          </a:fontRef>
-        </p:style>
-        <p:txBody>
-          <a:bodyPr rtlCol="0" anchor="ctr"/>
-          <a:lstStyle/>
-          <a:p>
-            <a:pPr algn="ctr"/>
-            <a:endParaRPr lang="en-CA" sz="2400"/>
-          </a:p>
-        </p:txBody>
-      </p:sp>
-    </p:spTree>
-    <p:extLst>
-      <p:ext uri="{BB962C8B-B14F-4D97-AF65-F5344CB8AC3E}">
-        <p14:creationId xmlns:p14="http://schemas.microsoft.com/office/powerpoint/2010/main" val="325640250"/>
-      </p:ext>
-    </p:extLst>
-  </p:cSld>
-  <p:clrMapOvr>
-    <a:masterClrMapping/>
-  </p:clrMapOvr>
-</p:sldLayout>
-</file>
-
-<file path=ppt/slideLayouts/slideLayout4.xml><?xml version="1.0" encoding="utf-8"?>
-<p:sldLayout xmlns:a="http://schemas.openxmlformats.org/drawingml/2006/main" xmlns:r="http://schemas.openxmlformats.org/officeDocument/2006/relationships" xmlns:p="http://schemas.openxmlformats.org/presentationml/2006/main" preserve="1" userDrawn="1">
   <p:cSld name="slide2">
     <p:spTree>
       <p:nvGrpSpPr>
@@ -9416,256 +5024,7 @@
 </p:sldLayout>
 </file>
 
-<file path=ppt/slideLayouts/slideLayout5.xml><?xml version="1.0" encoding="utf-8"?>
-<p:sldLayout xmlns:a="http://schemas.openxmlformats.org/drawingml/2006/main" xmlns:r="http://schemas.openxmlformats.org/officeDocument/2006/relationships" xmlns:p="http://schemas.openxmlformats.org/presentationml/2006/main" preserve="1" userDrawn="1">
-  <p:cSld name="slide2_alt">
-    <p:spTree>
-      <p:nvGrpSpPr>
-        <p:cNvPr id="1" name=""/>
-        <p:cNvGrpSpPr/>
-        <p:nvPr/>
-      </p:nvGrpSpPr>
-      <p:grpSpPr>
-        <a:xfrm>
-          <a:off x="0" y="0"/>
-          <a:ext cx="0" cy="0"/>
-          <a:chOff x="0" y="0"/>
-          <a:chExt cx="0" cy="0"/>
-        </a:xfrm>
-      </p:grpSpPr>
-      <p:sp>
-        <p:nvSpPr>
-          <p:cNvPr id="7" name="colorbar">
-            <a:extLst>
-              <a:ext uri="{FF2B5EF4-FFF2-40B4-BE49-F238E27FC236}">
-                <a16:creationId xmlns:a16="http://schemas.microsoft.com/office/drawing/2014/main" id="{DFCF5E0F-26B3-819A-2166-E237176D70BA}"/>
-              </a:ext>
-            </a:extLst>
-          </p:cNvPr>
-          <p:cNvSpPr/>
-          <p:nvPr userDrawn="1"/>
-        </p:nvSpPr>
-        <p:spPr>
-          <a:xfrm>
-            <a:off x="0" y="0"/>
-            <a:ext cx="12192000" cy="370800"/>
-          </a:xfrm>
-          <a:prstGeom prst="rect">
-            <a:avLst/>
-          </a:prstGeom>
-          <a:solidFill>
-            <a:srgbClr val="3494BA"/>
-          </a:solidFill>
-          <a:ln>
-            <a:noFill/>
-          </a:ln>
-        </p:spPr>
-        <p:style>
-          <a:lnRef idx="1">
-            <a:schemeClr val="accent1"/>
-          </a:lnRef>
-          <a:fillRef idx="3">
-            <a:schemeClr val="accent1"/>
-          </a:fillRef>
-          <a:effectRef idx="2">
-            <a:schemeClr val="accent1"/>
-          </a:effectRef>
-          <a:fontRef idx="minor">
-            <a:schemeClr val="lt1"/>
-          </a:fontRef>
-        </p:style>
-        <p:txBody>
-          <a:bodyPr rtlCol="0" anchor="ctr"/>
-          <a:lstStyle/>
-          <a:p>
-            <a:pPr algn="ctr"/>
-            <a:endParaRPr lang="en-CA" sz="2400"/>
-          </a:p>
-        </p:txBody>
-      </p:sp>
-      <p:sp>
-        <p:nvSpPr>
-          <p:cNvPr id="10" name="colorbar">
-            <a:extLst>
-              <a:ext uri="{FF2B5EF4-FFF2-40B4-BE49-F238E27FC236}">
-                <a16:creationId xmlns:a16="http://schemas.microsoft.com/office/drawing/2014/main" id="{12FCE308-AE06-8E48-EAE8-363FE4267338}"/>
-              </a:ext>
-            </a:extLst>
-          </p:cNvPr>
-          <p:cNvSpPr/>
-          <p:nvPr userDrawn="1"/>
-        </p:nvSpPr>
-        <p:spPr>
-          <a:xfrm>
-            <a:off x="0" y="6477000"/>
-            <a:ext cx="12192000" cy="370800"/>
-          </a:xfrm>
-          <a:prstGeom prst="rect">
-            <a:avLst/>
-          </a:prstGeom>
-          <a:solidFill>
-            <a:schemeClr val="accent1">
-              <a:lumMod val="75000"/>
-            </a:schemeClr>
-          </a:solidFill>
-          <a:ln>
-            <a:noFill/>
-          </a:ln>
-        </p:spPr>
-        <p:style>
-          <a:lnRef idx="1">
-            <a:schemeClr val="accent1"/>
-          </a:lnRef>
-          <a:fillRef idx="3">
-            <a:schemeClr val="accent1"/>
-          </a:fillRef>
-          <a:effectRef idx="2">
-            <a:schemeClr val="accent1"/>
-          </a:effectRef>
-          <a:fontRef idx="minor">
-            <a:schemeClr val="lt1"/>
-          </a:fontRef>
-        </p:style>
-        <p:txBody>
-          <a:bodyPr rtlCol="0" anchor="ctr"/>
-          <a:lstStyle/>
-          <a:p>
-            <a:pPr algn="ctr"/>
-            <a:endParaRPr lang="en-CA" sz="2400"/>
-          </a:p>
-        </p:txBody>
-      </p:sp>
-      <p:sp>
-        <p:nvSpPr>
-          <p:cNvPr id="9" name="graph1">
-            <a:extLst>
-              <a:ext uri="{FF2B5EF4-FFF2-40B4-BE49-F238E27FC236}">
-                <a16:creationId xmlns:a16="http://schemas.microsoft.com/office/drawing/2014/main" id="{07C799CF-3196-F520-B022-94E6C31D03E1}"/>
-              </a:ext>
-            </a:extLst>
-          </p:cNvPr>
-          <p:cNvSpPr>
-            <a:spLocks noGrp="1"/>
-          </p:cNvSpPr>
-          <p:nvPr>
-            <p:ph type="pic" sz="quarter" idx="12"/>
-          </p:nvPr>
-        </p:nvSpPr>
-        <p:spPr>
-          <a:xfrm>
-            <a:off x="2133104" y="2057400"/>
-            <a:ext cx="7925792" cy="4073624"/>
-          </a:xfrm>
-        </p:spPr>
-        <p:txBody>
-          <a:bodyPr/>
-          <a:lstStyle>
-            <a:lvl1pPr marL="0" indent="0">
-              <a:buNone/>
-              <a:defRPr/>
-            </a:lvl1pPr>
-          </a:lstStyle>
-          <a:p>
-            <a:endParaRPr lang="en-CA" dirty="0"/>
-          </a:p>
-        </p:txBody>
-      </p:sp>
-      <p:sp>
-        <p:nvSpPr>
-          <p:cNvPr id="8" name="bodytext">
-            <a:extLst>
-              <a:ext uri="{FF2B5EF4-FFF2-40B4-BE49-F238E27FC236}">
-                <a16:creationId xmlns:a16="http://schemas.microsoft.com/office/drawing/2014/main" id="{2E39BD72-E1A3-4AE6-D1D6-8147E9FD5008}"/>
-              </a:ext>
-            </a:extLst>
-          </p:cNvPr>
-          <p:cNvSpPr>
-            <a:spLocks noGrp="1"/>
-          </p:cNvSpPr>
-          <p:nvPr>
-            <p:ph idx="1" hasCustomPrompt="1"/>
-          </p:nvPr>
-        </p:nvSpPr>
-        <p:spPr>
-          <a:xfrm>
-            <a:off x="378885" y="1139825"/>
-            <a:ext cx="11442700" cy="1298575"/>
-          </a:xfrm>
-        </p:spPr>
-        <p:txBody>
-          <a:bodyPr>
-            <a:noAutofit/>
-          </a:bodyPr>
-          <a:lstStyle>
-            <a:lvl1pPr marL="0" indent="0">
-              <a:buNone/>
-              <a:defRPr sz="2200" b="1" i="1" u="none"/>
-            </a:lvl1pPr>
-            <a:lvl2pPr>
-              <a:defRPr sz="2200" b="1" i="1" u="none"/>
-            </a:lvl2pPr>
-            <a:lvl3pPr>
-              <a:defRPr sz="2200" b="1" i="1" u="none"/>
-            </a:lvl3pPr>
-            <a:lvl4pPr>
-              <a:defRPr sz="2200" b="1" i="1" u="none"/>
-            </a:lvl4pPr>
-            <a:lvl5pPr>
-              <a:defRPr sz="2200" b="1" i="1" u="none"/>
-            </a:lvl5pPr>
-          </a:lstStyle>
-          <a:p>
-            <a:pPr lvl="0"/>
-            <a:r>
-              <a:rPr lang="en-US" dirty="0"/>
-              <a:t>Click to edit Master text styles</a:t>
-            </a:r>
-          </a:p>
-        </p:txBody>
-      </p:sp>
-      <p:sp>
-        <p:nvSpPr>
-          <p:cNvPr id="2" name="title">
-            <a:extLst>
-              <a:ext uri="{FF2B5EF4-FFF2-40B4-BE49-F238E27FC236}">
-                <a16:creationId xmlns:a16="http://schemas.microsoft.com/office/drawing/2014/main" id="{CDCA24AC-59B3-7885-AF17-264B94B50A12}"/>
-              </a:ext>
-            </a:extLst>
-          </p:cNvPr>
-          <p:cNvSpPr>
-            <a:spLocks noGrp="1"/>
-          </p:cNvSpPr>
-          <p:nvPr>
-            <p:ph type="title"/>
-          </p:nvPr>
-        </p:nvSpPr>
-        <p:spPr/>
-        <p:txBody>
-          <a:bodyPr/>
-          <a:lstStyle/>
-          <a:p>
-            <a:r>
-              <a:rPr lang="en-US"/>
-              <a:t>Click to edit Master title style</a:t>
-            </a:r>
-            <a:endParaRPr lang="en-CA"/>
-          </a:p>
-        </p:txBody>
-      </p:sp>
-    </p:spTree>
-    <p:extLst>
-      <p:ext uri="{BB962C8B-B14F-4D97-AF65-F5344CB8AC3E}">
-        <p14:creationId xmlns:p14="http://schemas.microsoft.com/office/powerpoint/2010/main" val="1337875946"/>
-      </p:ext>
-    </p:extLst>
-  </p:cSld>
-  <p:clrMapOvr>
-    <a:masterClrMapping/>
-  </p:clrMapOvr>
-</p:sldLayout>
-</file>
-
-<file path=ppt/slideLayouts/slideLayout6.xml><?xml version="1.0" encoding="utf-8"?>
+<file path=ppt/slideLayouts/slideLayout4.xml><?xml version="1.0" encoding="utf-8"?>
 <p:sldLayout xmlns:a="http://schemas.openxmlformats.org/drawingml/2006/main" xmlns:r="http://schemas.openxmlformats.org/officeDocument/2006/relationships" xmlns:p="http://schemas.openxmlformats.org/presentationml/2006/main" preserve="1" userDrawn="1">
   <p:cSld name="slide3">
     <p:spTree>
@@ -10486,10 +5845,8 @@
   <p:sldLayoutIdLst>
     <p:sldLayoutId id="2147483992" r:id="rId1"/>
     <p:sldLayoutId id="2147483987" r:id="rId2"/>
-    <p:sldLayoutId id="2147483991" r:id="rId3"/>
-    <p:sldLayoutId id="2147483988" r:id="rId4"/>
-    <p:sldLayoutId id="2147483993" r:id="rId5"/>
-    <p:sldLayoutId id="2147483989" r:id="rId6"/>
+    <p:sldLayoutId id="2147483988" r:id="rId3"/>
+    <p:sldLayoutId id="2147483989" r:id="rId4"/>
   </p:sldLayoutIdLst>
   <p:hf hdr="0" ftr="0" dt="0"/>
   <p:txStyles>
@@ -11945,6 +7302,21 @@
 </file>
 
 <file path=customXml/item1.xml><?xml version="1.0" encoding="utf-8"?>
+<?mso-contentType ?>
+<FormTemplates xmlns="http://schemas.microsoft.com/sharepoint/v3/contenttype/forms">
+  <Display>DocumentLibraryForm</Display>
+  <Edit>DocumentLibraryForm</Edit>
+  <New>DocumentLibraryForm</New>
+</FormTemplates>
+</file>
+
+<file path=customXml/item2.xml><?xml version="1.0" encoding="utf-8"?>
+<p:properties xmlns:p="http://schemas.microsoft.com/office/2006/metadata/properties" xmlns:xsi="http://www.w3.org/2001/XMLSchema-instance" xmlns:pc="http://schemas.microsoft.com/office/infopath/2007/PartnerControls">
+  <documentManagement/>
+</p:properties>
+</file>
+
+<file path=customXml/item3.xml><?xml version="1.0" encoding="utf-8"?>
 <ct:contentTypeSchema xmlns:ct="http://schemas.microsoft.com/office/2006/metadata/contentType" xmlns:ma="http://schemas.microsoft.com/office/2006/metadata/properties/metaAttributes" ct:_="" ma:_="" ma:contentTypeName="Document" ma:contentTypeID="0x01010077A71171D920F84EA61D01A688B27E19" ma:contentTypeVersion="12" ma:contentTypeDescription="Create a new document." ma:contentTypeScope="" ma:versionID="77163b69060b889c999f197c07fa55cb">
   <xsd:schema xmlns:xsd="http://www.w3.org/2001/XMLSchema" xmlns:xs="http://www.w3.org/2001/XMLSchema" xmlns:p="http://schemas.microsoft.com/office/2006/metadata/properties" xmlns:ns3="4a911788-1229-46fe-9788-503fff6773af" xmlns:ns4="be1ab068-95ae-4084-b4d0-9bc2d42a8063" targetNamespace="http://schemas.microsoft.com/office/2006/metadata/properties" ma:root="true" ma:fieldsID="20541d3c3ddc7e7a03d4e8725bf99a9a" ns3:_="" ns4:_="">
     <xsd:import namespace="4a911788-1229-46fe-9788-503fff6773af"/>
@@ -12161,36 +7533,10 @@
 </ct:contentTypeSchema>
 </file>
 
-<file path=customXml/item2.xml><?xml version="1.0" encoding="utf-8"?>
-<p:properties xmlns:p="http://schemas.microsoft.com/office/2006/metadata/properties" xmlns:xsi="http://www.w3.org/2001/XMLSchema-instance" xmlns:pc="http://schemas.microsoft.com/office/infopath/2007/PartnerControls">
-  <documentManagement/>
-</p:properties>
-</file>
-
-<file path=customXml/item3.xml><?xml version="1.0" encoding="utf-8"?>
-<?mso-contentType ?>
-<FormTemplates xmlns="http://schemas.microsoft.com/sharepoint/v3/contenttype/forms">
-  <Display>DocumentLibraryForm</Display>
-  <Edit>DocumentLibraryForm</Edit>
-  <New>DocumentLibraryForm</New>
-</FormTemplates>
-</file>
-
 <file path=customXml/itemProps1.xml><?xml version="1.0" encoding="utf-8"?>
-<ds:datastoreItem xmlns:ds="http://schemas.openxmlformats.org/officeDocument/2006/customXml" ds:itemID="{0D0ABFE7-103E-40F0-BEF6-6C375A209ED5}">
+<ds:datastoreItem xmlns:ds="http://schemas.openxmlformats.org/officeDocument/2006/customXml" ds:itemID="{E4FA02DB-BD1E-4C7E-B357-5D52E030251B}">
   <ds:schemaRefs>
-    <ds:schemaRef ds:uri="http://schemas.microsoft.com/office/2006/metadata/contentType"/>
-    <ds:schemaRef ds:uri="http://schemas.microsoft.com/office/2006/metadata/properties/metaAttributes"/>
-    <ds:schemaRef ds:uri="http://www.w3.org/2001/XMLSchema"/>
-    <ds:schemaRef ds:uri="http://schemas.microsoft.com/office/2006/metadata/properties"/>
-    <ds:schemaRef ds:uri="4a911788-1229-46fe-9788-503fff6773af"/>
-    <ds:schemaRef ds:uri="be1ab068-95ae-4084-b4d0-9bc2d42a8063"/>
-    <ds:schemaRef ds:uri="http://schemas.microsoft.com/office/2006/documentManagement/types"/>
-    <ds:schemaRef ds:uri="http://schemas.microsoft.com/office/infopath/2007/PartnerControls"/>
-    <ds:schemaRef ds:uri="http://schemas.openxmlformats.org/package/2006/metadata/core-properties"/>
-    <ds:schemaRef ds:uri="http://purl.org/dc/elements/1.1/"/>
-    <ds:schemaRef ds:uri="http://purl.org/dc/terms/"/>
-    <ds:schemaRef ds:uri="http://schemas.microsoft.com/internal/obd"/>
+    <ds:schemaRef ds:uri="http://schemas.microsoft.com/sharepoint/v3/contenttype/forms"/>
   </ds:schemaRefs>
 </ds:datastoreItem>
 </file>
@@ -12213,9 +7559,20 @@
 </file>
 
 <file path=customXml/itemProps3.xml><?xml version="1.0" encoding="utf-8"?>
-<ds:datastoreItem xmlns:ds="http://schemas.openxmlformats.org/officeDocument/2006/customXml" ds:itemID="{E4FA02DB-BD1E-4C7E-B357-5D52E030251B}">
+<ds:datastoreItem xmlns:ds="http://schemas.openxmlformats.org/officeDocument/2006/customXml" ds:itemID="{0D0ABFE7-103E-40F0-BEF6-6C375A209ED5}">
   <ds:schemaRefs>
-    <ds:schemaRef ds:uri="http://schemas.microsoft.com/sharepoint/v3/contenttype/forms"/>
+    <ds:schemaRef ds:uri="http://schemas.microsoft.com/office/2006/metadata/contentType"/>
+    <ds:schemaRef ds:uri="http://schemas.microsoft.com/office/2006/metadata/properties/metaAttributes"/>
+    <ds:schemaRef ds:uri="http://www.w3.org/2001/XMLSchema"/>
+    <ds:schemaRef ds:uri="http://schemas.microsoft.com/office/2006/metadata/properties"/>
+    <ds:schemaRef ds:uri="4a911788-1229-46fe-9788-503fff6773af"/>
+    <ds:schemaRef ds:uri="be1ab068-95ae-4084-b4d0-9bc2d42a8063"/>
+    <ds:schemaRef ds:uri="http://schemas.microsoft.com/office/2006/documentManagement/types"/>
+    <ds:schemaRef ds:uri="http://schemas.microsoft.com/office/infopath/2007/PartnerControls"/>
+    <ds:schemaRef ds:uri="http://schemas.openxmlformats.org/package/2006/metadata/core-properties"/>
+    <ds:schemaRef ds:uri="http://purl.org/dc/elements/1.1/"/>
+    <ds:schemaRef ds:uri="http://purl.org/dc/terms/"/>
+    <ds:schemaRef ds:uri="http://schemas.microsoft.com/internal/obd"/>
   </ds:schemaRefs>
 </ds:datastoreItem>
 </file>
</xml_diff>

<commit_message>
style: additional mj pic :3
</commit_message>
<xml_diff>
--- a/slide-deck-officer-template.pptx
+++ b/slide-deck-officer-template.pptx
@@ -1576,6 +1576,93 @@
     </pc:docChg>
   </pc:docChgLst>
   <pc:docChgLst>
+    <pc:chgData name="Rieck, Jennifer (HC/SC)" userId="f15338df-41bc-4de2-9c55-7e5b1761acd3" providerId="ADAL" clId="{8E5374F7-015C-4905-AFDC-A1474C2F28F4}"/>
+    <pc:docChg chg="modMainMaster">
+      <pc:chgData name="Rieck, Jennifer (HC/SC)" userId="f15338df-41bc-4de2-9c55-7e5b1761acd3" providerId="ADAL" clId="{8E5374F7-015C-4905-AFDC-A1474C2F28F4}" dt="2023-04-11T17:09:46.049" v="20"/>
+      <pc:docMkLst>
+        <pc:docMk/>
+      </pc:docMkLst>
+      <pc:sldMasterChg chg="modSldLayout">
+        <pc:chgData name="Rieck, Jennifer (HC/SC)" userId="f15338df-41bc-4de2-9c55-7e5b1761acd3" providerId="ADAL" clId="{8E5374F7-015C-4905-AFDC-A1474C2F28F4}" dt="2023-04-11T17:09:46.049" v="20"/>
+        <pc:sldMasterMkLst>
+          <pc:docMk/>
+          <pc:sldMasterMk cId="0" sldId="2147483913"/>
+        </pc:sldMasterMkLst>
+        <pc:sldLayoutChg chg="addSp modSp">
+          <pc:chgData name="Rieck, Jennifer (HC/SC)" userId="f15338df-41bc-4de2-9c55-7e5b1761acd3" providerId="ADAL" clId="{8E5374F7-015C-4905-AFDC-A1474C2F28F4}" dt="2023-04-11T17:09:46.049" v="20"/>
+          <pc:sldLayoutMkLst>
+            <pc:docMk/>
+            <pc:sldMasterMk cId="0" sldId="2147483913"/>
+            <pc:sldLayoutMk cId="325640250" sldId="2147483991"/>
+          </pc:sldLayoutMkLst>
+          <pc:spChg chg="mod">
+            <ac:chgData name="Rieck, Jennifer (HC/SC)" userId="f15338df-41bc-4de2-9c55-7e5b1761acd3" providerId="ADAL" clId="{8E5374F7-015C-4905-AFDC-A1474C2F28F4}" dt="2023-04-11T17:08:56.249" v="10" actId="13244"/>
+            <ac:spMkLst>
+              <pc:docMk/>
+              <pc:sldMasterMk cId="0" sldId="2147483913"/>
+              <pc:sldLayoutMk cId="325640250" sldId="2147483991"/>
+              <ac:spMk id="2" creationId="{709F9439-43E1-81CB-62EE-D384B4D423F1}"/>
+            </ac:spMkLst>
+          </pc:spChg>
+          <pc:spChg chg="add mod">
+            <ac:chgData name="Rieck, Jennifer (HC/SC)" userId="f15338df-41bc-4de2-9c55-7e5b1761acd3" providerId="ADAL" clId="{8E5374F7-015C-4905-AFDC-A1474C2F28F4}" dt="2023-04-11T17:08:51.943" v="9" actId="13244"/>
+            <ac:spMkLst>
+              <pc:docMk/>
+              <pc:sldMasterMk cId="0" sldId="2147483913"/>
+              <pc:sldLayoutMk cId="325640250" sldId="2147483991"/>
+              <ac:spMk id="3" creationId="{9CD4C12E-980A-AFFB-C306-B6BEC590C091}"/>
+            </ac:spMkLst>
+          </pc:spChg>
+          <pc:spChg chg="mod">
+            <ac:chgData name="Rieck, Jennifer (HC/SC)" userId="f15338df-41bc-4de2-9c55-7e5b1761acd3" providerId="ADAL" clId="{8E5374F7-015C-4905-AFDC-A1474C2F28F4}" dt="2023-04-11T17:08:58.393" v="11" actId="13244"/>
+            <ac:spMkLst>
+              <pc:docMk/>
+              <pc:sldMasterMk cId="0" sldId="2147483913"/>
+              <pc:sldLayoutMk cId="325640250" sldId="2147483991"/>
+              <ac:spMk id="4" creationId="{4ECC911B-8E63-FE26-297E-5C6ECEE3C393}"/>
+            </ac:spMkLst>
+          </pc:spChg>
+          <pc:spChg chg="mod">
+            <ac:chgData name="Rieck, Jennifer (HC/SC)" userId="f15338df-41bc-4de2-9c55-7e5b1761acd3" providerId="ADAL" clId="{8E5374F7-015C-4905-AFDC-A1474C2F28F4}" dt="2023-04-11T17:09:00.201" v="12" actId="13244"/>
+            <ac:spMkLst>
+              <pc:docMk/>
+              <pc:sldMasterMk cId="0" sldId="2147483913"/>
+              <pc:sldLayoutMk cId="325640250" sldId="2147483991"/>
+              <ac:spMk id="5" creationId="{064F3FCE-EDDA-507D-DA5E-86D897FD7BE7}"/>
+            </ac:spMkLst>
+          </pc:spChg>
+          <pc:spChg chg="mod">
+            <ac:chgData name="Rieck, Jennifer (HC/SC)" userId="f15338df-41bc-4de2-9c55-7e5b1761acd3" providerId="ADAL" clId="{8E5374F7-015C-4905-AFDC-A1474C2F28F4}" dt="2023-04-11T17:09:46.049" v="20"/>
+            <ac:spMkLst>
+              <pc:docMk/>
+              <pc:sldMasterMk cId="0" sldId="2147483913"/>
+              <pc:sldLayoutMk cId="325640250" sldId="2147483991"/>
+              <ac:spMk id="7" creationId="{CCCD6125-8168-660C-99C0-B46C612ECC9E}"/>
+            </ac:spMkLst>
+          </pc:spChg>
+          <pc:spChg chg="mod">
+            <ac:chgData name="Rieck, Jennifer (HC/SC)" userId="f15338df-41bc-4de2-9c55-7e5b1761acd3" providerId="ADAL" clId="{8E5374F7-015C-4905-AFDC-A1474C2F28F4}" dt="2023-04-11T17:09:02.048" v="13" actId="13244"/>
+            <ac:spMkLst>
+              <pc:docMk/>
+              <pc:sldMasterMk cId="0" sldId="2147483913"/>
+              <pc:sldLayoutMk cId="325640250" sldId="2147483991"/>
+              <ac:spMk id="14" creationId="{BC9F38DA-743C-E08B-0043-5D20351E5F84}"/>
+            </ac:spMkLst>
+          </pc:spChg>
+          <pc:spChg chg="mod">
+            <ac:chgData name="Rieck, Jennifer (HC/SC)" userId="f15338df-41bc-4de2-9c55-7e5b1761acd3" providerId="ADAL" clId="{8E5374F7-015C-4905-AFDC-A1474C2F28F4}" dt="2023-04-11T17:09:03.632" v="14" actId="13244"/>
+            <ac:spMkLst>
+              <pc:docMk/>
+              <pc:sldMasterMk cId="0" sldId="2147483913"/>
+              <pc:sldLayoutMk cId="325640250" sldId="2147483991"/>
+              <ac:spMk id="15" creationId="{A084DD2A-4F9A-125A-B1DF-98744A51FCE7}"/>
+            </ac:spMkLst>
+          </pc:spChg>
+        </pc:sldLayoutChg>
+      </pc:sldMasterChg>
+    </pc:docChg>
+  </pc:docChgLst>
+  <pc:docChgLst>
     <pc:chgData name="Rieck, Jennifer (HC/SC)" userId="f15338df-41bc-4de2-9c55-7e5b1761acd3" providerId="ADAL" clId="{15F4335D-6335-43BA-A6A6-0196B4DBD3AC}"/>
     <pc:docChg chg="modMainMaster">
       <pc:chgData name="Rieck, Jennifer (HC/SC)" userId="f15338df-41bc-4de2-9c55-7e5b1761acd3" providerId="ADAL" clId="{15F4335D-6335-43BA-A6A6-0196B4DBD3AC}" dt="2023-04-11T14:25:15.548" v="1" actId="404"/>
@@ -1602,93 +1689,6 @@
               <pc:sldMasterMk cId="0" sldId="2147483913"/>
               <pc:sldLayoutMk cId="325640250" sldId="2147483991"/>
               <ac:spMk id="20" creationId="{F4C4B83A-261A-F198-9099-6144D1A473D1}"/>
-            </ac:spMkLst>
-          </pc:spChg>
-        </pc:sldLayoutChg>
-      </pc:sldMasterChg>
-    </pc:docChg>
-  </pc:docChgLst>
-  <pc:docChgLst>
-    <pc:chgData name="Rieck, Jennifer (HC/SC)" userId="f15338df-41bc-4de2-9c55-7e5b1761acd3" providerId="ADAL" clId="{8E5374F7-015C-4905-AFDC-A1474C2F28F4}"/>
-    <pc:docChg chg="modMainMaster">
-      <pc:chgData name="Rieck, Jennifer (HC/SC)" userId="f15338df-41bc-4de2-9c55-7e5b1761acd3" providerId="ADAL" clId="{8E5374F7-015C-4905-AFDC-A1474C2F28F4}" dt="2023-04-11T17:09:46.049" v="20"/>
-      <pc:docMkLst>
-        <pc:docMk/>
-      </pc:docMkLst>
-      <pc:sldMasterChg chg="modSldLayout">
-        <pc:chgData name="Rieck, Jennifer (HC/SC)" userId="f15338df-41bc-4de2-9c55-7e5b1761acd3" providerId="ADAL" clId="{8E5374F7-015C-4905-AFDC-A1474C2F28F4}" dt="2023-04-11T17:09:46.049" v="20"/>
-        <pc:sldMasterMkLst>
-          <pc:docMk/>
-          <pc:sldMasterMk cId="0" sldId="2147483913"/>
-        </pc:sldMasterMkLst>
-        <pc:sldLayoutChg chg="addSp modSp">
-          <pc:chgData name="Rieck, Jennifer (HC/SC)" userId="f15338df-41bc-4de2-9c55-7e5b1761acd3" providerId="ADAL" clId="{8E5374F7-015C-4905-AFDC-A1474C2F28F4}" dt="2023-04-11T17:09:46.049" v="20"/>
-          <pc:sldLayoutMkLst>
-            <pc:docMk/>
-            <pc:sldMasterMk cId="0" sldId="2147483913"/>
-            <pc:sldLayoutMk cId="325640250" sldId="2147483991"/>
-          </pc:sldLayoutMkLst>
-          <pc:spChg chg="mod">
-            <ac:chgData name="Rieck, Jennifer (HC/SC)" userId="f15338df-41bc-4de2-9c55-7e5b1761acd3" providerId="ADAL" clId="{8E5374F7-015C-4905-AFDC-A1474C2F28F4}" dt="2023-04-11T17:08:56.249" v="10" actId="13244"/>
-            <ac:spMkLst>
-              <pc:docMk/>
-              <pc:sldMasterMk cId="0" sldId="2147483913"/>
-              <pc:sldLayoutMk cId="325640250" sldId="2147483991"/>
-              <ac:spMk id="2" creationId="{709F9439-43E1-81CB-62EE-D384B4D423F1}"/>
-            </ac:spMkLst>
-          </pc:spChg>
-          <pc:spChg chg="add mod">
-            <ac:chgData name="Rieck, Jennifer (HC/SC)" userId="f15338df-41bc-4de2-9c55-7e5b1761acd3" providerId="ADAL" clId="{8E5374F7-015C-4905-AFDC-A1474C2F28F4}" dt="2023-04-11T17:08:51.943" v="9" actId="13244"/>
-            <ac:spMkLst>
-              <pc:docMk/>
-              <pc:sldMasterMk cId="0" sldId="2147483913"/>
-              <pc:sldLayoutMk cId="325640250" sldId="2147483991"/>
-              <ac:spMk id="3" creationId="{9CD4C12E-980A-AFFB-C306-B6BEC590C091}"/>
-            </ac:spMkLst>
-          </pc:spChg>
-          <pc:spChg chg="mod">
-            <ac:chgData name="Rieck, Jennifer (HC/SC)" userId="f15338df-41bc-4de2-9c55-7e5b1761acd3" providerId="ADAL" clId="{8E5374F7-015C-4905-AFDC-A1474C2F28F4}" dt="2023-04-11T17:08:58.393" v="11" actId="13244"/>
-            <ac:spMkLst>
-              <pc:docMk/>
-              <pc:sldMasterMk cId="0" sldId="2147483913"/>
-              <pc:sldLayoutMk cId="325640250" sldId="2147483991"/>
-              <ac:spMk id="4" creationId="{4ECC911B-8E63-FE26-297E-5C6ECEE3C393}"/>
-            </ac:spMkLst>
-          </pc:spChg>
-          <pc:spChg chg="mod">
-            <ac:chgData name="Rieck, Jennifer (HC/SC)" userId="f15338df-41bc-4de2-9c55-7e5b1761acd3" providerId="ADAL" clId="{8E5374F7-015C-4905-AFDC-A1474C2F28F4}" dt="2023-04-11T17:09:00.201" v="12" actId="13244"/>
-            <ac:spMkLst>
-              <pc:docMk/>
-              <pc:sldMasterMk cId="0" sldId="2147483913"/>
-              <pc:sldLayoutMk cId="325640250" sldId="2147483991"/>
-              <ac:spMk id="5" creationId="{064F3FCE-EDDA-507D-DA5E-86D897FD7BE7}"/>
-            </ac:spMkLst>
-          </pc:spChg>
-          <pc:spChg chg="mod">
-            <ac:chgData name="Rieck, Jennifer (HC/SC)" userId="f15338df-41bc-4de2-9c55-7e5b1761acd3" providerId="ADAL" clId="{8E5374F7-015C-4905-AFDC-A1474C2F28F4}" dt="2023-04-11T17:09:46.049" v="20"/>
-            <ac:spMkLst>
-              <pc:docMk/>
-              <pc:sldMasterMk cId="0" sldId="2147483913"/>
-              <pc:sldLayoutMk cId="325640250" sldId="2147483991"/>
-              <ac:spMk id="7" creationId="{CCCD6125-8168-660C-99C0-B46C612ECC9E}"/>
-            </ac:spMkLst>
-          </pc:spChg>
-          <pc:spChg chg="mod">
-            <ac:chgData name="Rieck, Jennifer (HC/SC)" userId="f15338df-41bc-4de2-9c55-7e5b1761acd3" providerId="ADAL" clId="{8E5374F7-015C-4905-AFDC-A1474C2F28F4}" dt="2023-04-11T17:09:02.048" v="13" actId="13244"/>
-            <ac:spMkLst>
-              <pc:docMk/>
-              <pc:sldMasterMk cId="0" sldId="2147483913"/>
-              <pc:sldLayoutMk cId="325640250" sldId="2147483991"/>
-              <ac:spMk id="14" creationId="{BC9F38DA-743C-E08B-0043-5D20351E5F84}"/>
-            </ac:spMkLst>
-          </pc:spChg>
-          <pc:spChg chg="mod">
-            <ac:chgData name="Rieck, Jennifer (HC/SC)" userId="f15338df-41bc-4de2-9c55-7e5b1761acd3" providerId="ADAL" clId="{8E5374F7-015C-4905-AFDC-A1474C2F28F4}" dt="2023-04-11T17:09:03.632" v="14" actId="13244"/>
-            <ac:spMkLst>
-              <pc:docMk/>
-              <pc:sldMasterMk cId="0" sldId="2147483913"/>
-              <pc:sldLayoutMk cId="325640250" sldId="2147483991"/>
-              <ac:spMk id="15" creationId="{A084DD2A-4F9A-125A-B1DF-98744A51FCE7}"/>
             </ac:spMkLst>
           </pc:spChg>
         </pc:sldLayoutChg>
@@ -3787,7 +3787,42 @@
       </p:sp>
       <p:sp>
         <p:nvSpPr>
-          <p:cNvPr id="15" name="image">
+          <p:cNvPr id="4" name="image2">
+            <a:extLst>
+              <a:ext uri="{FF2B5EF4-FFF2-40B4-BE49-F238E27FC236}">
+                <a16:creationId xmlns:a16="http://schemas.microsoft.com/office/drawing/2014/main" id="{58B40264-3DB4-3D7E-3EE8-47B3AE9FECF9}"/>
+              </a:ext>
+            </a:extLst>
+          </p:cNvPr>
+          <p:cNvSpPr>
+            <a:spLocks noGrp="1"/>
+          </p:cNvSpPr>
+          <p:nvPr>
+            <p:ph type="pic" sz="quarter" idx="13"/>
+          </p:nvPr>
+        </p:nvSpPr>
+        <p:spPr>
+          <a:xfrm>
+            <a:off x="10058400" y="4259262"/>
+            <a:ext cx="2058145" cy="1760538"/>
+          </a:xfrm>
+        </p:spPr>
+        <p:txBody>
+          <a:bodyPr/>
+          <a:lstStyle>
+            <a:lvl1pPr marL="0" indent="0">
+              <a:buNone/>
+              <a:defRPr/>
+            </a:lvl1pPr>
+          </a:lstStyle>
+          <a:p>
+            <a:endParaRPr lang="en-CA" dirty="0"/>
+          </a:p>
+        </p:txBody>
+      </p:sp>
+      <p:sp>
+        <p:nvSpPr>
+          <p:cNvPr id="15" name="image1">
             <a:extLst>
               <a:ext uri="{FF2B5EF4-FFF2-40B4-BE49-F238E27FC236}">
                 <a16:creationId xmlns:a16="http://schemas.microsoft.com/office/drawing/2014/main" id="{DE2D0FE5-2C22-F588-B2C4-566596A2B79E}"/>
@@ -3803,7 +3838,7 @@
         </p:nvSpPr>
         <p:spPr>
           <a:xfrm>
-            <a:off x="9906000" y="4572000"/>
+            <a:off x="10057655" y="2354262"/>
             <a:ext cx="2058145" cy="1760538"/>
           </a:xfrm>
         </p:spPr>
@@ -3833,7 +3868,7 @@
         <p:spPr>
           <a:xfrm>
             <a:off x="378885" y="2514601"/>
-            <a:ext cx="10746315" cy="3673475"/>
+            <a:ext cx="9984315" cy="3673475"/>
           </a:xfrm>
         </p:spPr>
         <p:txBody>
@@ -7302,21 +7337,6 @@
 </file>
 
 <file path=customXml/item1.xml><?xml version="1.0" encoding="utf-8"?>
-<?mso-contentType ?>
-<FormTemplates xmlns="http://schemas.microsoft.com/sharepoint/v3/contenttype/forms">
-  <Display>DocumentLibraryForm</Display>
-  <Edit>DocumentLibraryForm</Edit>
-  <New>DocumentLibraryForm</New>
-</FormTemplates>
-</file>
-
-<file path=customXml/item2.xml><?xml version="1.0" encoding="utf-8"?>
-<p:properties xmlns:p="http://schemas.microsoft.com/office/2006/metadata/properties" xmlns:xsi="http://www.w3.org/2001/XMLSchema-instance" xmlns:pc="http://schemas.microsoft.com/office/infopath/2007/PartnerControls">
-  <documentManagement/>
-</p:properties>
-</file>
-
-<file path=customXml/item3.xml><?xml version="1.0" encoding="utf-8"?>
 <ct:contentTypeSchema xmlns:ct="http://schemas.microsoft.com/office/2006/metadata/contentType" xmlns:ma="http://schemas.microsoft.com/office/2006/metadata/properties/metaAttributes" ct:_="" ma:_="" ma:contentTypeName="Document" ma:contentTypeID="0x01010077A71171D920F84EA61D01A688B27E19" ma:contentTypeVersion="12" ma:contentTypeDescription="Create a new document." ma:contentTypeScope="" ma:versionID="77163b69060b889c999f197c07fa55cb">
   <xsd:schema xmlns:xsd="http://www.w3.org/2001/XMLSchema" xmlns:xs="http://www.w3.org/2001/XMLSchema" xmlns:p="http://schemas.microsoft.com/office/2006/metadata/properties" xmlns:ns3="4a911788-1229-46fe-9788-503fff6773af" xmlns:ns4="be1ab068-95ae-4084-b4d0-9bc2d42a8063" targetNamespace="http://schemas.microsoft.com/office/2006/metadata/properties" ma:root="true" ma:fieldsID="20541d3c3ddc7e7a03d4e8725bf99a9a" ns3:_="" ns4:_="">
     <xsd:import namespace="4a911788-1229-46fe-9788-503fff6773af"/>
@@ -7533,10 +7553,36 @@
 </ct:contentTypeSchema>
 </file>
 
+<file path=customXml/item2.xml><?xml version="1.0" encoding="utf-8"?>
+<p:properties xmlns:p="http://schemas.microsoft.com/office/2006/metadata/properties" xmlns:xsi="http://www.w3.org/2001/XMLSchema-instance" xmlns:pc="http://schemas.microsoft.com/office/infopath/2007/PartnerControls">
+  <documentManagement/>
+</p:properties>
+</file>
+
+<file path=customXml/item3.xml><?xml version="1.0" encoding="utf-8"?>
+<?mso-contentType ?>
+<FormTemplates xmlns="http://schemas.microsoft.com/sharepoint/v3/contenttype/forms">
+  <Display>DocumentLibraryForm</Display>
+  <Edit>DocumentLibraryForm</Edit>
+  <New>DocumentLibraryForm</New>
+</FormTemplates>
+</file>
+
 <file path=customXml/itemProps1.xml><?xml version="1.0" encoding="utf-8"?>
-<ds:datastoreItem xmlns:ds="http://schemas.openxmlformats.org/officeDocument/2006/customXml" ds:itemID="{E4FA02DB-BD1E-4C7E-B357-5D52E030251B}">
+<ds:datastoreItem xmlns:ds="http://schemas.openxmlformats.org/officeDocument/2006/customXml" ds:itemID="{0D0ABFE7-103E-40F0-BEF6-6C375A209ED5}">
   <ds:schemaRefs>
-    <ds:schemaRef ds:uri="http://schemas.microsoft.com/sharepoint/v3/contenttype/forms"/>
+    <ds:schemaRef ds:uri="http://schemas.microsoft.com/office/2006/metadata/contentType"/>
+    <ds:schemaRef ds:uri="http://schemas.microsoft.com/office/2006/metadata/properties/metaAttributes"/>
+    <ds:schemaRef ds:uri="http://www.w3.org/2001/XMLSchema"/>
+    <ds:schemaRef ds:uri="http://schemas.microsoft.com/office/2006/metadata/properties"/>
+    <ds:schemaRef ds:uri="4a911788-1229-46fe-9788-503fff6773af"/>
+    <ds:schemaRef ds:uri="be1ab068-95ae-4084-b4d0-9bc2d42a8063"/>
+    <ds:schemaRef ds:uri="http://schemas.microsoft.com/office/2006/documentManagement/types"/>
+    <ds:schemaRef ds:uri="http://schemas.microsoft.com/office/infopath/2007/PartnerControls"/>
+    <ds:schemaRef ds:uri="http://schemas.openxmlformats.org/package/2006/metadata/core-properties"/>
+    <ds:schemaRef ds:uri="http://purl.org/dc/elements/1.1/"/>
+    <ds:schemaRef ds:uri="http://purl.org/dc/terms/"/>
+    <ds:schemaRef ds:uri="http://schemas.microsoft.com/internal/obd"/>
   </ds:schemaRefs>
 </ds:datastoreItem>
 </file>
@@ -7559,20 +7605,9 @@
 </file>
 
 <file path=customXml/itemProps3.xml><?xml version="1.0" encoding="utf-8"?>
-<ds:datastoreItem xmlns:ds="http://schemas.openxmlformats.org/officeDocument/2006/customXml" ds:itemID="{0D0ABFE7-103E-40F0-BEF6-6C375A209ED5}">
+<ds:datastoreItem xmlns:ds="http://schemas.openxmlformats.org/officeDocument/2006/customXml" ds:itemID="{E4FA02DB-BD1E-4C7E-B357-5D52E030251B}">
   <ds:schemaRefs>
-    <ds:schemaRef ds:uri="http://schemas.microsoft.com/office/2006/metadata/contentType"/>
-    <ds:schemaRef ds:uri="http://schemas.microsoft.com/office/2006/metadata/properties/metaAttributes"/>
-    <ds:schemaRef ds:uri="http://www.w3.org/2001/XMLSchema"/>
-    <ds:schemaRef ds:uri="http://schemas.microsoft.com/office/2006/metadata/properties"/>
-    <ds:schemaRef ds:uri="4a911788-1229-46fe-9788-503fff6773af"/>
-    <ds:schemaRef ds:uri="be1ab068-95ae-4084-b4d0-9bc2d42a8063"/>
-    <ds:schemaRef ds:uri="http://schemas.microsoft.com/office/2006/documentManagement/types"/>
-    <ds:schemaRef ds:uri="http://schemas.microsoft.com/office/infopath/2007/PartnerControls"/>
-    <ds:schemaRef ds:uri="http://schemas.openxmlformats.org/package/2006/metadata/core-properties"/>
-    <ds:schemaRef ds:uri="http://purl.org/dc/elements/1.1/"/>
-    <ds:schemaRef ds:uri="http://purl.org/dc/terms/"/>
-    <ds:schemaRef ds:uri="http://schemas.microsoft.com/internal/obd"/>
+    <ds:schemaRef ds:uri="http://schemas.microsoft.com/sharepoint/v3/contenttype/forms"/>
   </ds:schemaRefs>
 </ds:datastoreItem>
 </file>
</xml_diff>

<commit_message>
chore: code and slide text cleanup
</commit_message>
<xml_diff>
--- a/slide-deck-officer-template.pptx
+++ b/slide-deck-officer-template.pptx
@@ -3803,7 +3803,7 @@
         </p:nvSpPr>
         <p:spPr>
           <a:xfrm>
-            <a:off x="10058400" y="4259262"/>
+            <a:off x="9906745" y="4259262"/>
             <a:ext cx="2058145" cy="1760538"/>
           </a:xfrm>
         </p:spPr>
@@ -3838,7 +3838,7 @@
         </p:nvSpPr>
         <p:spPr>
           <a:xfrm>
-            <a:off x="10057655" y="2354262"/>
+            <a:off x="9906000" y="2354262"/>
             <a:ext cx="2058145" cy="1760538"/>
           </a:xfrm>
         </p:spPr>
@@ -3867,8 +3867,8 @@
         </p:nvSpPr>
         <p:spPr>
           <a:xfrm>
-            <a:off x="378885" y="2514601"/>
-            <a:ext cx="9984315" cy="3673475"/>
+            <a:off x="378886" y="2514601"/>
+            <a:ext cx="9603314" cy="3673475"/>
           </a:xfrm>
         </p:spPr>
         <p:txBody>
@@ -4729,7 +4729,7 @@
         </p:nvSpPr>
         <p:spPr>
           <a:xfrm>
-            <a:off x="6627502" y="1398786"/>
+            <a:off x="7146401" y="1398786"/>
             <a:ext cx="3704800" cy="338138"/>
           </a:xfrm>
         </p:spPr>
@@ -4738,11 +4738,11 @@
           <a:lstStyle>
             <a:lvl1pPr marL="0" indent="0" algn="ctr">
               <a:buNone/>
-              <a:defRPr sz="2400" b="1">
+              <a:defRPr sz="2400" b="0">
                 <a:solidFill>
-                  <a:schemeClr val="tx1"/>
+                  <a:srgbClr val="404040"/>
                 </a:solidFill>
-                <a:latin typeface="Calibri" panose="020F0502020204030204" pitchFamily="34" charset="0"/>
+                <a:latin typeface="+mj-lt"/>
                 <a:cs typeface="Calibri" panose="020F0502020204030204" pitchFamily="34" charset="0"/>
               </a:defRPr>
             </a:lvl1pPr>
@@ -4846,7 +4846,7 @@
         </p:nvSpPr>
         <p:spPr>
           <a:xfrm>
-            <a:off x="1371600" y="1414462"/>
+            <a:off x="1066800" y="1414462"/>
             <a:ext cx="3486150" cy="338138"/>
           </a:xfrm>
         </p:spPr>
@@ -4855,11 +4855,11 @@
           <a:lstStyle>
             <a:lvl1pPr marL="0" indent="0" algn="ctr">
               <a:buNone/>
-              <a:defRPr sz="2400" b="1">
+              <a:defRPr sz="2400" b="0">
                 <a:solidFill>
-                  <a:schemeClr val="tx1"/>
+                  <a:srgbClr val="404040"/>
                 </a:solidFill>
-                <a:latin typeface="Calibri" panose="020F0502020204030204" pitchFamily="34" charset="0"/>
+                <a:latin typeface="+mj-lt"/>
                 <a:cs typeface="Calibri" panose="020F0502020204030204" pitchFamily="34" charset="0"/>
               </a:defRPr>
             </a:lvl1pPr>
@@ -4939,7 +4939,7 @@
               <a:buNone/>
               <a:defRPr sz="2400" b="1">
                 <a:solidFill>
-                  <a:srgbClr val="4F0D1E"/>
+                  <a:srgbClr val="404040"/>
                 </a:solidFill>
               </a:defRPr>
             </a:lvl1pPr>
@@ -4996,8 +4996,8 @@
         </p:nvSpPr>
         <p:spPr>
           <a:xfrm>
-            <a:off x="1776000" y="457200"/>
-            <a:ext cx="8640000" cy="381000"/>
+            <a:off x="800100" y="457200"/>
+            <a:ext cx="10591800" cy="411976"/>
           </a:xfrm>
         </p:spPr>
         <p:txBody>
@@ -5078,6 +5078,58 @@
       </p:grpSpPr>
       <p:sp>
         <p:nvSpPr>
+          <p:cNvPr id="5" name="colorbar">
+            <a:extLst>
+              <a:ext uri="{FF2B5EF4-FFF2-40B4-BE49-F238E27FC236}">
+                <a16:creationId xmlns:a16="http://schemas.microsoft.com/office/drawing/2014/main" id="{23F69791-CF24-439D-8487-1DA3812E98BC}"/>
+              </a:ext>
+            </a:extLst>
+          </p:cNvPr>
+          <p:cNvSpPr/>
+          <p:nvPr userDrawn="1"/>
+        </p:nvSpPr>
+        <p:spPr>
+          <a:xfrm>
+            <a:off x="0" y="6477000"/>
+            <a:ext cx="12192000" cy="370800"/>
+          </a:xfrm>
+          <a:prstGeom prst="rect">
+            <a:avLst/>
+          </a:prstGeom>
+          <a:solidFill>
+            <a:schemeClr val="accent1">
+              <a:lumMod val="75000"/>
+            </a:schemeClr>
+          </a:solidFill>
+          <a:ln>
+            <a:noFill/>
+          </a:ln>
+        </p:spPr>
+        <p:style>
+          <a:lnRef idx="1">
+            <a:schemeClr val="accent1"/>
+          </a:lnRef>
+          <a:fillRef idx="3">
+            <a:schemeClr val="accent1"/>
+          </a:fillRef>
+          <a:effectRef idx="2">
+            <a:schemeClr val="accent1"/>
+          </a:effectRef>
+          <a:fontRef idx="minor">
+            <a:schemeClr val="lt1"/>
+          </a:fontRef>
+        </p:style>
+        <p:txBody>
+          <a:bodyPr rtlCol="0" anchor="ctr"/>
+          <a:lstStyle/>
+          <a:p>
+            <a:pPr algn="ctr"/>
+            <a:endParaRPr lang="en-CA" sz="2400"/>
+          </a:p>
+        </p:txBody>
+      </p:sp>
+      <p:sp>
+        <p:nvSpPr>
           <p:cNvPr id="14" name="graph2">
             <a:extLst>
               <a:ext uri="{FF2B5EF4-FFF2-40B4-BE49-F238E27FC236}">
@@ -5094,7 +5146,7 @@
         </p:nvSpPr>
         <p:spPr>
           <a:xfrm>
-            <a:off x="685800" y="3349200"/>
+            <a:off x="685800" y="3577800"/>
             <a:ext cx="10363200" cy="3051600"/>
           </a:xfrm>
         </p:spPr>
@@ -5129,7 +5181,7 @@
         </p:nvSpPr>
         <p:spPr>
           <a:xfrm>
-            <a:off x="1104900" y="1524000"/>
+            <a:off x="1104900" y="1680000"/>
             <a:ext cx="9982200" cy="1368000"/>
           </a:xfrm>
         </p:spPr>
@@ -5164,7 +5216,7 @@
         </p:nvSpPr>
         <p:spPr>
           <a:xfrm>
-            <a:off x="1632000" y="1295400"/>
+            <a:off x="1632000" y="1414462"/>
             <a:ext cx="8928000" cy="338138"/>
           </a:xfrm>
         </p:spPr>
@@ -5173,11 +5225,11 @@
           <a:lstStyle>
             <a:lvl1pPr marL="0" indent="0" algn="ctr">
               <a:buNone/>
-              <a:defRPr sz="2400" b="1">
+              <a:defRPr sz="2400" b="0">
                 <a:solidFill>
-                  <a:schemeClr val="tx1"/>
+                  <a:srgbClr val="404040"/>
                 </a:solidFill>
-                <a:latin typeface="Calibri" panose="020F0502020204030204" pitchFamily="34" charset="0"/>
+                <a:latin typeface="+mj-lt"/>
                 <a:cs typeface="Calibri" panose="020F0502020204030204" pitchFamily="34" charset="0"/>
               </a:defRPr>
             </a:lvl1pPr>
@@ -5257,7 +5309,7 @@
               <a:buNone/>
               <a:defRPr sz="2400" b="1">
                 <a:solidFill>
-                  <a:srgbClr val="4F0D1E"/>
+                  <a:srgbClr val="404040"/>
                 </a:solidFill>
               </a:defRPr>
             </a:lvl1pPr>
@@ -5382,7 +5434,7 @@
         </p:nvSpPr>
         <p:spPr>
           <a:xfrm>
-            <a:off x="304800" y="2895600"/>
+            <a:off x="304800" y="3124200"/>
             <a:ext cx="11582400" cy="533400"/>
           </a:xfrm>
         </p:spPr>
@@ -5394,11 +5446,11 @@
                 <a:spcPts val="0"/>
               </a:spcBef>
               <a:buNone/>
-              <a:defRPr sz="2400" b="1">
+              <a:defRPr sz="2400" b="0">
                 <a:solidFill>
-                  <a:schemeClr val="tx1"/>
+                  <a:srgbClr val="404040"/>
                 </a:solidFill>
-                <a:latin typeface="Calibri" panose="020F0502020204030204" pitchFamily="34" charset="0"/>
+                <a:latin typeface="+mj-lt"/>
                 <a:cs typeface="Calibri" panose="020F0502020204030204" pitchFamily="34" charset="0"/>
               </a:defRPr>
             </a:lvl1pPr>
@@ -5446,58 +5498,6 @@
           <a:p>
             <a:pPr lvl="0"/>
             <a:endParaRPr lang="en-CA" dirty="0"/>
-          </a:p>
-        </p:txBody>
-      </p:sp>
-      <p:sp>
-        <p:nvSpPr>
-          <p:cNvPr id="5" name="colorbar">
-            <a:extLst>
-              <a:ext uri="{FF2B5EF4-FFF2-40B4-BE49-F238E27FC236}">
-                <a16:creationId xmlns:a16="http://schemas.microsoft.com/office/drawing/2014/main" id="{23F69791-CF24-439D-8487-1DA3812E98BC}"/>
-              </a:ext>
-            </a:extLst>
-          </p:cNvPr>
-          <p:cNvSpPr/>
-          <p:nvPr userDrawn="1"/>
-        </p:nvSpPr>
-        <p:spPr>
-          <a:xfrm>
-            <a:off x="0" y="6477000"/>
-            <a:ext cx="12192000" cy="370800"/>
-          </a:xfrm>
-          <a:prstGeom prst="rect">
-            <a:avLst/>
-          </a:prstGeom>
-          <a:solidFill>
-            <a:schemeClr val="accent1">
-              <a:lumMod val="75000"/>
-            </a:schemeClr>
-          </a:solidFill>
-          <a:ln>
-            <a:noFill/>
-          </a:ln>
-        </p:spPr>
-        <p:style>
-          <a:lnRef idx="1">
-            <a:schemeClr val="accent1"/>
-          </a:lnRef>
-          <a:fillRef idx="3">
-            <a:schemeClr val="accent1"/>
-          </a:fillRef>
-          <a:effectRef idx="2">
-            <a:schemeClr val="accent1"/>
-          </a:effectRef>
-          <a:fontRef idx="minor">
-            <a:schemeClr val="lt1"/>
-          </a:fontRef>
-        </p:style>
-        <p:txBody>
-          <a:bodyPr rtlCol="0" anchor="ctr"/>
-          <a:lstStyle/>
-          <a:p>
-            <a:pPr algn="ctr"/>
-            <a:endParaRPr lang="en-CA" sz="2400"/>
           </a:p>
         </p:txBody>
       </p:sp>
@@ -5825,7 +5825,7 @@
           <a:p>
             <a:fld id="{9238D30A-C4D9-4706-A3BC-D7B1F66AC7AA}" type="datetimeFigureOut">
               <a:rPr lang="en-CA" smtClean="0"/>
-              <a:t>2024-03-17</a:t>
+              <a:t>2024-03-27</a:t>
             </a:fld>
             <a:endParaRPr lang="en-CA"/>
           </a:p>
@@ -6322,7 +6322,7 @@
           <a:p>
             <a:r>
               <a:rPr lang="en-CA" sz="3600" dirty="0"/>
-              <a:t>Cat Encounters Monthly Report</a:t>
+              <a:t>GTA Cat Encounters Monthly Report</a:t>
             </a:r>
             <a:br>
               <a:rPr lang="en-CA" dirty="0"/>
@@ -6371,7 +6371,7 @@
           <a:p>
             <a:fld id="{FAE7665C-0A6A-4A28-87E2-92D571E7537D}" type="datetime3">
               <a:rPr lang="en-CA" smtClean="0"/>
-              <a:t>17 March 2024</a:t>
+              <a:t>27 March 2024</a:t>
             </a:fld>
             <a:endParaRPr lang="en-CA" dirty="0"/>
           </a:p>
@@ -6392,7 +6392,7 @@
         <p:spPr>
           <a:xfrm>
             <a:off x="0" y="6182361"/>
-            <a:ext cx="4237057" cy="646331"/>
+            <a:ext cx="6566862" cy="646331"/>
           </a:xfrm>
           <a:prstGeom prst="rect">
             <a:avLst/>
@@ -6420,18 +6420,23 @@
           <a:p>
             <a:r>
               <a:rPr lang="en-US" sz="1800" dirty="0"/>
-              <a:t>materials: </a:t>
+              <a:t>materials</a:t>
             </a:r>
             <a:r>
-              <a:rPr lang="en-US" sz="1800" dirty="0">
+              <a:rPr lang="en-US" sz="1800"/>
+              <a:t>: </a:t>
+            </a:r>
+            <a:r>
+              <a:rPr lang="en-US" sz="1800">
                 <a:hlinkClick r:id="rId4"/>
               </a:rPr>
-              <a:t>https://github.com/jennyrieck</a:t>
+              <a:t>https://github.com/jennyrieck/auto-slide-deck-officer</a:t>
             </a:r>
             <a:r>
-              <a:rPr lang="en-US" sz="1800" dirty="0"/>
+              <a:rPr lang="en-US" sz="1800"/>
               <a:t> </a:t>
             </a:r>
+            <a:endParaRPr lang="en-US" sz="1800" dirty="0"/>
           </a:p>
         </p:txBody>
       </p:sp>

</xml_diff>